<commit_message>
Some small changes to the Homework 4 Rmd template
</commit_message>
<xml_diff>
--- a/Homework 4/Homework 4 in SPSS.pptx
+++ b/Homework 4/Homework 4 in SPSS.pptx
@@ -20,33 +20,30 @@
     <p:sldId id="270" r:id="rId14"/>
     <p:sldId id="271" r:id="rId15"/>
     <p:sldId id="273" r:id="rId16"/>
-    <p:sldId id="274" r:id="rId17"/>
-    <p:sldId id="275" r:id="rId18"/>
-    <p:sldId id="276" r:id="rId19"/>
-    <p:sldId id="277" r:id="rId20"/>
-    <p:sldId id="280" r:id="rId21"/>
-    <p:sldId id="281" r:id="rId22"/>
-    <p:sldId id="282" r:id="rId23"/>
-    <p:sldId id="283" r:id="rId24"/>
-    <p:sldId id="284" r:id="rId25"/>
-    <p:sldId id="285" r:id="rId26"/>
-    <p:sldId id="286" r:id="rId27"/>
-    <p:sldId id="287" r:id="rId28"/>
-    <p:sldId id="288" r:id="rId29"/>
-    <p:sldId id="289" r:id="rId30"/>
-    <p:sldId id="290" r:id="rId31"/>
-    <p:sldId id="291" r:id="rId32"/>
-    <p:sldId id="293" r:id="rId33"/>
-    <p:sldId id="292" r:id="rId34"/>
-    <p:sldId id="294" r:id="rId35"/>
-    <p:sldId id="295" r:id="rId36"/>
-    <p:sldId id="296" r:id="rId37"/>
-    <p:sldId id="297" r:id="rId38"/>
-    <p:sldId id="298" r:id="rId39"/>
-    <p:sldId id="299" r:id="rId40"/>
-    <p:sldId id="300" r:id="rId41"/>
-    <p:sldId id="301" r:id="rId42"/>
-    <p:sldId id="302" r:id="rId43"/>
+    <p:sldId id="276" r:id="rId17"/>
+    <p:sldId id="277" r:id="rId18"/>
+    <p:sldId id="280" r:id="rId19"/>
+    <p:sldId id="281" r:id="rId20"/>
+    <p:sldId id="282" r:id="rId21"/>
+    <p:sldId id="283" r:id="rId22"/>
+    <p:sldId id="284" r:id="rId23"/>
+    <p:sldId id="285" r:id="rId24"/>
+    <p:sldId id="286" r:id="rId25"/>
+    <p:sldId id="287" r:id="rId26"/>
+    <p:sldId id="288" r:id="rId27"/>
+    <p:sldId id="289" r:id="rId28"/>
+    <p:sldId id="290" r:id="rId29"/>
+    <p:sldId id="291" r:id="rId30"/>
+    <p:sldId id="293" r:id="rId31"/>
+    <p:sldId id="292" r:id="rId32"/>
+    <p:sldId id="295" r:id="rId33"/>
+    <p:sldId id="296" r:id="rId34"/>
+    <p:sldId id="297" r:id="rId35"/>
+    <p:sldId id="298" r:id="rId36"/>
+    <p:sldId id="299" r:id="rId37"/>
+    <p:sldId id="300" r:id="rId38"/>
+    <p:sldId id="301" r:id="rId39"/>
+    <p:sldId id="302" r:id="rId40"/>
   </p:sldIdLst>
   <p:sldSz cx="12192000" cy="6858000"/>
   <p:notesSz cx="6858000" cy="9144000"/>
@@ -279,7 +276,7 @@
           <a:p>
             <a:fld id="{1BE25CBA-E170-42E9-9F93-AF8F30908BBD}" type="datetimeFigureOut">
               <a:rPr lang="en-US" smtClean="0"/>
-              <a:t>11/4/2014</a:t>
+              <a:t>11/5/2014</a:t>
             </a:fld>
             <a:endParaRPr lang="en-US"/>
           </a:p>
@@ -449,7 +446,7 @@
           <a:p>
             <a:fld id="{1BE25CBA-E170-42E9-9F93-AF8F30908BBD}" type="datetimeFigureOut">
               <a:rPr lang="en-US" smtClean="0"/>
-              <a:t>11/4/2014</a:t>
+              <a:t>11/5/2014</a:t>
             </a:fld>
             <a:endParaRPr lang="en-US"/>
           </a:p>
@@ -629,7 +626,7 @@
           <a:p>
             <a:fld id="{1BE25CBA-E170-42E9-9F93-AF8F30908BBD}" type="datetimeFigureOut">
               <a:rPr lang="en-US" smtClean="0"/>
-              <a:t>11/4/2014</a:t>
+              <a:t>11/5/2014</a:t>
             </a:fld>
             <a:endParaRPr lang="en-US"/>
           </a:p>
@@ -799,7 +796,7 @@
           <a:p>
             <a:fld id="{1BE25CBA-E170-42E9-9F93-AF8F30908BBD}" type="datetimeFigureOut">
               <a:rPr lang="en-US" smtClean="0"/>
-              <a:t>11/4/2014</a:t>
+              <a:t>11/5/2014</a:t>
             </a:fld>
             <a:endParaRPr lang="en-US"/>
           </a:p>
@@ -1045,7 +1042,7 @@
           <a:p>
             <a:fld id="{1BE25CBA-E170-42E9-9F93-AF8F30908BBD}" type="datetimeFigureOut">
               <a:rPr lang="en-US" smtClean="0"/>
-              <a:t>11/4/2014</a:t>
+              <a:t>11/5/2014</a:t>
             </a:fld>
             <a:endParaRPr lang="en-US"/>
           </a:p>
@@ -1277,7 +1274,7 @@
           <a:p>
             <a:fld id="{1BE25CBA-E170-42E9-9F93-AF8F30908BBD}" type="datetimeFigureOut">
               <a:rPr lang="en-US" smtClean="0"/>
-              <a:t>11/4/2014</a:t>
+              <a:t>11/5/2014</a:t>
             </a:fld>
             <a:endParaRPr lang="en-US"/>
           </a:p>
@@ -1644,7 +1641,7 @@
           <a:p>
             <a:fld id="{1BE25CBA-E170-42E9-9F93-AF8F30908BBD}" type="datetimeFigureOut">
               <a:rPr lang="en-US" smtClean="0"/>
-              <a:t>11/4/2014</a:t>
+              <a:t>11/5/2014</a:t>
             </a:fld>
             <a:endParaRPr lang="en-US"/>
           </a:p>
@@ -1762,7 +1759,7 @@
           <a:p>
             <a:fld id="{1BE25CBA-E170-42E9-9F93-AF8F30908BBD}" type="datetimeFigureOut">
               <a:rPr lang="en-US" smtClean="0"/>
-              <a:t>11/4/2014</a:t>
+              <a:t>11/5/2014</a:t>
             </a:fld>
             <a:endParaRPr lang="en-US"/>
           </a:p>
@@ -1857,7 +1854,7 @@
           <a:p>
             <a:fld id="{1BE25CBA-E170-42E9-9F93-AF8F30908BBD}" type="datetimeFigureOut">
               <a:rPr lang="en-US" smtClean="0"/>
-              <a:t>11/4/2014</a:t>
+              <a:t>11/5/2014</a:t>
             </a:fld>
             <a:endParaRPr lang="en-US"/>
           </a:p>
@@ -2134,7 +2131,7 @@
           <a:p>
             <a:fld id="{1BE25CBA-E170-42E9-9F93-AF8F30908BBD}" type="datetimeFigureOut">
               <a:rPr lang="en-US" smtClean="0"/>
-              <a:t>11/4/2014</a:t>
+              <a:t>11/5/2014</a:t>
             </a:fld>
             <a:endParaRPr lang="en-US"/>
           </a:p>
@@ -2387,7 +2384,7 @@
           <a:p>
             <a:fld id="{1BE25CBA-E170-42E9-9F93-AF8F30908BBD}" type="datetimeFigureOut">
               <a:rPr lang="en-US" smtClean="0"/>
-              <a:t>11/4/2014</a:t>
+              <a:t>11/5/2014</a:t>
             </a:fld>
             <a:endParaRPr lang="en-US"/>
           </a:p>
@@ -2600,7 +2597,7 @@
           <a:p>
             <a:fld id="{1BE25CBA-E170-42E9-9F93-AF8F30908BBD}" type="datetimeFigureOut">
               <a:rPr lang="en-US" smtClean="0"/>
-              <a:t>11/4/2014</a:t>
+              <a:t>11/5/2014</a:t>
             </a:fld>
             <a:endParaRPr lang="en-US"/>
           </a:p>
@@ -3397,7 +3394,7 @@
           <a:graphicData uri="http://schemas.openxmlformats.org/presentationml/2006/ole">
             <mc:AlternateContent xmlns:mc="http://schemas.openxmlformats.org/markup-compatibility/2006">
               <mc:Choice xmlns:v="urn:schemas-microsoft-com:vml" Requires="v">
-                <p:oleObj spid="_x0000_s2074" r:id="rId3" imgW="27580680" imgH="15631560" progId="">
+                <p:oleObj spid="_x0000_s2077" r:id="rId3" imgW="27580680" imgH="15631560" progId="">
                   <p:embed/>
                 </p:oleObj>
               </mc:Choice>
@@ -3845,250 +3842,6 @@
           <a:p>
             <a:r>
               <a:rPr lang="en-US" dirty="0" smtClean="0"/>
-              <a:t>Run the analysis</a:t>
-            </a:r>
-            <a:endParaRPr lang="en-US" dirty="0"/>
-          </a:p>
-        </p:txBody>
-      </p:sp>
-      <p:sp>
-        <p:nvSpPr>
-          <p:cNvPr id="3" name="Content Placeholder 2"/>
-          <p:cNvSpPr>
-            <a:spLocks noGrp="1"/>
-          </p:cNvSpPr>
-          <p:nvPr>
-            <p:ph sz="half" idx="1"/>
-          </p:nvPr>
-        </p:nvSpPr>
-        <p:spPr/>
-        <p:txBody>
-          <a:bodyPr/>
-          <a:lstStyle/>
-          <a:p>
-            <a:r>
-              <a:rPr lang="en-US" dirty="0" smtClean="0"/>
-              <a:t>Add a name for the dependent measure (e.g. “</a:t>
-            </a:r>
-            <a:r>
-              <a:rPr lang="en-US" dirty="0" err="1" smtClean="0"/>
-              <a:t>food_eaten</a:t>
-            </a:r>
-            <a:r>
-              <a:rPr lang="en-US" dirty="0" smtClean="0"/>
-              <a:t>”)</a:t>
-            </a:r>
-          </a:p>
-          <a:p>
-            <a:r>
-              <a:rPr lang="en-US" dirty="0" smtClean="0"/>
-              <a:t>Click “Add” and “Define”.</a:t>
-            </a:r>
-            <a:endParaRPr lang="en-US" dirty="0"/>
-          </a:p>
-        </p:txBody>
-      </p:sp>
-      <p:pic>
-        <p:nvPicPr>
-          <p:cNvPr id="5" name="Content Placeholder 4"/>
-          <p:cNvPicPr>
-            <a:picLocks noGrp="1" noChangeAspect="1"/>
-          </p:cNvPicPr>
-          <p:nvPr>
-            <p:ph sz="half" idx="2"/>
-          </p:nvPr>
-        </p:nvPicPr>
-        <p:blipFill>
-          <a:blip r:embed="rId2"/>
-          <a:stretch>
-            <a:fillRect/>
-          </a:stretch>
-        </p:blipFill>
-        <p:spPr>
-          <a:xfrm>
-            <a:off x="7270205" y="1825625"/>
-            <a:ext cx="2985589" cy="4351338"/>
-          </a:xfrm>
-          <a:prstGeom prst="rect">
-            <a:avLst/>
-          </a:prstGeom>
-        </p:spPr>
-      </p:pic>
-    </p:spTree>
-    <p:extLst>
-      <p:ext uri="{BB962C8B-B14F-4D97-AF65-F5344CB8AC3E}">
-        <p14:creationId xmlns:p14="http://schemas.microsoft.com/office/powerpoint/2010/main" val="185833518"/>
-      </p:ext>
-    </p:extLst>
-  </p:cSld>
-  <p:clrMapOvr>
-    <a:masterClrMapping/>
-  </p:clrMapOvr>
-  <p:timing>
-    <p:tnLst>
-      <p:par>
-        <p:cTn id="1" dur="indefinite" restart="never" nodeType="tmRoot"/>
-      </p:par>
-    </p:tnLst>
-  </p:timing>
-</p:sld>
-</file>
-
-<file path=ppt/slides/slide17.xml><?xml version="1.0" encoding="utf-8"?>
-<p:sld xmlns:a="http://schemas.openxmlformats.org/drawingml/2006/main" xmlns:r="http://schemas.openxmlformats.org/officeDocument/2006/relationships" xmlns:p="http://schemas.openxmlformats.org/presentationml/2006/main">
-  <p:cSld>
-    <p:spTree>
-      <p:nvGrpSpPr>
-        <p:cNvPr id="1" name=""/>
-        <p:cNvGrpSpPr/>
-        <p:nvPr/>
-      </p:nvGrpSpPr>
-      <p:grpSpPr>
-        <a:xfrm>
-          <a:off x="0" y="0"/>
-          <a:ext cx="0" cy="0"/>
-          <a:chOff x="0" y="0"/>
-          <a:chExt cx="0" cy="0"/>
-        </a:xfrm>
-      </p:grpSpPr>
-      <p:sp>
-        <p:nvSpPr>
-          <p:cNvPr id="2" name="Title 1"/>
-          <p:cNvSpPr>
-            <a:spLocks noGrp="1"/>
-          </p:cNvSpPr>
-          <p:nvPr>
-            <p:ph type="title"/>
-          </p:nvPr>
-        </p:nvSpPr>
-        <p:spPr/>
-        <p:txBody>
-          <a:bodyPr/>
-          <a:lstStyle/>
-          <a:p>
-            <a:r>
-              <a:rPr lang="en-US" dirty="0" smtClean="0"/>
-              <a:t>Assign within-subjects variables</a:t>
-            </a:r>
-            <a:endParaRPr lang="en-US" dirty="0"/>
-          </a:p>
-        </p:txBody>
-      </p:sp>
-      <p:sp>
-        <p:nvSpPr>
-          <p:cNvPr id="3" name="Content Placeholder 2"/>
-          <p:cNvSpPr>
-            <a:spLocks noGrp="1"/>
-          </p:cNvSpPr>
-          <p:nvPr>
-            <p:ph sz="half" idx="1"/>
-          </p:nvPr>
-        </p:nvSpPr>
-        <p:spPr/>
-        <p:txBody>
-          <a:bodyPr/>
-          <a:lstStyle/>
-          <a:p>
-            <a:r>
-              <a:rPr lang="en-US" dirty="0" smtClean="0"/>
-              <a:t>Click on each column name, then on the corresponding level of the within subjects variables and then on the arrow to assign it.</a:t>
-            </a:r>
-          </a:p>
-          <a:p>
-            <a:r>
-              <a:rPr lang="en-US" dirty="0" smtClean="0"/>
-              <a:t>You need to decide which level corresponds to which numbers</a:t>
-            </a:r>
-          </a:p>
-          <a:p>
-            <a:pPr lvl="1"/>
-            <a:r>
-              <a:rPr lang="en-US" dirty="0" smtClean="0"/>
-              <a:t>e.g. 1,1 could correspond to beef, fish and 2,2 could correspond to no fish, no beef, etc.</a:t>
-            </a:r>
-          </a:p>
-        </p:txBody>
-      </p:sp>
-      <p:pic>
-        <p:nvPicPr>
-          <p:cNvPr id="5" name="Content Placeholder 4"/>
-          <p:cNvPicPr>
-            <a:picLocks noGrp="1" noChangeAspect="1"/>
-          </p:cNvPicPr>
-          <p:nvPr>
-            <p:ph sz="half" idx="2"/>
-          </p:nvPr>
-        </p:nvPicPr>
-        <p:blipFill>
-          <a:blip r:embed="rId2"/>
-          <a:stretch>
-            <a:fillRect/>
-          </a:stretch>
-        </p:blipFill>
-        <p:spPr>
-          <a:xfrm>
-            <a:off x="6287747" y="1825625"/>
-            <a:ext cx="4950506" cy="4351338"/>
-          </a:xfrm>
-          <a:prstGeom prst="rect">
-            <a:avLst/>
-          </a:prstGeom>
-        </p:spPr>
-      </p:pic>
-    </p:spTree>
-    <p:extLst>
-      <p:ext uri="{BB962C8B-B14F-4D97-AF65-F5344CB8AC3E}">
-        <p14:creationId xmlns:p14="http://schemas.microsoft.com/office/powerpoint/2010/main" val="3741009431"/>
-      </p:ext>
-    </p:extLst>
-  </p:cSld>
-  <p:clrMapOvr>
-    <a:masterClrMapping/>
-  </p:clrMapOvr>
-  <p:timing>
-    <p:tnLst>
-      <p:par>
-        <p:cTn id="1" dur="indefinite" restart="never" nodeType="tmRoot"/>
-      </p:par>
-    </p:tnLst>
-  </p:timing>
-</p:sld>
-</file>
-
-<file path=ppt/slides/slide18.xml><?xml version="1.0" encoding="utf-8"?>
-<p:sld xmlns:a="http://schemas.openxmlformats.org/drawingml/2006/main" xmlns:r="http://schemas.openxmlformats.org/officeDocument/2006/relationships" xmlns:p="http://schemas.openxmlformats.org/presentationml/2006/main">
-  <p:cSld>
-    <p:spTree>
-      <p:nvGrpSpPr>
-        <p:cNvPr id="1" name=""/>
-        <p:cNvGrpSpPr/>
-        <p:nvPr/>
-      </p:nvGrpSpPr>
-      <p:grpSpPr>
-        <a:xfrm>
-          <a:off x="0" y="0"/>
-          <a:ext cx="0" cy="0"/>
-          <a:chOff x="0" y="0"/>
-          <a:chExt cx="0" cy="0"/>
-        </a:xfrm>
-      </p:grpSpPr>
-      <p:sp>
-        <p:nvSpPr>
-          <p:cNvPr id="2" name="Title 1"/>
-          <p:cNvSpPr>
-            <a:spLocks noGrp="1"/>
-          </p:cNvSpPr>
-          <p:nvPr>
-            <p:ph type="title"/>
-          </p:nvPr>
-        </p:nvSpPr>
-        <p:spPr/>
-        <p:txBody>
-          <a:bodyPr/>
-          <a:lstStyle/>
-          <a:p>
-            <a:r>
-              <a:rPr lang="en-US" dirty="0" smtClean="0"/>
               <a:t>Assign within-subjects variables</a:t>
             </a:r>
             <a:endParaRPr lang="en-US" dirty="0"/>
@@ -4184,7 +3937,7 @@
 </p:sld>
 </file>
 
-<file path=ppt/slides/slide19.xml><?xml version="1.0" encoding="utf-8"?>
+<file path=ppt/slides/slide17.xml><?xml version="1.0" encoding="utf-8"?>
 <p:sld xmlns:a="http://schemas.openxmlformats.org/drawingml/2006/main" xmlns:r="http://schemas.openxmlformats.org/officeDocument/2006/relationships" xmlns:p="http://schemas.openxmlformats.org/presentationml/2006/main">
   <p:cSld>
     <p:spTree>
@@ -4305,6 +4058,303 @@
 </p:sld>
 </file>
 
+<file path=ppt/slides/slide18.xml><?xml version="1.0" encoding="utf-8"?>
+<p:sld xmlns:a="http://schemas.openxmlformats.org/drawingml/2006/main" xmlns:r="http://schemas.openxmlformats.org/officeDocument/2006/relationships" xmlns:p="http://schemas.openxmlformats.org/presentationml/2006/main">
+  <p:cSld>
+    <p:spTree>
+      <p:nvGrpSpPr>
+        <p:cNvPr id="1" name=""/>
+        <p:cNvGrpSpPr/>
+        <p:nvPr/>
+      </p:nvGrpSpPr>
+      <p:grpSpPr>
+        <a:xfrm>
+          <a:off x="0" y="0"/>
+          <a:ext cx="0" cy="0"/>
+          <a:chOff x="0" y="0"/>
+          <a:chExt cx="0" cy="0"/>
+        </a:xfrm>
+      </p:grpSpPr>
+      <p:sp>
+        <p:nvSpPr>
+          <p:cNvPr id="2" name="Title 1"/>
+          <p:cNvSpPr>
+            <a:spLocks noGrp="1"/>
+          </p:cNvSpPr>
+          <p:nvPr>
+            <p:ph type="title"/>
+          </p:nvPr>
+        </p:nvSpPr>
+        <p:spPr/>
+        <p:txBody>
+          <a:bodyPr/>
+          <a:lstStyle/>
+          <a:p>
+            <a:r>
+              <a:rPr lang="en-US" dirty="0" smtClean="0"/>
+              <a:t>Post-hoc comparisons</a:t>
+            </a:r>
+            <a:endParaRPr lang="en-US" dirty="0"/>
+          </a:p>
+        </p:txBody>
+      </p:sp>
+      <p:sp>
+        <p:nvSpPr>
+          <p:cNvPr id="3" name="Content Placeholder 2"/>
+          <p:cNvSpPr>
+            <a:spLocks noGrp="1"/>
+          </p:cNvSpPr>
+          <p:nvPr>
+            <p:ph sz="half" idx="1"/>
+          </p:nvPr>
+        </p:nvSpPr>
+        <p:spPr/>
+        <p:txBody>
+          <a:bodyPr>
+            <a:normAutofit lnSpcReduction="10000"/>
+          </a:bodyPr>
+          <a:lstStyle/>
+          <a:p>
+            <a:r>
+              <a:rPr lang="en-US" dirty="0" smtClean="0"/>
+              <a:t>Click “Post Hoc…”</a:t>
+            </a:r>
+          </a:p>
+          <a:p>
+            <a:r>
+              <a:rPr lang="en-US" dirty="0" smtClean="0"/>
+              <a:t>Note that only factors with 3 or more levels are shown in the post hoc window</a:t>
+            </a:r>
+          </a:p>
+          <a:p>
+            <a:r>
+              <a:rPr lang="en-US" dirty="0" smtClean="0"/>
+              <a:t>Select “</a:t>
+            </a:r>
+            <a:r>
+              <a:rPr lang="en-US" dirty="0" err="1" smtClean="0"/>
+              <a:t>breed_factor</a:t>
+            </a:r>
+            <a:r>
+              <a:rPr lang="en-US" dirty="0" smtClean="0"/>
+              <a:t>” and move it over to the “Post hoc tests for” field</a:t>
+            </a:r>
+          </a:p>
+          <a:p>
+            <a:r>
+              <a:rPr lang="en-US" dirty="0" smtClean="0"/>
+              <a:t>Select any tests you want, e.g. </a:t>
+            </a:r>
+            <a:r>
+              <a:rPr lang="en-US" dirty="0" err="1" smtClean="0"/>
+              <a:t>Bonferroni</a:t>
+            </a:r>
+            <a:r>
+              <a:rPr lang="en-US" dirty="0" smtClean="0"/>
+              <a:t> and </a:t>
+            </a:r>
+            <a:r>
+              <a:rPr lang="en-US" dirty="0" err="1" smtClean="0"/>
+              <a:t>Tukey</a:t>
+            </a:r>
+            <a:endParaRPr lang="en-US" dirty="0" smtClean="0"/>
+          </a:p>
+          <a:p>
+            <a:r>
+              <a:rPr lang="en-US" dirty="0" smtClean="0"/>
+              <a:t>Click “Continue”</a:t>
+            </a:r>
+            <a:endParaRPr lang="en-US" dirty="0"/>
+          </a:p>
+        </p:txBody>
+      </p:sp>
+      <p:pic>
+        <p:nvPicPr>
+          <p:cNvPr id="5" name="Content Placeholder 4"/>
+          <p:cNvPicPr>
+            <a:picLocks noGrp="1" noChangeAspect="1"/>
+          </p:cNvPicPr>
+          <p:nvPr>
+            <p:ph sz="half" idx="2"/>
+          </p:nvPr>
+        </p:nvPicPr>
+        <p:blipFill>
+          <a:blip r:embed="rId2"/>
+          <a:stretch>
+            <a:fillRect/>
+          </a:stretch>
+        </p:blipFill>
+        <p:spPr>
+          <a:xfrm>
+            <a:off x="6451047" y="1825625"/>
+            <a:ext cx="4623905" cy="4351338"/>
+          </a:xfrm>
+          <a:prstGeom prst="rect">
+            <a:avLst/>
+          </a:prstGeom>
+        </p:spPr>
+      </p:pic>
+    </p:spTree>
+    <p:extLst>
+      <p:ext uri="{BB962C8B-B14F-4D97-AF65-F5344CB8AC3E}">
+        <p14:creationId xmlns:p14="http://schemas.microsoft.com/office/powerpoint/2010/main" val="481779370"/>
+      </p:ext>
+    </p:extLst>
+  </p:cSld>
+  <p:clrMapOvr>
+    <a:masterClrMapping/>
+  </p:clrMapOvr>
+  <p:timing>
+    <p:tnLst>
+      <p:par>
+        <p:cTn id="1" dur="indefinite" restart="never" nodeType="tmRoot"/>
+      </p:par>
+    </p:tnLst>
+  </p:timing>
+</p:sld>
+</file>
+
+<file path=ppt/slides/slide19.xml><?xml version="1.0" encoding="utf-8"?>
+<p:sld xmlns:a="http://schemas.openxmlformats.org/drawingml/2006/main" xmlns:r="http://schemas.openxmlformats.org/officeDocument/2006/relationships" xmlns:p="http://schemas.openxmlformats.org/presentationml/2006/main">
+  <p:cSld>
+    <p:spTree>
+      <p:nvGrpSpPr>
+        <p:cNvPr id="1" name=""/>
+        <p:cNvGrpSpPr/>
+        <p:nvPr/>
+      </p:nvGrpSpPr>
+      <p:grpSpPr>
+        <a:xfrm>
+          <a:off x="0" y="0"/>
+          <a:ext cx="0" cy="0"/>
+          <a:chOff x="0" y="0"/>
+          <a:chExt cx="0" cy="0"/>
+        </a:xfrm>
+      </p:grpSpPr>
+      <p:sp>
+        <p:nvSpPr>
+          <p:cNvPr id="2" name="Title 1"/>
+          <p:cNvSpPr>
+            <a:spLocks noGrp="1"/>
+          </p:cNvSpPr>
+          <p:nvPr>
+            <p:ph type="title"/>
+          </p:nvPr>
+        </p:nvSpPr>
+        <p:spPr/>
+        <p:txBody>
+          <a:bodyPr/>
+          <a:lstStyle/>
+          <a:p>
+            <a:r>
+              <a:rPr lang="en-US" dirty="0" smtClean="0"/>
+              <a:t>Options</a:t>
+            </a:r>
+            <a:endParaRPr lang="en-US" dirty="0"/>
+          </a:p>
+        </p:txBody>
+      </p:sp>
+      <p:sp>
+        <p:nvSpPr>
+          <p:cNvPr id="3" name="Content Placeholder 2"/>
+          <p:cNvSpPr>
+            <a:spLocks noGrp="1"/>
+          </p:cNvSpPr>
+          <p:nvPr>
+            <p:ph sz="half" idx="1"/>
+          </p:nvPr>
+        </p:nvSpPr>
+        <p:spPr/>
+        <p:txBody>
+          <a:bodyPr>
+            <a:normAutofit lnSpcReduction="10000"/>
+          </a:bodyPr>
+          <a:lstStyle/>
+          <a:p>
+            <a:r>
+              <a:rPr lang="en-US" dirty="0" smtClean="0"/>
+              <a:t>Click “Options…”</a:t>
+            </a:r>
+          </a:p>
+          <a:p>
+            <a:r>
+              <a:rPr lang="en-US" dirty="0" smtClean="0"/>
+              <a:t>Get marginal means for all main effects and the three way interaction (the two-way interactions are less interesting)</a:t>
+            </a:r>
+          </a:p>
+          <a:p>
+            <a:r>
+              <a:rPr lang="en-US" dirty="0" smtClean="0"/>
+              <a:t>Get descriptive statistics and estimates of effect size</a:t>
+            </a:r>
+          </a:p>
+          <a:p>
+            <a:r>
+              <a:rPr lang="en-US" dirty="0" smtClean="0"/>
+              <a:t>Get homogeneity tests</a:t>
+            </a:r>
+          </a:p>
+          <a:p>
+            <a:r>
+              <a:rPr lang="en-US" dirty="0" smtClean="0"/>
+              <a:t>Click “Continue”</a:t>
+            </a:r>
+          </a:p>
+          <a:p>
+            <a:r>
+              <a:rPr lang="en-US" dirty="0" smtClean="0"/>
+              <a:t>Click “OK” to run the analysis.</a:t>
+            </a:r>
+            <a:endParaRPr lang="en-US" dirty="0"/>
+          </a:p>
+        </p:txBody>
+      </p:sp>
+      <p:pic>
+        <p:nvPicPr>
+          <p:cNvPr id="6" name="Content Placeholder 5"/>
+          <p:cNvPicPr>
+            <a:picLocks noGrp="1" noChangeAspect="1"/>
+          </p:cNvPicPr>
+          <p:nvPr>
+            <p:ph sz="half" idx="2"/>
+          </p:nvPr>
+        </p:nvPicPr>
+        <p:blipFill>
+          <a:blip r:embed="rId2"/>
+          <a:stretch>
+            <a:fillRect/>
+          </a:stretch>
+        </p:blipFill>
+        <p:spPr>
+          <a:xfrm>
+            <a:off x="6750399" y="1825625"/>
+            <a:ext cx="4025202" cy="4351338"/>
+          </a:xfrm>
+          <a:prstGeom prst="rect">
+            <a:avLst/>
+          </a:prstGeom>
+        </p:spPr>
+      </p:pic>
+    </p:spTree>
+    <p:extLst>
+      <p:ext uri="{BB962C8B-B14F-4D97-AF65-F5344CB8AC3E}">
+        <p14:creationId xmlns:p14="http://schemas.microsoft.com/office/powerpoint/2010/main" val="612478154"/>
+      </p:ext>
+    </p:extLst>
+  </p:cSld>
+  <p:clrMapOvr>
+    <a:masterClrMapping/>
+  </p:clrMapOvr>
+  <p:timing>
+    <p:tnLst>
+      <p:par>
+        <p:cTn id="1" dur="indefinite" restart="never" nodeType="tmRoot"/>
+      </p:par>
+    </p:tnLst>
+  </p:timing>
+</p:sld>
+</file>
+
 <file path=ppt/slides/slide2.xml><?xml version="1.0" encoding="utf-8"?>
 <p:sld xmlns:a="http://schemas.openxmlformats.org/drawingml/2006/main" xmlns:r="http://schemas.openxmlformats.org/officeDocument/2006/relationships" xmlns:p="http://schemas.openxmlformats.org/presentationml/2006/main">
   <p:cSld>
@@ -4464,303 +4514,6 @@
           <a:p>
             <a:r>
               <a:rPr lang="en-US" dirty="0" smtClean="0"/>
-              <a:t>Post-hoc comparisons</a:t>
-            </a:r>
-            <a:endParaRPr lang="en-US" dirty="0"/>
-          </a:p>
-        </p:txBody>
-      </p:sp>
-      <p:sp>
-        <p:nvSpPr>
-          <p:cNvPr id="3" name="Content Placeholder 2"/>
-          <p:cNvSpPr>
-            <a:spLocks noGrp="1"/>
-          </p:cNvSpPr>
-          <p:nvPr>
-            <p:ph sz="half" idx="1"/>
-          </p:nvPr>
-        </p:nvSpPr>
-        <p:spPr/>
-        <p:txBody>
-          <a:bodyPr>
-            <a:normAutofit lnSpcReduction="10000"/>
-          </a:bodyPr>
-          <a:lstStyle/>
-          <a:p>
-            <a:r>
-              <a:rPr lang="en-US" dirty="0" smtClean="0"/>
-              <a:t>Click “Post Hoc…”</a:t>
-            </a:r>
-          </a:p>
-          <a:p>
-            <a:r>
-              <a:rPr lang="en-US" dirty="0" smtClean="0"/>
-              <a:t>Note that only factors with 3 or more levels are shown in the post hoc window</a:t>
-            </a:r>
-          </a:p>
-          <a:p>
-            <a:r>
-              <a:rPr lang="en-US" dirty="0" smtClean="0"/>
-              <a:t>Select “</a:t>
-            </a:r>
-            <a:r>
-              <a:rPr lang="en-US" dirty="0" err="1" smtClean="0"/>
-              <a:t>breed_factor</a:t>
-            </a:r>
-            <a:r>
-              <a:rPr lang="en-US" dirty="0" smtClean="0"/>
-              <a:t>” and move it over to the “Post hoc tests for” field</a:t>
-            </a:r>
-          </a:p>
-          <a:p>
-            <a:r>
-              <a:rPr lang="en-US" dirty="0" smtClean="0"/>
-              <a:t>Select any tests you want, e.g. </a:t>
-            </a:r>
-            <a:r>
-              <a:rPr lang="en-US" dirty="0" err="1" smtClean="0"/>
-              <a:t>Bonferroni</a:t>
-            </a:r>
-            <a:r>
-              <a:rPr lang="en-US" dirty="0" smtClean="0"/>
-              <a:t> and </a:t>
-            </a:r>
-            <a:r>
-              <a:rPr lang="en-US" dirty="0" err="1" smtClean="0"/>
-              <a:t>Tukey</a:t>
-            </a:r>
-            <a:endParaRPr lang="en-US" dirty="0" smtClean="0"/>
-          </a:p>
-          <a:p>
-            <a:r>
-              <a:rPr lang="en-US" dirty="0" smtClean="0"/>
-              <a:t>Click “Continue”</a:t>
-            </a:r>
-            <a:endParaRPr lang="en-US" dirty="0"/>
-          </a:p>
-        </p:txBody>
-      </p:sp>
-      <p:pic>
-        <p:nvPicPr>
-          <p:cNvPr id="5" name="Content Placeholder 4"/>
-          <p:cNvPicPr>
-            <a:picLocks noGrp="1" noChangeAspect="1"/>
-          </p:cNvPicPr>
-          <p:nvPr>
-            <p:ph sz="half" idx="2"/>
-          </p:nvPr>
-        </p:nvPicPr>
-        <p:blipFill>
-          <a:blip r:embed="rId2"/>
-          <a:stretch>
-            <a:fillRect/>
-          </a:stretch>
-        </p:blipFill>
-        <p:spPr>
-          <a:xfrm>
-            <a:off x="6451047" y="1825625"/>
-            <a:ext cx="4623905" cy="4351338"/>
-          </a:xfrm>
-          <a:prstGeom prst="rect">
-            <a:avLst/>
-          </a:prstGeom>
-        </p:spPr>
-      </p:pic>
-    </p:spTree>
-    <p:extLst>
-      <p:ext uri="{BB962C8B-B14F-4D97-AF65-F5344CB8AC3E}">
-        <p14:creationId xmlns:p14="http://schemas.microsoft.com/office/powerpoint/2010/main" val="481779370"/>
-      </p:ext>
-    </p:extLst>
-  </p:cSld>
-  <p:clrMapOvr>
-    <a:masterClrMapping/>
-  </p:clrMapOvr>
-  <p:timing>
-    <p:tnLst>
-      <p:par>
-        <p:cTn id="1" dur="indefinite" restart="never" nodeType="tmRoot"/>
-      </p:par>
-    </p:tnLst>
-  </p:timing>
-</p:sld>
-</file>
-
-<file path=ppt/slides/slide21.xml><?xml version="1.0" encoding="utf-8"?>
-<p:sld xmlns:a="http://schemas.openxmlformats.org/drawingml/2006/main" xmlns:r="http://schemas.openxmlformats.org/officeDocument/2006/relationships" xmlns:p="http://schemas.openxmlformats.org/presentationml/2006/main">
-  <p:cSld>
-    <p:spTree>
-      <p:nvGrpSpPr>
-        <p:cNvPr id="1" name=""/>
-        <p:cNvGrpSpPr/>
-        <p:nvPr/>
-      </p:nvGrpSpPr>
-      <p:grpSpPr>
-        <a:xfrm>
-          <a:off x="0" y="0"/>
-          <a:ext cx="0" cy="0"/>
-          <a:chOff x="0" y="0"/>
-          <a:chExt cx="0" cy="0"/>
-        </a:xfrm>
-      </p:grpSpPr>
-      <p:sp>
-        <p:nvSpPr>
-          <p:cNvPr id="2" name="Title 1"/>
-          <p:cNvSpPr>
-            <a:spLocks noGrp="1"/>
-          </p:cNvSpPr>
-          <p:nvPr>
-            <p:ph type="title"/>
-          </p:nvPr>
-        </p:nvSpPr>
-        <p:spPr/>
-        <p:txBody>
-          <a:bodyPr/>
-          <a:lstStyle/>
-          <a:p>
-            <a:r>
-              <a:rPr lang="en-US" dirty="0" smtClean="0"/>
-              <a:t>Options</a:t>
-            </a:r>
-            <a:endParaRPr lang="en-US" dirty="0"/>
-          </a:p>
-        </p:txBody>
-      </p:sp>
-      <p:sp>
-        <p:nvSpPr>
-          <p:cNvPr id="3" name="Content Placeholder 2"/>
-          <p:cNvSpPr>
-            <a:spLocks noGrp="1"/>
-          </p:cNvSpPr>
-          <p:nvPr>
-            <p:ph sz="half" idx="1"/>
-          </p:nvPr>
-        </p:nvSpPr>
-        <p:spPr/>
-        <p:txBody>
-          <a:bodyPr>
-            <a:normAutofit lnSpcReduction="10000"/>
-          </a:bodyPr>
-          <a:lstStyle/>
-          <a:p>
-            <a:r>
-              <a:rPr lang="en-US" dirty="0" smtClean="0"/>
-              <a:t>Click “Options…”</a:t>
-            </a:r>
-          </a:p>
-          <a:p>
-            <a:r>
-              <a:rPr lang="en-US" dirty="0" smtClean="0"/>
-              <a:t>Get marginal means for all main effects and the three way interaction (the two-way interactions are less interesting)</a:t>
-            </a:r>
-          </a:p>
-          <a:p>
-            <a:r>
-              <a:rPr lang="en-US" dirty="0" smtClean="0"/>
-              <a:t>Get descriptive statistics and estimates of effect size</a:t>
-            </a:r>
-          </a:p>
-          <a:p>
-            <a:r>
-              <a:rPr lang="en-US" dirty="0" smtClean="0"/>
-              <a:t>Get homogeneity tests</a:t>
-            </a:r>
-          </a:p>
-          <a:p>
-            <a:r>
-              <a:rPr lang="en-US" dirty="0" smtClean="0"/>
-              <a:t>Click “Continue”</a:t>
-            </a:r>
-          </a:p>
-          <a:p>
-            <a:r>
-              <a:rPr lang="en-US" dirty="0" smtClean="0"/>
-              <a:t>Click “OK” to run the analysis.</a:t>
-            </a:r>
-            <a:endParaRPr lang="en-US" dirty="0"/>
-          </a:p>
-        </p:txBody>
-      </p:sp>
-      <p:pic>
-        <p:nvPicPr>
-          <p:cNvPr id="6" name="Content Placeholder 5"/>
-          <p:cNvPicPr>
-            <a:picLocks noGrp="1" noChangeAspect="1"/>
-          </p:cNvPicPr>
-          <p:nvPr>
-            <p:ph sz="half" idx="2"/>
-          </p:nvPr>
-        </p:nvPicPr>
-        <p:blipFill>
-          <a:blip r:embed="rId2"/>
-          <a:stretch>
-            <a:fillRect/>
-          </a:stretch>
-        </p:blipFill>
-        <p:spPr>
-          <a:xfrm>
-            <a:off x="6750399" y="1825625"/>
-            <a:ext cx="4025202" cy="4351338"/>
-          </a:xfrm>
-          <a:prstGeom prst="rect">
-            <a:avLst/>
-          </a:prstGeom>
-        </p:spPr>
-      </p:pic>
-    </p:spTree>
-    <p:extLst>
-      <p:ext uri="{BB962C8B-B14F-4D97-AF65-F5344CB8AC3E}">
-        <p14:creationId xmlns:p14="http://schemas.microsoft.com/office/powerpoint/2010/main" val="612478154"/>
-      </p:ext>
-    </p:extLst>
-  </p:cSld>
-  <p:clrMapOvr>
-    <a:masterClrMapping/>
-  </p:clrMapOvr>
-  <p:timing>
-    <p:tnLst>
-      <p:par>
-        <p:cTn id="1" dur="indefinite" restart="never" nodeType="tmRoot"/>
-      </p:par>
-    </p:tnLst>
-  </p:timing>
-</p:sld>
-</file>
-
-<file path=ppt/slides/slide22.xml><?xml version="1.0" encoding="utf-8"?>
-<p:sld xmlns:a="http://schemas.openxmlformats.org/drawingml/2006/main" xmlns:r="http://schemas.openxmlformats.org/officeDocument/2006/relationships" xmlns:p="http://schemas.openxmlformats.org/presentationml/2006/main">
-  <p:cSld>
-    <p:spTree>
-      <p:nvGrpSpPr>
-        <p:cNvPr id="1" name=""/>
-        <p:cNvGrpSpPr/>
-        <p:nvPr/>
-      </p:nvGrpSpPr>
-      <p:grpSpPr>
-        <a:xfrm>
-          <a:off x="0" y="0"/>
-          <a:ext cx="0" cy="0"/>
-          <a:chOff x="0" y="0"/>
-          <a:chExt cx="0" cy="0"/>
-        </a:xfrm>
-      </p:grpSpPr>
-      <p:sp>
-        <p:nvSpPr>
-          <p:cNvPr id="2" name="Title 1"/>
-          <p:cNvSpPr>
-            <a:spLocks noGrp="1"/>
-          </p:cNvSpPr>
-          <p:nvPr>
-            <p:ph type="title"/>
-          </p:nvPr>
-        </p:nvSpPr>
-        <p:spPr/>
-        <p:txBody>
-          <a:bodyPr/>
-          <a:lstStyle/>
-          <a:p>
-            <a:r>
-              <a:rPr lang="en-US" dirty="0" smtClean="0"/>
               <a:t>Output</a:t>
             </a:r>
             <a:endParaRPr lang="en-US" dirty="0"/>
@@ -4848,7 +4601,7 @@
 </p:sld>
 </file>
 
-<file path=ppt/slides/slide23.xml><?xml version="1.0" encoding="utf-8"?>
+<file path=ppt/slides/slide21.xml><?xml version="1.0" encoding="utf-8"?>
 <p:sld xmlns:a="http://schemas.openxmlformats.org/drawingml/2006/main" xmlns:r="http://schemas.openxmlformats.org/officeDocument/2006/relationships" xmlns:p="http://schemas.openxmlformats.org/presentationml/2006/main">
   <p:cSld>
     <p:spTree>
@@ -4983,7 +4736,7 @@
 </p:sld>
 </file>
 
-<file path=ppt/slides/slide24.xml><?xml version="1.0" encoding="utf-8"?>
+<file path=ppt/slides/slide22.xml><?xml version="1.0" encoding="utf-8"?>
 <p:sld xmlns:a="http://schemas.openxmlformats.org/drawingml/2006/main" xmlns:r="http://schemas.openxmlformats.org/officeDocument/2006/relationships" xmlns:p="http://schemas.openxmlformats.org/presentationml/2006/main">
   <p:cSld>
     <p:spTree>
@@ -5091,7 +4844,7 @@
 </p:sld>
 </file>
 
-<file path=ppt/slides/slide25.xml><?xml version="1.0" encoding="utf-8"?>
+<file path=ppt/slides/slide23.xml><?xml version="1.0" encoding="utf-8"?>
 <p:sld xmlns:a="http://schemas.openxmlformats.org/drawingml/2006/main" xmlns:r="http://schemas.openxmlformats.org/officeDocument/2006/relationships" xmlns:p="http://schemas.openxmlformats.org/presentationml/2006/main">
   <p:cSld>
     <p:spTree>
@@ -5217,7 +4970,7 @@
 </p:sld>
 </file>
 
-<file path=ppt/slides/slide26.xml><?xml version="1.0" encoding="utf-8"?>
+<file path=ppt/slides/slide24.xml><?xml version="1.0" encoding="utf-8"?>
 <p:sld xmlns:a="http://schemas.openxmlformats.org/drawingml/2006/main" xmlns:r="http://schemas.openxmlformats.org/officeDocument/2006/relationships" xmlns:p="http://schemas.openxmlformats.org/presentationml/2006/main">
   <p:cSld>
     <p:spTree>
@@ -5345,7 +5098,7 @@
 </p:sld>
 </file>
 
-<file path=ppt/slides/slide27.xml><?xml version="1.0" encoding="utf-8"?>
+<file path=ppt/slides/slide25.xml><?xml version="1.0" encoding="utf-8"?>
 <p:sld xmlns:a="http://schemas.openxmlformats.org/drawingml/2006/main" xmlns:r="http://schemas.openxmlformats.org/officeDocument/2006/relationships" xmlns:p="http://schemas.openxmlformats.org/presentationml/2006/main">
   <p:cSld>
     <p:spTree>
@@ -5501,7 +5254,7 @@
 </p:sld>
 </file>
 
-<file path=ppt/slides/slide28.xml><?xml version="1.0" encoding="utf-8"?>
+<file path=ppt/slides/slide26.xml><?xml version="1.0" encoding="utf-8"?>
 <p:sld xmlns:a="http://schemas.openxmlformats.org/drawingml/2006/main" xmlns:r="http://schemas.openxmlformats.org/officeDocument/2006/relationships" xmlns:p="http://schemas.openxmlformats.org/presentationml/2006/main">
   <p:cSld>
     <p:spTree>
@@ -5611,7 +5364,7 @@
           <a:graphicData uri="http://schemas.openxmlformats.org/presentationml/2006/ole">
             <mc:AlternateContent xmlns:mc="http://schemas.openxmlformats.org/markup-compatibility/2006">
               <mc:Choice xmlns:v="urn:schemas-microsoft-com:vml" Requires="v">
-                <p:oleObj spid="_x0000_s3086" r:id="rId3" imgW="27098280" imgH="15263280" progId="">
+                <p:oleObj spid="_x0000_s3089" r:id="rId3" imgW="27098280" imgH="15263280" progId="">
                   <p:embed/>
                 </p:oleObj>
               </mc:Choice>
@@ -5666,7 +5419,7 @@
 </p:sld>
 </file>
 
-<file path=ppt/slides/slide29.xml><?xml version="1.0" encoding="utf-8"?>
+<file path=ppt/slides/slide27.xml><?xml version="1.0" encoding="utf-8"?>
 <p:sld xmlns:a="http://schemas.openxmlformats.org/drawingml/2006/main" xmlns:r="http://schemas.openxmlformats.org/officeDocument/2006/relationships" xmlns:p="http://schemas.openxmlformats.org/presentationml/2006/main">
   <p:cSld>
     <p:spTree>
@@ -5779,6 +5532,264 @@
     <p:extLst>
       <p:ext uri="{BB962C8B-B14F-4D97-AF65-F5344CB8AC3E}">
         <p14:creationId xmlns:p14="http://schemas.microsoft.com/office/powerpoint/2010/main" val="1362976887"/>
+      </p:ext>
+    </p:extLst>
+  </p:cSld>
+  <p:clrMapOvr>
+    <a:masterClrMapping/>
+  </p:clrMapOvr>
+  <p:timing>
+    <p:tnLst>
+      <p:par>
+        <p:cTn id="1" dur="indefinite" restart="never" nodeType="tmRoot"/>
+      </p:par>
+    </p:tnLst>
+  </p:timing>
+</p:sld>
+</file>
+
+<file path=ppt/slides/slide28.xml><?xml version="1.0" encoding="utf-8"?>
+<p:sld xmlns:a="http://schemas.openxmlformats.org/drawingml/2006/main" xmlns:r="http://schemas.openxmlformats.org/officeDocument/2006/relationships" xmlns:p="http://schemas.openxmlformats.org/presentationml/2006/main">
+  <p:cSld>
+    <p:spTree>
+      <p:nvGrpSpPr>
+        <p:cNvPr id="1" name=""/>
+        <p:cNvGrpSpPr/>
+        <p:nvPr/>
+      </p:nvGrpSpPr>
+      <p:grpSpPr>
+        <a:xfrm>
+          <a:off x="0" y="0"/>
+          <a:ext cx="0" cy="0"/>
+          <a:chOff x="0" y="0"/>
+          <a:chExt cx="0" cy="0"/>
+        </a:xfrm>
+      </p:grpSpPr>
+      <p:sp>
+        <p:nvSpPr>
+          <p:cNvPr id="2" name="Title 1"/>
+          <p:cNvSpPr>
+            <a:spLocks noGrp="1"/>
+          </p:cNvSpPr>
+          <p:nvPr>
+            <p:ph type="title"/>
+          </p:nvPr>
+        </p:nvSpPr>
+        <p:spPr/>
+        <p:txBody>
+          <a:bodyPr/>
+          <a:lstStyle/>
+          <a:p>
+            <a:r>
+              <a:rPr lang="en-US" dirty="0" smtClean="0"/>
+              <a:t>Add error bars</a:t>
+            </a:r>
+            <a:endParaRPr lang="en-US" dirty="0"/>
+          </a:p>
+        </p:txBody>
+      </p:sp>
+      <p:sp>
+        <p:nvSpPr>
+          <p:cNvPr id="3" name="Content Placeholder 2"/>
+          <p:cNvSpPr>
+            <a:spLocks noGrp="1"/>
+          </p:cNvSpPr>
+          <p:nvPr>
+            <p:ph sz="half" idx="1"/>
+          </p:nvPr>
+        </p:nvSpPr>
+        <p:spPr/>
+        <p:txBody>
+          <a:bodyPr/>
+          <a:lstStyle/>
+          <a:p>
+            <a:r>
+              <a:rPr lang="en-US" dirty="0" smtClean="0"/>
+              <a:t>Click “Options…”</a:t>
+            </a:r>
+          </a:p>
+          <a:p>
+            <a:r>
+              <a:rPr lang="en-US" dirty="0" smtClean="0"/>
+              <a:t>Check “Display error bars”</a:t>
+            </a:r>
+          </a:p>
+          <a:p>
+            <a:r>
+              <a:rPr lang="en-US" dirty="0" smtClean="0"/>
+              <a:t>The default setting (95% CI) is what we want.</a:t>
+            </a:r>
+          </a:p>
+          <a:p>
+            <a:r>
+              <a:rPr lang="en-US" dirty="0" smtClean="0"/>
+              <a:t>Click “Continue”</a:t>
+            </a:r>
+          </a:p>
+          <a:p>
+            <a:pPr marL="0" indent="0">
+              <a:buNone/>
+            </a:pPr>
+            <a:endParaRPr lang="en-US" dirty="0"/>
+          </a:p>
+        </p:txBody>
+      </p:sp>
+      <p:pic>
+        <p:nvPicPr>
+          <p:cNvPr id="6" name="Content Placeholder 5"/>
+          <p:cNvPicPr>
+            <a:picLocks noGrp="1" noChangeAspect="1"/>
+          </p:cNvPicPr>
+          <p:nvPr>
+            <p:ph sz="half" idx="2"/>
+          </p:nvPr>
+        </p:nvPicPr>
+        <p:blipFill>
+          <a:blip r:embed="rId2"/>
+          <a:stretch>
+            <a:fillRect/>
+          </a:stretch>
+        </p:blipFill>
+        <p:spPr>
+          <a:xfrm>
+            <a:off x="7309324" y="1825625"/>
+            <a:ext cx="2907352" cy="4351338"/>
+          </a:xfrm>
+          <a:prstGeom prst="rect">
+            <a:avLst/>
+          </a:prstGeom>
+        </p:spPr>
+      </p:pic>
+    </p:spTree>
+    <p:extLst>
+      <p:ext uri="{BB962C8B-B14F-4D97-AF65-F5344CB8AC3E}">
+        <p14:creationId xmlns:p14="http://schemas.microsoft.com/office/powerpoint/2010/main" val="4259224393"/>
+      </p:ext>
+    </p:extLst>
+  </p:cSld>
+  <p:clrMapOvr>
+    <a:masterClrMapping/>
+  </p:clrMapOvr>
+  <p:timing>
+    <p:tnLst>
+      <p:par>
+        <p:cTn id="1" dur="indefinite" restart="never" nodeType="tmRoot"/>
+      </p:par>
+    </p:tnLst>
+  </p:timing>
+</p:sld>
+</file>
+
+<file path=ppt/slides/slide29.xml><?xml version="1.0" encoding="utf-8"?>
+<p:sld xmlns:a="http://schemas.openxmlformats.org/drawingml/2006/main" xmlns:r="http://schemas.openxmlformats.org/officeDocument/2006/relationships" xmlns:p="http://schemas.openxmlformats.org/presentationml/2006/main">
+  <p:cSld>
+    <p:spTree>
+      <p:nvGrpSpPr>
+        <p:cNvPr id="1" name=""/>
+        <p:cNvGrpSpPr/>
+        <p:nvPr/>
+      </p:nvGrpSpPr>
+      <p:grpSpPr>
+        <a:xfrm>
+          <a:off x="0" y="0"/>
+          <a:ext cx="0" cy="0"/>
+          <a:chOff x="0" y="0"/>
+          <a:chExt cx="0" cy="0"/>
+        </a:xfrm>
+      </p:grpSpPr>
+      <p:sp>
+        <p:nvSpPr>
+          <p:cNvPr id="2" name="Title 1"/>
+          <p:cNvSpPr>
+            <a:spLocks noGrp="1"/>
+          </p:cNvSpPr>
+          <p:nvPr>
+            <p:ph type="title"/>
+          </p:nvPr>
+        </p:nvSpPr>
+        <p:spPr/>
+        <p:txBody>
+          <a:bodyPr/>
+          <a:lstStyle/>
+          <a:p>
+            <a:r>
+              <a:rPr lang="en-US" dirty="0" smtClean="0"/>
+              <a:t>Final touches</a:t>
+            </a:r>
+            <a:endParaRPr lang="en-US" dirty="0"/>
+          </a:p>
+        </p:txBody>
+      </p:sp>
+      <p:sp>
+        <p:nvSpPr>
+          <p:cNvPr id="3" name="Content Placeholder 2"/>
+          <p:cNvSpPr>
+            <a:spLocks noGrp="1"/>
+          </p:cNvSpPr>
+          <p:nvPr>
+            <p:ph sz="half" idx="1"/>
+          </p:nvPr>
+        </p:nvSpPr>
+        <p:spPr/>
+        <p:txBody>
+          <a:bodyPr/>
+          <a:lstStyle/>
+          <a:p>
+            <a:r>
+              <a:rPr lang="en-US" dirty="0" smtClean="0"/>
+              <a:t>Double-click the resulting graph to open it in the chart editor</a:t>
+            </a:r>
+          </a:p>
+          <a:p>
+            <a:r>
+              <a:rPr lang="en-US" dirty="0" smtClean="0"/>
+              <a:t>Double-click axis and legend labels to edit them and make them look nice</a:t>
+            </a:r>
+          </a:p>
+          <a:p>
+            <a:r>
+              <a:rPr lang="en-US" dirty="0" smtClean="0"/>
+              <a:t>There we go!</a:t>
+            </a:r>
+          </a:p>
+          <a:p>
+            <a:pPr marL="0" indent="0">
+              <a:buNone/>
+            </a:pPr>
+            <a:endParaRPr lang="en-US" dirty="0"/>
+          </a:p>
+        </p:txBody>
+      </p:sp>
+      <p:pic>
+        <p:nvPicPr>
+          <p:cNvPr id="5" name="Content Placeholder 4"/>
+          <p:cNvPicPr>
+            <a:picLocks noGrp="1" noChangeAspect="1"/>
+          </p:cNvPicPr>
+          <p:nvPr>
+            <p:ph sz="half" idx="2"/>
+          </p:nvPr>
+        </p:nvPicPr>
+        <p:blipFill>
+          <a:blip r:embed="rId2"/>
+          <a:stretch>
+            <a:fillRect/>
+          </a:stretch>
+        </p:blipFill>
+        <p:spPr>
+          <a:xfrm>
+            <a:off x="6172200" y="1925359"/>
+            <a:ext cx="5181600" cy="4151870"/>
+          </a:xfrm>
+          <a:prstGeom prst="rect">
+            <a:avLst/>
+          </a:prstGeom>
+        </p:spPr>
+      </p:pic>
+    </p:spTree>
+    <p:extLst>
+      <p:ext uri="{BB962C8B-B14F-4D97-AF65-F5344CB8AC3E}">
+        <p14:creationId xmlns:p14="http://schemas.microsoft.com/office/powerpoint/2010/main" val="3881427018"/>
       </p:ext>
     </p:extLst>
   </p:cSld>
@@ -5936,264 +5947,6 @@
           <a:p>
             <a:r>
               <a:rPr lang="en-US" dirty="0" smtClean="0"/>
-              <a:t>Add error bars</a:t>
-            </a:r>
-            <a:endParaRPr lang="en-US" dirty="0"/>
-          </a:p>
-        </p:txBody>
-      </p:sp>
-      <p:sp>
-        <p:nvSpPr>
-          <p:cNvPr id="3" name="Content Placeholder 2"/>
-          <p:cNvSpPr>
-            <a:spLocks noGrp="1"/>
-          </p:cNvSpPr>
-          <p:nvPr>
-            <p:ph sz="half" idx="1"/>
-          </p:nvPr>
-        </p:nvSpPr>
-        <p:spPr/>
-        <p:txBody>
-          <a:bodyPr/>
-          <a:lstStyle/>
-          <a:p>
-            <a:r>
-              <a:rPr lang="en-US" dirty="0" smtClean="0"/>
-              <a:t>Click “Options…”</a:t>
-            </a:r>
-          </a:p>
-          <a:p>
-            <a:r>
-              <a:rPr lang="en-US" dirty="0" smtClean="0"/>
-              <a:t>Check “Display error bars”</a:t>
-            </a:r>
-          </a:p>
-          <a:p>
-            <a:r>
-              <a:rPr lang="en-US" dirty="0" smtClean="0"/>
-              <a:t>The default setting (95% CI) is what we want.</a:t>
-            </a:r>
-          </a:p>
-          <a:p>
-            <a:r>
-              <a:rPr lang="en-US" dirty="0" smtClean="0"/>
-              <a:t>Click “Continue”</a:t>
-            </a:r>
-          </a:p>
-          <a:p>
-            <a:pPr marL="0" indent="0">
-              <a:buNone/>
-            </a:pPr>
-            <a:endParaRPr lang="en-US" dirty="0"/>
-          </a:p>
-        </p:txBody>
-      </p:sp>
-      <p:pic>
-        <p:nvPicPr>
-          <p:cNvPr id="6" name="Content Placeholder 5"/>
-          <p:cNvPicPr>
-            <a:picLocks noGrp="1" noChangeAspect="1"/>
-          </p:cNvPicPr>
-          <p:nvPr>
-            <p:ph sz="half" idx="2"/>
-          </p:nvPr>
-        </p:nvPicPr>
-        <p:blipFill>
-          <a:blip r:embed="rId2"/>
-          <a:stretch>
-            <a:fillRect/>
-          </a:stretch>
-        </p:blipFill>
-        <p:spPr>
-          <a:xfrm>
-            <a:off x="7309324" y="1825625"/>
-            <a:ext cx="2907352" cy="4351338"/>
-          </a:xfrm>
-          <a:prstGeom prst="rect">
-            <a:avLst/>
-          </a:prstGeom>
-        </p:spPr>
-      </p:pic>
-    </p:spTree>
-    <p:extLst>
-      <p:ext uri="{BB962C8B-B14F-4D97-AF65-F5344CB8AC3E}">
-        <p14:creationId xmlns:p14="http://schemas.microsoft.com/office/powerpoint/2010/main" val="4259224393"/>
-      </p:ext>
-    </p:extLst>
-  </p:cSld>
-  <p:clrMapOvr>
-    <a:masterClrMapping/>
-  </p:clrMapOvr>
-  <p:timing>
-    <p:tnLst>
-      <p:par>
-        <p:cTn id="1" dur="indefinite" restart="never" nodeType="tmRoot"/>
-      </p:par>
-    </p:tnLst>
-  </p:timing>
-</p:sld>
-</file>
-
-<file path=ppt/slides/slide31.xml><?xml version="1.0" encoding="utf-8"?>
-<p:sld xmlns:a="http://schemas.openxmlformats.org/drawingml/2006/main" xmlns:r="http://schemas.openxmlformats.org/officeDocument/2006/relationships" xmlns:p="http://schemas.openxmlformats.org/presentationml/2006/main">
-  <p:cSld>
-    <p:spTree>
-      <p:nvGrpSpPr>
-        <p:cNvPr id="1" name=""/>
-        <p:cNvGrpSpPr/>
-        <p:nvPr/>
-      </p:nvGrpSpPr>
-      <p:grpSpPr>
-        <a:xfrm>
-          <a:off x="0" y="0"/>
-          <a:ext cx="0" cy="0"/>
-          <a:chOff x="0" y="0"/>
-          <a:chExt cx="0" cy="0"/>
-        </a:xfrm>
-      </p:grpSpPr>
-      <p:sp>
-        <p:nvSpPr>
-          <p:cNvPr id="2" name="Title 1"/>
-          <p:cNvSpPr>
-            <a:spLocks noGrp="1"/>
-          </p:cNvSpPr>
-          <p:nvPr>
-            <p:ph type="title"/>
-          </p:nvPr>
-        </p:nvSpPr>
-        <p:spPr/>
-        <p:txBody>
-          <a:bodyPr/>
-          <a:lstStyle/>
-          <a:p>
-            <a:r>
-              <a:rPr lang="en-US" dirty="0" smtClean="0"/>
-              <a:t>Final touches</a:t>
-            </a:r>
-            <a:endParaRPr lang="en-US" dirty="0"/>
-          </a:p>
-        </p:txBody>
-      </p:sp>
-      <p:sp>
-        <p:nvSpPr>
-          <p:cNvPr id="3" name="Content Placeholder 2"/>
-          <p:cNvSpPr>
-            <a:spLocks noGrp="1"/>
-          </p:cNvSpPr>
-          <p:nvPr>
-            <p:ph sz="half" idx="1"/>
-          </p:nvPr>
-        </p:nvSpPr>
-        <p:spPr/>
-        <p:txBody>
-          <a:bodyPr/>
-          <a:lstStyle/>
-          <a:p>
-            <a:r>
-              <a:rPr lang="en-US" dirty="0" smtClean="0"/>
-              <a:t>Double-click the resulting graph to open it in the chart editor</a:t>
-            </a:r>
-          </a:p>
-          <a:p>
-            <a:r>
-              <a:rPr lang="en-US" dirty="0" smtClean="0"/>
-              <a:t>Double-click axis and legend labels to edit them and make them look nice</a:t>
-            </a:r>
-          </a:p>
-          <a:p>
-            <a:r>
-              <a:rPr lang="en-US" dirty="0" smtClean="0"/>
-              <a:t>There we go!</a:t>
-            </a:r>
-          </a:p>
-          <a:p>
-            <a:pPr marL="0" indent="0">
-              <a:buNone/>
-            </a:pPr>
-            <a:endParaRPr lang="en-US" dirty="0"/>
-          </a:p>
-        </p:txBody>
-      </p:sp>
-      <p:pic>
-        <p:nvPicPr>
-          <p:cNvPr id="5" name="Content Placeholder 4"/>
-          <p:cNvPicPr>
-            <a:picLocks noGrp="1" noChangeAspect="1"/>
-          </p:cNvPicPr>
-          <p:nvPr>
-            <p:ph sz="half" idx="2"/>
-          </p:nvPr>
-        </p:nvPicPr>
-        <p:blipFill>
-          <a:blip r:embed="rId2"/>
-          <a:stretch>
-            <a:fillRect/>
-          </a:stretch>
-        </p:blipFill>
-        <p:spPr>
-          <a:xfrm>
-            <a:off x="6172200" y="1925359"/>
-            <a:ext cx="5181600" cy="4151870"/>
-          </a:xfrm>
-          <a:prstGeom prst="rect">
-            <a:avLst/>
-          </a:prstGeom>
-        </p:spPr>
-      </p:pic>
-    </p:spTree>
-    <p:extLst>
-      <p:ext uri="{BB962C8B-B14F-4D97-AF65-F5344CB8AC3E}">
-        <p14:creationId xmlns:p14="http://schemas.microsoft.com/office/powerpoint/2010/main" val="3881427018"/>
-      </p:ext>
-    </p:extLst>
-  </p:cSld>
-  <p:clrMapOvr>
-    <a:masterClrMapping/>
-  </p:clrMapOvr>
-  <p:timing>
-    <p:tnLst>
-      <p:par>
-        <p:cTn id="1" dur="indefinite" restart="never" nodeType="tmRoot"/>
-      </p:par>
-    </p:tnLst>
-  </p:timing>
-</p:sld>
-</file>
-
-<file path=ppt/slides/slide32.xml><?xml version="1.0" encoding="utf-8"?>
-<p:sld xmlns:a="http://schemas.openxmlformats.org/drawingml/2006/main" xmlns:r="http://schemas.openxmlformats.org/officeDocument/2006/relationships" xmlns:p="http://schemas.openxmlformats.org/presentationml/2006/main">
-  <p:cSld>
-    <p:spTree>
-      <p:nvGrpSpPr>
-        <p:cNvPr id="1" name=""/>
-        <p:cNvGrpSpPr/>
-        <p:nvPr/>
-      </p:nvGrpSpPr>
-      <p:grpSpPr>
-        <a:xfrm>
-          <a:off x="0" y="0"/>
-          <a:ext cx="0" cy="0"/>
-          <a:chOff x="0" y="0"/>
-          <a:chExt cx="0" cy="0"/>
-        </a:xfrm>
-      </p:grpSpPr>
-      <p:sp>
-        <p:nvSpPr>
-          <p:cNvPr id="2" name="Title 1"/>
-          <p:cNvSpPr>
-            <a:spLocks noGrp="1"/>
-          </p:cNvSpPr>
-          <p:nvPr>
-            <p:ph type="title"/>
-          </p:nvPr>
-        </p:nvSpPr>
-        <p:spPr/>
-        <p:txBody>
-          <a:bodyPr/>
-          <a:lstStyle/>
-          <a:p>
-            <a:r>
-              <a:rPr lang="en-US" dirty="0" smtClean="0"/>
               <a:t>The hypothesis tests</a:t>
             </a:r>
             <a:endParaRPr lang="en-US" dirty="0"/>
@@ -6349,7 +6102,7 @@
 </p:sld>
 </file>
 
-<file path=ppt/slides/slide33.xml><?xml version="1.0" encoding="utf-8"?>
+<file path=ppt/slides/slide31.xml><?xml version="1.0" encoding="utf-8"?>
 <p:sld xmlns:a="http://schemas.openxmlformats.org/drawingml/2006/main" xmlns:r="http://schemas.openxmlformats.org/officeDocument/2006/relationships" xmlns:p="http://schemas.openxmlformats.org/presentationml/2006/main">
   <p:cSld>
     <p:spTree>
@@ -6487,7 +6240,7 @@
 </p:sld>
 </file>
 
-<file path=ppt/slides/slide34.xml><?xml version="1.0" encoding="utf-8"?>
+<file path=ppt/slides/slide32.xml><?xml version="1.0" encoding="utf-8"?>
 <p:sld xmlns:a="http://schemas.openxmlformats.org/drawingml/2006/main" xmlns:r="http://schemas.openxmlformats.org/officeDocument/2006/relationships" xmlns:p="http://schemas.openxmlformats.org/presentationml/2006/main">
   <p:cSld>
     <p:spTree>
@@ -6638,12 +6391,16 @@
                     <m:sSubSup>
                       <m:sSubSupPr>
                         <m:ctrlPr>
-                          <a:rPr lang="en-US" i="1"/>
+                          <a:rPr lang="en-US" i="1">
+                            <a:latin typeface="Cambria Math"/>
+                          </a:rPr>
                         </m:ctrlPr>
                       </m:sSubSupPr>
                       <m:e>
                         <m:r>
-                          <a:rPr lang="en-US" i="1"/>
+                          <a:rPr lang="en-US" i="1">
+                            <a:latin typeface="Cambria Math"/>
+                          </a:rPr>
                           <m:t>𝜂</m:t>
                         </m:r>
                       </m:e>
@@ -6657,7 +6414,9 @@
                       </m:sub>
                       <m:sup>
                         <m:r>
-                          <a:rPr lang="en-US" i="1"/>
+                          <a:rPr lang="en-US" i="1">
+                            <a:latin typeface="Cambria Math"/>
+                          </a:rPr>
                           <m:t>2</m:t>
                         </m:r>
                       </m:sup>
@@ -6666,7 +6425,11 @@
                 </a14:m>
                 <a:r>
                   <a:rPr lang="en-US" dirty="0"/>
-                  <a:t> = 0.01, </a:t>
+                  <a:t> = </a:t>
+                </a:r>
+                <a:r>
+                  <a:rPr lang="en-US" dirty="0" smtClean="0"/>
+                  <a:t>0.19, </a:t>
                 </a:r>
                 <a:r>
                   <a:rPr lang="en-US" i="1" dirty="0"/>
@@ -6702,10 +6465,10 @@
               </p:nvPr>
             </p:nvSpPr>
             <p:spPr>
-              <a:blipFill rotWithShape="0">
+              <a:blipFill rotWithShape="1">
                 <a:blip r:embed="rId2"/>
                 <a:stretch>
-                  <a:fillRect l="-1882" t="-3501" r="-471"/>
+                  <a:fillRect l="-1882" t="-3501" r="-588"/>
                 </a:stretch>
               </a:blipFill>
             </p:spPr>
@@ -6714,290 +6477,7 @@
               <a:lstStyle/>
               <a:p>
                 <a:r>
-                  <a:rPr lang="en-US">
-                    <a:noFill/>
-                  </a:rPr>
-                  <a:t> </a:t>
-                </a:r>
-              </a:p>
-            </p:txBody>
-          </p:sp>
-        </mc:Fallback>
-      </mc:AlternateContent>
-      <p:pic>
-        <p:nvPicPr>
-          <p:cNvPr id="6" name="Content Placeholder 5"/>
-          <p:cNvPicPr>
-            <a:picLocks noGrp="1" noChangeAspect="1"/>
-          </p:cNvPicPr>
-          <p:nvPr>
-            <p:ph sz="half" idx="2"/>
-          </p:nvPr>
-        </p:nvPicPr>
-        <p:blipFill>
-          <a:blip r:embed="rId3"/>
-          <a:stretch>
-            <a:fillRect/>
-          </a:stretch>
-        </p:blipFill>
-        <p:spPr>
-          <a:xfrm>
-            <a:off x="6172200" y="3077889"/>
-            <a:ext cx="5181600" cy="1846809"/>
-          </a:xfrm>
-          <a:prstGeom prst="rect">
-            <a:avLst/>
-          </a:prstGeom>
-        </p:spPr>
-      </p:pic>
-    </p:spTree>
-    <p:extLst>
-      <p:ext uri="{BB962C8B-B14F-4D97-AF65-F5344CB8AC3E}">
-        <p14:creationId xmlns:p14="http://schemas.microsoft.com/office/powerpoint/2010/main" val="1140283491"/>
-      </p:ext>
-    </p:extLst>
-  </p:cSld>
-  <p:clrMapOvr>
-    <a:masterClrMapping/>
-  </p:clrMapOvr>
-  <p:timing>
-    <p:tnLst>
-      <p:par>
-        <p:cTn id="1" dur="indefinite" restart="never" nodeType="tmRoot"/>
-      </p:par>
-    </p:tnLst>
-  </p:timing>
-</p:sld>
-</file>
-
-<file path=ppt/slides/slide35.xml><?xml version="1.0" encoding="utf-8"?>
-<p:sld xmlns:a="http://schemas.openxmlformats.org/drawingml/2006/main" xmlns:r="http://schemas.openxmlformats.org/officeDocument/2006/relationships" xmlns:p="http://schemas.openxmlformats.org/presentationml/2006/main">
-  <p:cSld>
-    <p:spTree>
-      <p:nvGrpSpPr>
-        <p:cNvPr id="1" name=""/>
-        <p:cNvGrpSpPr/>
-        <p:nvPr/>
-      </p:nvGrpSpPr>
-      <p:grpSpPr>
-        <a:xfrm>
-          <a:off x="0" y="0"/>
-          <a:ext cx="0" cy="0"/>
-          <a:chOff x="0" y="0"/>
-          <a:chExt cx="0" cy="0"/>
-        </a:xfrm>
-      </p:grpSpPr>
-      <p:sp>
-        <p:nvSpPr>
-          <p:cNvPr id="2" name="Title 1"/>
-          <p:cNvSpPr>
-            <a:spLocks noGrp="1"/>
-          </p:cNvSpPr>
-          <p:nvPr>
-            <p:ph type="title"/>
-          </p:nvPr>
-        </p:nvSpPr>
-        <p:spPr/>
-        <p:txBody>
-          <a:bodyPr/>
-          <a:lstStyle/>
-          <a:p>
-            <a:r>
-              <a:rPr lang="en-US" dirty="0" smtClean="0"/>
-              <a:t>The hypothesis tests</a:t>
-            </a:r>
-            <a:endParaRPr lang="en-US" dirty="0"/>
-          </a:p>
-        </p:txBody>
-      </p:sp>
-      <mc:AlternateContent xmlns:mc="http://schemas.openxmlformats.org/markup-compatibility/2006">
-        <mc:Choice xmlns:a14="http://schemas.microsoft.com/office/drawing/2010/main" Requires="a14">
-          <p:sp>
-            <p:nvSpPr>
-              <p:cNvPr id="3" name="Content Placeholder 2"/>
-              <p:cNvSpPr>
-                <a:spLocks noGrp="1"/>
-              </p:cNvSpPr>
-              <p:nvPr>
-                <p:ph sz="half" idx="1"/>
-              </p:nvPr>
-            </p:nvSpPr>
-            <p:spPr/>
-            <p:txBody>
-              <a:bodyPr>
-                <a:normAutofit fontScale="92500" lnSpcReduction="20000"/>
-              </a:bodyPr>
-              <a:lstStyle/>
-              <a:p>
-                <a:r>
-                  <a:rPr lang="en-US" dirty="0" smtClean="0"/>
-                  <a:t>Note down:</a:t>
-                </a:r>
-              </a:p>
-              <a:p>
-                <a:pPr lvl="1"/>
-                <a:r>
-                  <a:rPr lang="en-US" dirty="0" err="1" smtClean="0"/>
-                  <a:t>df</a:t>
-                </a:r>
-                <a:r>
-                  <a:rPr lang="en-US" dirty="0" smtClean="0"/>
-                  <a:t> numerator (</a:t>
-                </a:r>
-                <a:r>
-                  <a:rPr lang="en-US" dirty="0" err="1" smtClean="0"/>
-                  <a:t>df</a:t>
-                </a:r>
-                <a:r>
-                  <a:rPr lang="en-US" dirty="0" smtClean="0"/>
-                  <a:t> effect)</a:t>
-                </a:r>
-              </a:p>
-              <a:p>
-                <a:pPr lvl="1"/>
-                <a:r>
-                  <a:rPr lang="en-US" dirty="0" err="1" smtClean="0"/>
-                  <a:t>df</a:t>
-                </a:r>
-                <a:r>
-                  <a:rPr lang="en-US" dirty="0" smtClean="0"/>
-                  <a:t> denominator (</a:t>
-                </a:r>
-                <a:r>
-                  <a:rPr lang="en-US" dirty="0" err="1" smtClean="0"/>
-                  <a:t>df</a:t>
-                </a:r>
-                <a:r>
-                  <a:rPr lang="en-US" dirty="0" smtClean="0"/>
-                  <a:t> error)</a:t>
-                </a:r>
-              </a:p>
-              <a:p>
-                <a:pPr lvl="1"/>
-                <a:r>
-                  <a:rPr lang="en-US" dirty="0" smtClean="0"/>
-                  <a:t>F-value</a:t>
-                </a:r>
-              </a:p>
-              <a:p>
-                <a:pPr lvl="1"/>
-                <a:r>
-                  <a:rPr lang="en-US" dirty="0" smtClean="0"/>
-                  <a:t>p-value</a:t>
-                </a:r>
-              </a:p>
-              <a:p>
-                <a:pPr lvl="1"/>
-                <a:r>
-                  <a:rPr lang="en-US" dirty="0" smtClean="0"/>
-                  <a:t>Partial Eta squared</a:t>
-                </a:r>
-              </a:p>
-              <a:p>
-                <a:r>
-                  <a:rPr lang="en-US" dirty="0" smtClean="0"/>
-                  <a:t>Then report them like this in the text:</a:t>
-                </a:r>
-              </a:p>
-              <a:p>
-                <a:r>
-                  <a:rPr lang="en-US" dirty="0" smtClean="0"/>
-                  <a:t>There was a significant effect of beef, </a:t>
-                </a:r>
-                <a:r>
-                  <a:rPr lang="en-US" i="1" dirty="0"/>
-                  <a:t>F</a:t>
-                </a:r>
-                <a:r>
-                  <a:rPr lang="en-US" dirty="0"/>
-                  <a:t>(1, 36) = </a:t>
-                </a:r>
-                <a:r>
-                  <a:rPr lang="en-US" dirty="0" smtClean="0"/>
-                  <a:t>8.63, </a:t>
-                </a:r>
-                <a14:m>
-                  <m:oMath xmlns:m="http://schemas.openxmlformats.org/officeDocument/2006/math">
-                    <m:sSubSup>
-                      <m:sSubSupPr>
-                        <m:ctrlPr>
-                          <a:rPr lang="en-US" i="1"/>
-                        </m:ctrlPr>
-                      </m:sSubSupPr>
-                      <m:e>
-                        <m:r>
-                          <a:rPr lang="en-US" i="1"/>
-                          <m:t>𝜂</m:t>
-                        </m:r>
-                      </m:e>
-                      <m:sub>
-                        <m:r>
-                          <a:rPr lang="en-US" b="0" i="1" smtClean="0">
-                            <a:latin typeface="Cambria Math" panose="02040503050406030204" pitchFamily="18" charset="0"/>
-                          </a:rPr>
-                          <m:t>𝑃</m:t>
-                        </m:r>
-                      </m:sub>
-                      <m:sup>
-                        <m:r>
-                          <a:rPr lang="en-US" i="1"/>
-                          <m:t>2</m:t>
-                        </m:r>
-                      </m:sup>
-                    </m:sSubSup>
-                  </m:oMath>
-                </a14:m>
-                <a:r>
-                  <a:rPr lang="en-US" dirty="0"/>
-                  <a:t> = 0.01, </a:t>
-                </a:r>
-                <a:r>
-                  <a:rPr lang="en-US" i="1" dirty="0"/>
-                  <a:t>p</a:t>
-                </a:r>
-                <a:r>
-                  <a:rPr lang="en-US" dirty="0"/>
-                  <a:t> &lt; .</a:t>
-                </a:r>
-                <a:r>
-                  <a:rPr lang="en-US" dirty="0" smtClean="0"/>
-                  <a:t>01.</a:t>
-                </a:r>
-              </a:p>
-              <a:p>
-                <a:r>
-                  <a:rPr lang="en-US" dirty="0" smtClean="0"/>
-                  <a:t>Do this for every significant factor. </a:t>
-                </a:r>
-              </a:p>
-            </p:txBody>
-          </p:sp>
-        </mc:Choice>
-        <mc:Fallback>
-          <p:sp>
-            <p:nvSpPr>
-              <p:cNvPr id="3" name="Content Placeholder 2"/>
-              <p:cNvSpPr>
-                <a:spLocks noGrp="1" noRot="1" noChangeAspect="1" noMove="1" noResize="1" noEditPoints="1" noAdjustHandles="1" noChangeArrowheads="1" noChangeShapeType="1" noTextEdit="1"/>
-              </p:cNvSpPr>
-              <p:nvPr>
-                <p:ph sz="half" idx="1"/>
-              </p:nvPr>
-            </p:nvSpPr>
-            <p:spPr>
-              <a:blipFill rotWithShape="0">
-                <a:blip r:embed="rId2"/>
-                <a:stretch>
-                  <a:fillRect l="-1882" t="-3501" r="-471"/>
-                </a:stretch>
-              </a:blipFill>
-            </p:spPr>
-            <p:txBody>
-              <a:bodyPr/>
-              <a:lstStyle/>
-              <a:p>
-                <a:r>
-                  <a:rPr lang="en-US">
+                  <a:rPr lang="en-GB">
                     <a:noFill/>
                   </a:rPr>
                   <a:t> </a:t>
@@ -7053,7 +6533,7 @@
 </p:sld>
 </file>
 
-<file path=ppt/slides/slide36.xml><?xml version="1.0" encoding="utf-8"?>
+<file path=ppt/slides/slide33.xml><?xml version="1.0" encoding="utf-8"?>
 <p:sld xmlns:a="http://schemas.openxmlformats.org/drawingml/2006/main" xmlns:r="http://schemas.openxmlformats.org/officeDocument/2006/relationships" xmlns:p="http://schemas.openxmlformats.org/presentationml/2006/main">
   <p:cSld>
     <p:spTree>
@@ -7093,8 +6573,8 @@
           </a:p>
         </p:txBody>
       </p:sp>
-      <mc:AlternateContent xmlns:mc="http://schemas.openxmlformats.org/markup-compatibility/2006">
-        <mc:Choice xmlns:a14="http://schemas.microsoft.com/office/drawing/2010/main" Requires="a14">
+      <mc:AlternateContent xmlns:mc="http://schemas.openxmlformats.org/markup-compatibility/2006" xmlns:a14="http://schemas.microsoft.com/office/drawing/2010/main">
+        <mc:Choice Requires="a14">
           <p:sp>
             <p:nvSpPr>
               <p:cNvPr id="3" name="Content Placeholder 2"/>
@@ -7139,12 +6619,16 @@
                     <m:sSubSup>
                       <m:sSubSupPr>
                         <m:ctrlPr>
-                          <a:rPr lang="en-US" i="1"/>
+                          <a:rPr lang="en-US" i="1">
+                            <a:latin typeface="Cambria Math"/>
+                          </a:rPr>
                         </m:ctrlPr>
                       </m:sSubSupPr>
                       <m:e>
                         <m:r>
-                          <a:rPr lang="en-US" i="1"/>
+                          <a:rPr lang="en-US" i="1">
+                            <a:latin typeface="Cambria Math"/>
+                          </a:rPr>
                           <m:t>𝜂</m:t>
                         </m:r>
                       </m:e>
@@ -7158,7 +6642,9 @@
                       </m:sub>
                       <m:sup>
                         <m:r>
-                          <a:rPr lang="en-US" i="1"/>
+                          <a:rPr lang="en-US" i="1">
+                            <a:latin typeface="Cambria Math"/>
+                          </a:rPr>
                           <m:t>2</m:t>
                         </m:r>
                       </m:sup>
@@ -7185,7 +6671,7 @@
             </p:txBody>
           </p:sp>
         </mc:Choice>
-        <mc:Fallback>
+        <mc:Fallback xmlns="">
           <p:sp>
             <p:nvSpPr>
               <p:cNvPr id="3" name="Content Placeholder 2"/>
@@ -7265,7 +6751,7 @@
 </p:sld>
 </file>
 
-<file path=ppt/slides/slide37.xml><?xml version="1.0" encoding="utf-8"?>
+<file path=ppt/slides/slide34.xml><?xml version="1.0" encoding="utf-8"?>
 <p:sld xmlns:a="http://schemas.openxmlformats.org/drawingml/2006/main" xmlns:r="http://schemas.openxmlformats.org/officeDocument/2006/relationships" xmlns:p="http://schemas.openxmlformats.org/presentationml/2006/main">
   <p:cSld>
     <p:spTree>
@@ -7317,10 +6803,15 @@
                 <p:ph sz="half" idx="1"/>
               </p:nvPr>
             </p:nvSpPr>
-            <p:spPr/>
+            <p:spPr>
+              <a:xfrm>
+                <a:off x="838200" y="1825625"/>
+                <a:ext cx="5181600" cy="4839126"/>
+              </a:xfrm>
+            </p:spPr>
             <p:txBody>
               <a:bodyPr>
-                <a:normAutofit fontScale="70000" lnSpcReduction="20000"/>
+                <a:normAutofit fontScale="77500" lnSpcReduction="20000"/>
               </a:bodyPr>
               <a:lstStyle/>
               <a:p>
@@ -7346,19 +6837,27 @@
                 </a:r>
                 <a:r>
                   <a:rPr lang="en-US" dirty="0"/>
-                  <a:t>(1, 36) = 571.82 </a:t>
+                  <a:t>(1, 36) = </a:t>
+                </a:r>
+                <a:r>
+                  <a:rPr lang="en-US" dirty="0" smtClean="0"/>
+                  <a:t>571.82, </a:t>
                 </a:r>
                 <a14:m>
                   <m:oMath xmlns:m="http://schemas.openxmlformats.org/officeDocument/2006/math">
                     <m:sSubSup>
                       <m:sSubSupPr>
                         <m:ctrlPr>
-                          <a:rPr lang="en-US" i="1"/>
+                          <a:rPr lang="en-US" i="1">
+                            <a:latin typeface="Cambria Math"/>
+                          </a:rPr>
                         </m:ctrlPr>
                       </m:sSubSupPr>
                       <m:e>
                         <m:r>
-                          <a:rPr lang="en-US" i="1"/>
+                          <a:rPr lang="en-US" i="1">
+                            <a:latin typeface="Cambria Math"/>
+                          </a:rPr>
                           <m:t>𝜂</m:t>
                         </m:r>
                       </m:e>
@@ -7372,7 +6871,9 @@
                       </m:sub>
                       <m:sup>
                         <m:r>
-                          <a:rPr lang="en-US" i="1"/>
+                          <a:rPr lang="en-US" i="1">
+                            <a:latin typeface="Cambria Math"/>
+                          </a:rPr>
                           <m:t>2</m:t>
                         </m:r>
                       </m:sup>
@@ -7408,10 +6909,14 @@
               </p:nvPr>
             </p:nvSpPr>
             <p:spPr>
-              <a:blipFill rotWithShape="0">
+              <a:xfrm>
+                <a:off x="838200" y="1825625"/>
+                <a:ext cx="5181600" cy="4839126"/>
+              </a:xfrm>
+              <a:blipFill rotWithShape="1">
                 <a:blip r:embed="rId2"/>
                 <a:stretch>
-                  <a:fillRect l="-1059" t="-2521" r="-2000"/>
+                  <a:fillRect l="-1412" t="-2519" r="-2118" b="-2141"/>
                 </a:stretch>
               </a:blipFill>
             </p:spPr>
@@ -7420,7 +6925,7 @@
               <a:lstStyle/>
               <a:p>
                 <a:r>
-                  <a:rPr lang="en-US">
+                  <a:rPr lang="en-GB">
                     <a:noFill/>
                   </a:rPr>
                   <a:t> </a:t>
@@ -7467,10 +6972,18 @@
         <p:spPr/>
         <p:txBody>
           <a:bodyPr>
-            <a:normAutofit fontScale="70000" lnSpcReduction="20000"/>
+            <a:normAutofit fontScale="77500" lnSpcReduction="20000"/>
           </a:bodyPr>
           <a:lstStyle/>
           <a:p>
+            <a:r>
+              <a:rPr lang="en-US" dirty="0" smtClean="0"/>
+              <a:t>Note that no pairwise comparisons are needed when both factors in the interaction only have </a:t>
+            </a:r>
+            <a:r>
+              <a:rPr lang="en-US" smtClean="0"/>
+              <a:t>two levels</a:t>
+            </a:r>
             <a:endParaRPr lang="en-US" dirty="0"/>
           </a:p>
         </p:txBody>
@@ -7495,7 +7008,7 @@
 </p:sld>
 </file>
 
-<file path=ppt/slides/slide38.xml><?xml version="1.0" encoding="utf-8"?>
+<file path=ppt/slides/slide35.xml><?xml version="1.0" encoding="utf-8"?>
 <p:sld xmlns:a="http://schemas.openxmlformats.org/drawingml/2006/main" xmlns:r="http://schemas.openxmlformats.org/officeDocument/2006/relationships" xmlns:p="http://schemas.openxmlformats.org/presentationml/2006/main">
   <p:cSld>
     <p:spTree>
@@ -7639,7 +7152,7 @@
 </p:sld>
 </file>
 
-<file path=ppt/slides/slide39.xml><?xml version="1.0" encoding="utf-8"?>
+<file path=ppt/slides/slide36.xml><?xml version="1.0" encoding="utf-8"?>
 <p:sld xmlns:a="http://schemas.openxmlformats.org/drawingml/2006/main" xmlns:r="http://schemas.openxmlformats.org/officeDocument/2006/relationships" xmlns:p="http://schemas.openxmlformats.org/presentationml/2006/main">
   <p:cSld>
     <p:spTree>
@@ -7774,7 +7287,7 @@
           <a:graphicData uri="http://schemas.openxmlformats.org/presentationml/2006/ole">
             <mc:AlternateContent xmlns:mc="http://schemas.openxmlformats.org/markup-compatibility/2006">
               <mc:Choice xmlns:v="urn:schemas-microsoft-com:vml" Requires="v">
-                <p:oleObj spid="_x0000_s4103" r:id="rId3" imgW="27225360" imgH="15898320" progId="">
+                <p:oleObj spid="_x0000_s4106" r:id="rId3" imgW="27225360" imgH="15898320" progId="">
                   <p:embed/>
                 </p:oleObj>
               </mc:Choice>
@@ -7855,131 +7368,7 @@
 </p:sld>
 </file>
 
-<file path=ppt/slides/slide4.xml><?xml version="1.0" encoding="utf-8"?>
-<p:sld xmlns:a="http://schemas.openxmlformats.org/drawingml/2006/main" xmlns:r="http://schemas.openxmlformats.org/officeDocument/2006/relationships" xmlns:p="http://schemas.openxmlformats.org/presentationml/2006/main">
-  <p:cSld>
-    <p:spTree>
-      <p:nvGrpSpPr>
-        <p:cNvPr id="1" name=""/>
-        <p:cNvGrpSpPr/>
-        <p:nvPr/>
-      </p:nvGrpSpPr>
-      <p:grpSpPr>
-        <a:xfrm>
-          <a:off x="0" y="0"/>
-          <a:ext cx="0" cy="0"/>
-          <a:chOff x="0" y="0"/>
-          <a:chExt cx="0" cy="0"/>
-        </a:xfrm>
-      </p:grpSpPr>
-      <p:sp>
-        <p:nvSpPr>
-          <p:cNvPr id="2" name="Title 1"/>
-          <p:cNvSpPr>
-            <a:spLocks noGrp="1"/>
-          </p:cNvSpPr>
-          <p:nvPr>
-            <p:ph type="title"/>
-          </p:nvPr>
-        </p:nvSpPr>
-        <p:spPr/>
-        <p:txBody>
-          <a:bodyPr/>
-          <a:lstStyle/>
-          <a:p>
-            <a:r>
-              <a:rPr lang="en-US" dirty="0" smtClean="0"/>
-              <a:t>Text import wizard</a:t>
-            </a:r>
-            <a:endParaRPr lang="en-US" dirty="0"/>
-          </a:p>
-        </p:txBody>
-      </p:sp>
-      <p:sp>
-        <p:nvSpPr>
-          <p:cNvPr id="3" name="Content Placeholder 2"/>
-          <p:cNvSpPr>
-            <a:spLocks noGrp="1"/>
-          </p:cNvSpPr>
-          <p:nvPr>
-            <p:ph idx="1"/>
-          </p:nvPr>
-        </p:nvSpPr>
-        <p:spPr>
-          <a:xfrm>
-            <a:off x="838200" y="1825625"/>
-            <a:ext cx="4871830" cy="4351338"/>
-          </a:xfrm>
-        </p:spPr>
-        <p:txBody>
-          <a:bodyPr/>
-          <a:lstStyle/>
-          <a:p>
-            <a:r>
-              <a:rPr lang="en-US" dirty="0" smtClean="0"/>
-              <a:t>Select “Delimited” (since the data are comma delimited)</a:t>
-            </a:r>
-          </a:p>
-          <a:p>
-            <a:r>
-              <a:rPr lang="en-US" dirty="0" smtClean="0"/>
-              <a:t>Select “Yes”, since the first line contains column names</a:t>
-            </a:r>
-          </a:p>
-          <a:p>
-            <a:r>
-              <a:rPr lang="en-US" dirty="0" smtClean="0"/>
-              <a:t>Press Next</a:t>
-            </a:r>
-            <a:endParaRPr lang="en-US" dirty="0"/>
-          </a:p>
-        </p:txBody>
-      </p:sp>
-      <p:pic>
-        <p:nvPicPr>
-          <p:cNvPr id="5" name="Picture 4"/>
-          <p:cNvPicPr>
-            <a:picLocks noChangeAspect="1"/>
-          </p:cNvPicPr>
-          <p:nvPr/>
-        </p:nvPicPr>
-        <p:blipFill>
-          <a:blip r:embed="rId2"/>
-          <a:stretch>
-            <a:fillRect/>
-          </a:stretch>
-        </p:blipFill>
-        <p:spPr>
-          <a:xfrm>
-            <a:off x="5796170" y="1133890"/>
-            <a:ext cx="4723838" cy="4572000"/>
-          </a:xfrm>
-          <a:prstGeom prst="rect">
-            <a:avLst/>
-          </a:prstGeom>
-        </p:spPr>
-      </p:pic>
-    </p:spTree>
-    <p:extLst>
-      <p:ext uri="{BB962C8B-B14F-4D97-AF65-F5344CB8AC3E}">
-        <p14:creationId xmlns:p14="http://schemas.microsoft.com/office/powerpoint/2010/main" val="1726033333"/>
-      </p:ext>
-    </p:extLst>
-  </p:cSld>
-  <p:clrMapOvr>
-    <a:masterClrMapping/>
-  </p:clrMapOvr>
-  <p:timing>
-    <p:tnLst>
-      <p:par>
-        <p:cTn id="1" dur="indefinite" restart="never" nodeType="tmRoot"/>
-      </p:par>
-    </p:tnLst>
-  </p:timing>
-</p:sld>
-</file>
-
-<file path=ppt/slides/slide40.xml><?xml version="1.0" encoding="utf-8"?>
+<file path=ppt/slides/slide37.xml><?xml version="1.0" encoding="utf-8"?>
 <p:sld xmlns:a="http://schemas.openxmlformats.org/drawingml/2006/main" xmlns:r="http://schemas.openxmlformats.org/officeDocument/2006/relationships" xmlns:p="http://schemas.openxmlformats.org/presentationml/2006/main">
   <p:cSld>
     <p:spTree>
@@ -8111,7 +7500,7 @@
 </p:sld>
 </file>
 
-<file path=ppt/slides/slide41.xml><?xml version="1.0" encoding="utf-8"?>
+<file path=ppt/slides/slide38.xml><?xml version="1.0" encoding="utf-8"?>
 <p:sld xmlns:a="http://schemas.openxmlformats.org/drawingml/2006/main" xmlns:r="http://schemas.openxmlformats.org/officeDocument/2006/relationships" xmlns:p="http://schemas.openxmlformats.org/presentationml/2006/main">
   <p:cSld>
     <p:spTree>
@@ -8245,7 +7634,7 @@
 </p:sld>
 </file>
 
-<file path=ppt/slides/slide42.xml><?xml version="1.0" encoding="utf-8"?>
+<file path=ppt/slides/slide39.xml><?xml version="1.0" encoding="utf-8"?>
 <p:sld xmlns:a="http://schemas.openxmlformats.org/drawingml/2006/main" xmlns:r="http://schemas.openxmlformats.org/officeDocument/2006/relationships" xmlns:p="http://schemas.openxmlformats.org/presentationml/2006/main">
   <p:cSld>
     <p:spTree>
@@ -8316,6 +7705,130 @@
     <p:extLst>
       <p:ext uri="{BB962C8B-B14F-4D97-AF65-F5344CB8AC3E}">
         <p14:creationId xmlns:p14="http://schemas.microsoft.com/office/powerpoint/2010/main" val="497935006"/>
+      </p:ext>
+    </p:extLst>
+  </p:cSld>
+  <p:clrMapOvr>
+    <a:masterClrMapping/>
+  </p:clrMapOvr>
+  <p:timing>
+    <p:tnLst>
+      <p:par>
+        <p:cTn id="1" dur="indefinite" restart="never" nodeType="tmRoot"/>
+      </p:par>
+    </p:tnLst>
+  </p:timing>
+</p:sld>
+</file>
+
+<file path=ppt/slides/slide4.xml><?xml version="1.0" encoding="utf-8"?>
+<p:sld xmlns:a="http://schemas.openxmlformats.org/drawingml/2006/main" xmlns:r="http://schemas.openxmlformats.org/officeDocument/2006/relationships" xmlns:p="http://schemas.openxmlformats.org/presentationml/2006/main">
+  <p:cSld>
+    <p:spTree>
+      <p:nvGrpSpPr>
+        <p:cNvPr id="1" name=""/>
+        <p:cNvGrpSpPr/>
+        <p:nvPr/>
+      </p:nvGrpSpPr>
+      <p:grpSpPr>
+        <a:xfrm>
+          <a:off x="0" y="0"/>
+          <a:ext cx="0" cy="0"/>
+          <a:chOff x="0" y="0"/>
+          <a:chExt cx="0" cy="0"/>
+        </a:xfrm>
+      </p:grpSpPr>
+      <p:sp>
+        <p:nvSpPr>
+          <p:cNvPr id="2" name="Title 1"/>
+          <p:cNvSpPr>
+            <a:spLocks noGrp="1"/>
+          </p:cNvSpPr>
+          <p:nvPr>
+            <p:ph type="title"/>
+          </p:nvPr>
+        </p:nvSpPr>
+        <p:spPr/>
+        <p:txBody>
+          <a:bodyPr/>
+          <a:lstStyle/>
+          <a:p>
+            <a:r>
+              <a:rPr lang="en-US" dirty="0" smtClean="0"/>
+              <a:t>Text import wizard</a:t>
+            </a:r>
+            <a:endParaRPr lang="en-US" dirty="0"/>
+          </a:p>
+        </p:txBody>
+      </p:sp>
+      <p:sp>
+        <p:nvSpPr>
+          <p:cNvPr id="3" name="Content Placeholder 2"/>
+          <p:cNvSpPr>
+            <a:spLocks noGrp="1"/>
+          </p:cNvSpPr>
+          <p:nvPr>
+            <p:ph idx="1"/>
+          </p:nvPr>
+        </p:nvSpPr>
+        <p:spPr>
+          <a:xfrm>
+            <a:off x="838200" y="1825625"/>
+            <a:ext cx="4871830" cy="4351338"/>
+          </a:xfrm>
+        </p:spPr>
+        <p:txBody>
+          <a:bodyPr/>
+          <a:lstStyle/>
+          <a:p>
+            <a:r>
+              <a:rPr lang="en-US" dirty="0" smtClean="0"/>
+              <a:t>Select “Delimited” (since the data are comma delimited)</a:t>
+            </a:r>
+          </a:p>
+          <a:p>
+            <a:r>
+              <a:rPr lang="en-US" dirty="0" smtClean="0"/>
+              <a:t>Select “Yes”, since the first line contains column names</a:t>
+            </a:r>
+          </a:p>
+          <a:p>
+            <a:r>
+              <a:rPr lang="en-US" dirty="0" smtClean="0"/>
+              <a:t>Press Next</a:t>
+            </a:r>
+            <a:endParaRPr lang="en-US" dirty="0"/>
+          </a:p>
+        </p:txBody>
+      </p:sp>
+      <p:pic>
+        <p:nvPicPr>
+          <p:cNvPr id="5" name="Picture 4"/>
+          <p:cNvPicPr>
+            <a:picLocks noChangeAspect="1"/>
+          </p:cNvPicPr>
+          <p:nvPr/>
+        </p:nvPicPr>
+        <p:blipFill>
+          <a:blip r:embed="rId2"/>
+          <a:stretch>
+            <a:fillRect/>
+          </a:stretch>
+        </p:blipFill>
+        <p:spPr>
+          <a:xfrm>
+            <a:off x="5796170" y="1133890"/>
+            <a:ext cx="4723838" cy="4572000"/>
+          </a:xfrm>
+          <a:prstGeom prst="rect">
+            <a:avLst/>
+          </a:prstGeom>
+        </p:spPr>
+      </p:pic>
+    </p:spTree>
+    <p:extLst>
+      <p:ext uri="{BB962C8B-B14F-4D97-AF65-F5344CB8AC3E}">
+        <p14:creationId xmlns:p14="http://schemas.microsoft.com/office/powerpoint/2010/main" val="1726033333"/>
       </p:ext>
     </p:extLst>
   </p:cSld>
@@ -8943,7 +8456,7 @@
           <a:graphicData uri="http://schemas.openxmlformats.org/presentationml/2006/ole">
             <mc:AlternateContent xmlns:mc="http://schemas.openxmlformats.org/markup-compatibility/2006">
               <mc:Choice xmlns:v="urn:schemas-microsoft-com:vml" Requires="v">
-                <p:oleObj spid="_x0000_s1056" r:id="rId3" imgW="27110880" imgH="15301440" progId="">
+                <p:oleObj spid="_x0000_s1059" r:id="rId3" imgW="27110880" imgH="15301440" progId="">
                   <p:embed/>
                 </p:oleObj>
               </mc:Choice>
@@ -9041,7 +8554,7 @@
     </a:clrScheme>
     <a:fontScheme name="Office">
       <a:majorFont>
-        <a:latin typeface="Calibri Light" panose="020F0302020204030204"/>
+        <a:latin typeface="Calibri Light"/>
         <a:ea typeface=""/>
         <a:cs typeface=""/>
         <a:font script="Jpan" typeface="ＭＳ Ｐゴシック"/>
@@ -9076,7 +8589,7 @@
         <a:font script="Geor" typeface="Sylfaen"/>
       </a:majorFont>
       <a:minorFont>
-        <a:latin typeface="Calibri" panose="020F0502020204030204"/>
+        <a:latin typeface="Calibri"/>
         <a:ea typeface=""/>
         <a:cs typeface=""/>
         <a:font script="Jpan" typeface="ＭＳ Ｐゴシック"/>
@@ -9253,7 +8766,7 @@
   <a:extraClrSchemeLst/>
   <a:extLst>
     <a:ext uri="{05A4C25C-085E-4340-85A3-A5531E510DB2}">
-      <thm15:themeFamily xmlns:thm15="http://schemas.microsoft.com/office/thememl/2012/main" name="Office Theme" id="{62F939B6-93AF-4DB8-9C6B-D6C7DFDC589F}" vid="{4A3C46E8-61CC-4603-A589-7422A47A8E4A}"/>
+      <thm15:themeFamily xmlns:thm15="http://schemas.microsoft.com/office/thememl/2012/main" xmlns="" name="Office Theme" id="{62F939B6-93AF-4DB8-9C6B-D6C7DFDC589F}" vid="{4A3C46E8-61CC-4603-A589-7422A47A8E4A}"/>
     </a:ext>
   </a:extLst>
 </a:theme>

</xml_diff>

<commit_message>
Work on Class 6
</commit_message>
<xml_diff>
--- a/Homework 4/Homework 4 in SPSS.pptx
+++ b/Homework 4/Homework 4 in SPSS.pptx
@@ -20,30 +20,33 @@
     <p:sldId id="270" r:id="rId14"/>
     <p:sldId id="271" r:id="rId15"/>
     <p:sldId id="273" r:id="rId16"/>
-    <p:sldId id="276" r:id="rId17"/>
-    <p:sldId id="277" r:id="rId18"/>
-    <p:sldId id="280" r:id="rId19"/>
-    <p:sldId id="281" r:id="rId20"/>
-    <p:sldId id="282" r:id="rId21"/>
-    <p:sldId id="283" r:id="rId22"/>
-    <p:sldId id="284" r:id="rId23"/>
-    <p:sldId id="285" r:id="rId24"/>
-    <p:sldId id="286" r:id="rId25"/>
-    <p:sldId id="287" r:id="rId26"/>
-    <p:sldId id="288" r:id="rId27"/>
-    <p:sldId id="289" r:id="rId28"/>
-    <p:sldId id="290" r:id="rId29"/>
-    <p:sldId id="291" r:id="rId30"/>
-    <p:sldId id="293" r:id="rId31"/>
-    <p:sldId id="292" r:id="rId32"/>
-    <p:sldId id="295" r:id="rId33"/>
-    <p:sldId id="296" r:id="rId34"/>
-    <p:sldId id="297" r:id="rId35"/>
-    <p:sldId id="298" r:id="rId36"/>
-    <p:sldId id="299" r:id="rId37"/>
-    <p:sldId id="300" r:id="rId38"/>
-    <p:sldId id="301" r:id="rId39"/>
-    <p:sldId id="302" r:id="rId40"/>
+    <p:sldId id="274" r:id="rId17"/>
+    <p:sldId id="275" r:id="rId18"/>
+    <p:sldId id="276" r:id="rId19"/>
+    <p:sldId id="277" r:id="rId20"/>
+    <p:sldId id="280" r:id="rId21"/>
+    <p:sldId id="281" r:id="rId22"/>
+    <p:sldId id="282" r:id="rId23"/>
+    <p:sldId id="283" r:id="rId24"/>
+    <p:sldId id="284" r:id="rId25"/>
+    <p:sldId id="285" r:id="rId26"/>
+    <p:sldId id="286" r:id="rId27"/>
+    <p:sldId id="287" r:id="rId28"/>
+    <p:sldId id="288" r:id="rId29"/>
+    <p:sldId id="289" r:id="rId30"/>
+    <p:sldId id="290" r:id="rId31"/>
+    <p:sldId id="291" r:id="rId32"/>
+    <p:sldId id="293" r:id="rId33"/>
+    <p:sldId id="292" r:id="rId34"/>
+    <p:sldId id="294" r:id="rId35"/>
+    <p:sldId id="295" r:id="rId36"/>
+    <p:sldId id="296" r:id="rId37"/>
+    <p:sldId id="297" r:id="rId38"/>
+    <p:sldId id="298" r:id="rId39"/>
+    <p:sldId id="299" r:id="rId40"/>
+    <p:sldId id="300" r:id="rId41"/>
+    <p:sldId id="301" r:id="rId42"/>
+    <p:sldId id="302" r:id="rId43"/>
   </p:sldIdLst>
   <p:sldSz cx="12192000" cy="6858000"/>
   <p:notesSz cx="6858000" cy="9144000"/>
@@ -276,7 +279,7 @@
           <a:p>
             <a:fld id="{1BE25CBA-E170-42E9-9F93-AF8F30908BBD}" type="datetimeFigureOut">
               <a:rPr lang="en-US" smtClean="0"/>
-              <a:t>11/5/2014</a:t>
+              <a:t>11/4/2014</a:t>
             </a:fld>
             <a:endParaRPr lang="en-US"/>
           </a:p>
@@ -446,7 +449,7 @@
           <a:p>
             <a:fld id="{1BE25CBA-E170-42E9-9F93-AF8F30908BBD}" type="datetimeFigureOut">
               <a:rPr lang="en-US" smtClean="0"/>
-              <a:t>11/5/2014</a:t>
+              <a:t>11/4/2014</a:t>
             </a:fld>
             <a:endParaRPr lang="en-US"/>
           </a:p>
@@ -626,7 +629,7 @@
           <a:p>
             <a:fld id="{1BE25CBA-E170-42E9-9F93-AF8F30908BBD}" type="datetimeFigureOut">
               <a:rPr lang="en-US" smtClean="0"/>
-              <a:t>11/5/2014</a:t>
+              <a:t>11/4/2014</a:t>
             </a:fld>
             <a:endParaRPr lang="en-US"/>
           </a:p>
@@ -796,7 +799,7 @@
           <a:p>
             <a:fld id="{1BE25CBA-E170-42E9-9F93-AF8F30908BBD}" type="datetimeFigureOut">
               <a:rPr lang="en-US" smtClean="0"/>
-              <a:t>11/5/2014</a:t>
+              <a:t>11/4/2014</a:t>
             </a:fld>
             <a:endParaRPr lang="en-US"/>
           </a:p>
@@ -1042,7 +1045,7 @@
           <a:p>
             <a:fld id="{1BE25CBA-E170-42E9-9F93-AF8F30908BBD}" type="datetimeFigureOut">
               <a:rPr lang="en-US" smtClean="0"/>
-              <a:t>11/5/2014</a:t>
+              <a:t>11/4/2014</a:t>
             </a:fld>
             <a:endParaRPr lang="en-US"/>
           </a:p>
@@ -1274,7 +1277,7 @@
           <a:p>
             <a:fld id="{1BE25CBA-E170-42E9-9F93-AF8F30908BBD}" type="datetimeFigureOut">
               <a:rPr lang="en-US" smtClean="0"/>
-              <a:t>11/5/2014</a:t>
+              <a:t>11/4/2014</a:t>
             </a:fld>
             <a:endParaRPr lang="en-US"/>
           </a:p>
@@ -1641,7 +1644,7 @@
           <a:p>
             <a:fld id="{1BE25CBA-E170-42E9-9F93-AF8F30908BBD}" type="datetimeFigureOut">
               <a:rPr lang="en-US" smtClean="0"/>
-              <a:t>11/5/2014</a:t>
+              <a:t>11/4/2014</a:t>
             </a:fld>
             <a:endParaRPr lang="en-US"/>
           </a:p>
@@ -1759,7 +1762,7 @@
           <a:p>
             <a:fld id="{1BE25CBA-E170-42E9-9F93-AF8F30908BBD}" type="datetimeFigureOut">
               <a:rPr lang="en-US" smtClean="0"/>
-              <a:t>11/5/2014</a:t>
+              <a:t>11/4/2014</a:t>
             </a:fld>
             <a:endParaRPr lang="en-US"/>
           </a:p>
@@ -1854,7 +1857,7 @@
           <a:p>
             <a:fld id="{1BE25CBA-E170-42E9-9F93-AF8F30908BBD}" type="datetimeFigureOut">
               <a:rPr lang="en-US" smtClean="0"/>
-              <a:t>11/5/2014</a:t>
+              <a:t>11/4/2014</a:t>
             </a:fld>
             <a:endParaRPr lang="en-US"/>
           </a:p>
@@ -2131,7 +2134,7 @@
           <a:p>
             <a:fld id="{1BE25CBA-E170-42E9-9F93-AF8F30908BBD}" type="datetimeFigureOut">
               <a:rPr lang="en-US" smtClean="0"/>
-              <a:t>11/5/2014</a:t>
+              <a:t>11/4/2014</a:t>
             </a:fld>
             <a:endParaRPr lang="en-US"/>
           </a:p>
@@ -2384,7 +2387,7 @@
           <a:p>
             <a:fld id="{1BE25CBA-E170-42E9-9F93-AF8F30908BBD}" type="datetimeFigureOut">
               <a:rPr lang="en-US" smtClean="0"/>
-              <a:t>11/5/2014</a:t>
+              <a:t>11/4/2014</a:t>
             </a:fld>
             <a:endParaRPr lang="en-US"/>
           </a:p>
@@ -2597,7 +2600,7 @@
           <a:p>
             <a:fld id="{1BE25CBA-E170-42E9-9F93-AF8F30908BBD}" type="datetimeFigureOut">
               <a:rPr lang="en-US" smtClean="0"/>
-              <a:t>11/5/2014</a:t>
+              <a:t>11/4/2014</a:t>
             </a:fld>
             <a:endParaRPr lang="en-US"/>
           </a:p>
@@ -3394,7 +3397,7 @@
           <a:graphicData uri="http://schemas.openxmlformats.org/presentationml/2006/ole">
             <mc:AlternateContent xmlns:mc="http://schemas.openxmlformats.org/markup-compatibility/2006">
               <mc:Choice xmlns:v="urn:schemas-microsoft-com:vml" Requires="v">
-                <p:oleObj spid="_x0000_s2077" r:id="rId3" imgW="27580680" imgH="15631560" progId="">
+                <p:oleObj spid="_x0000_s2074" r:id="rId3" imgW="27580680" imgH="15631560" progId="">
                   <p:embed/>
                 </p:oleObj>
               </mc:Choice>
@@ -3842,6 +3845,250 @@
           <a:p>
             <a:r>
               <a:rPr lang="en-US" dirty="0" smtClean="0"/>
+              <a:t>Run the analysis</a:t>
+            </a:r>
+            <a:endParaRPr lang="en-US" dirty="0"/>
+          </a:p>
+        </p:txBody>
+      </p:sp>
+      <p:sp>
+        <p:nvSpPr>
+          <p:cNvPr id="3" name="Content Placeholder 2"/>
+          <p:cNvSpPr>
+            <a:spLocks noGrp="1"/>
+          </p:cNvSpPr>
+          <p:nvPr>
+            <p:ph sz="half" idx="1"/>
+          </p:nvPr>
+        </p:nvSpPr>
+        <p:spPr/>
+        <p:txBody>
+          <a:bodyPr/>
+          <a:lstStyle/>
+          <a:p>
+            <a:r>
+              <a:rPr lang="en-US" dirty="0" smtClean="0"/>
+              <a:t>Add a name for the dependent measure (e.g. “</a:t>
+            </a:r>
+            <a:r>
+              <a:rPr lang="en-US" dirty="0" err="1" smtClean="0"/>
+              <a:t>food_eaten</a:t>
+            </a:r>
+            <a:r>
+              <a:rPr lang="en-US" dirty="0" smtClean="0"/>
+              <a:t>”)</a:t>
+            </a:r>
+          </a:p>
+          <a:p>
+            <a:r>
+              <a:rPr lang="en-US" dirty="0" smtClean="0"/>
+              <a:t>Click “Add” and “Define”.</a:t>
+            </a:r>
+            <a:endParaRPr lang="en-US" dirty="0"/>
+          </a:p>
+        </p:txBody>
+      </p:sp>
+      <p:pic>
+        <p:nvPicPr>
+          <p:cNvPr id="5" name="Content Placeholder 4"/>
+          <p:cNvPicPr>
+            <a:picLocks noGrp="1" noChangeAspect="1"/>
+          </p:cNvPicPr>
+          <p:nvPr>
+            <p:ph sz="half" idx="2"/>
+          </p:nvPr>
+        </p:nvPicPr>
+        <p:blipFill>
+          <a:blip r:embed="rId2"/>
+          <a:stretch>
+            <a:fillRect/>
+          </a:stretch>
+        </p:blipFill>
+        <p:spPr>
+          <a:xfrm>
+            <a:off x="7270205" y="1825625"/>
+            <a:ext cx="2985589" cy="4351338"/>
+          </a:xfrm>
+          <a:prstGeom prst="rect">
+            <a:avLst/>
+          </a:prstGeom>
+        </p:spPr>
+      </p:pic>
+    </p:spTree>
+    <p:extLst>
+      <p:ext uri="{BB962C8B-B14F-4D97-AF65-F5344CB8AC3E}">
+        <p14:creationId xmlns:p14="http://schemas.microsoft.com/office/powerpoint/2010/main" val="185833518"/>
+      </p:ext>
+    </p:extLst>
+  </p:cSld>
+  <p:clrMapOvr>
+    <a:masterClrMapping/>
+  </p:clrMapOvr>
+  <p:timing>
+    <p:tnLst>
+      <p:par>
+        <p:cTn id="1" dur="indefinite" restart="never" nodeType="tmRoot"/>
+      </p:par>
+    </p:tnLst>
+  </p:timing>
+</p:sld>
+</file>
+
+<file path=ppt/slides/slide17.xml><?xml version="1.0" encoding="utf-8"?>
+<p:sld xmlns:a="http://schemas.openxmlformats.org/drawingml/2006/main" xmlns:r="http://schemas.openxmlformats.org/officeDocument/2006/relationships" xmlns:p="http://schemas.openxmlformats.org/presentationml/2006/main">
+  <p:cSld>
+    <p:spTree>
+      <p:nvGrpSpPr>
+        <p:cNvPr id="1" name=""/>
+        <p:cNvGrpSpPr/>
+        <p:nvPr/>
+      </p:nvGrpSpPr>
+      <p:grpSpPr>
+        <a:xfrm>
+          <a:off x="0" y="0"/>
+          <a:ext cx="0" cy="0"/>
+          <a:chOff x="0" y="0"/>
+          <a:chExt cx="0" cy="0"/>
+        </a:xfrm>
+      </p:grpSpPr>
+      <p:sp>
+        <p:nvSpPr>
+          <p:cNvPr id="2" name="Title 1"/>
+          <p:cNvSpPr>
+            <a:spLocks noGrp="1"/>
+          </p:cNvSpPr>
+          <p:nvPr>
+            <p:ph type="title"/>
+          </p:nvPr>
+        </p:nvSpPr>
+        <p:spPr/>
+        <p:txBody>
+          <a:bodyPr/>
+          <a:lstStyle/>
+          <a:p>
+            <a:r>
+              <a:rPr lang="en-US" dirty="0" smtClean="0"/>
+              <a:t>Assign within-subjects variables</a:t>
+            </a:r>
+            <a:endParaRPr lang="en-US" dirty="0"/>
+          </a:p>
+        </p:txBody>
+      </p:sp>
+      <p:sp>
+        <p:nvSpPr>
+          <p:cNvPr id="3" name="Content Placeholder 2"/>
+          <p:cNvSpPr>
+            <a:spLocks noGrp="1"/>
+          </p:cNvSpPr>
+          <p:nvPr>
+            <p:ph sz="half" idx="1"/>
+          </p:nvPr>
+        </p:nvSpPr>
+        <p:spPr/>
+        <p:txBody>
+          <a:bodyPr/>
+          <a:lstStyle/>
+          <a:p>
+            <a:r>
+              <a:rPr lang="en-US" dirty="0" smtClean="0"/>
+              <a:t>Click on each column name, then on the corresponding level of the within subjects variables and then on the arrow to assign it.</a:t>
+            </a:r>
+          </a:p>
+          <a:p>
+            <a:r>
+              <a:rPr lang="en-US" dirty="0" smtClean="0"/>
+              <a:t>You need to decide which level corresponds to which numbers</a:t>
+            </a:r>
+          </a:p>
+          <a:p>
+            <a:pPr lvl="1"/>
+            <a:r>
+              <a:rPr lang="en-US" dirty="0" smtClean="0"/>
+              <a:t>e.g. 1,1 could correspond to beef, fish and 2,2 could correspond to no fish, no beef, etc.</a:t>
+            </a:r>
+          </a:p>
+        </p:txBody>
+      </p:sp>
+      <p:pic>
+        <p:nvPicPr>
+          <p:cNvPr id="5" name="Content Placeholder 4"/>
+          <p:cNvPicPr>
+            <a:picLocks noGrp="1" noChangeAspect="1"/>
+          </p:cNvPicPr>
+          <p:nvPr>
+            <p:ph sz="half" idx="2"/>
+          </p:nvPr>
+        </p:nvPicPr>
+        <p:blipFill>
+          <a:blip r:embed="rId2"/>
+          <a:stretch>
+            <a:fillRect/>
+          </a:stretch>
+        </p:blipFill>
+        <p:spPr>
+          <a:xfrm>
+            <a:off x="6287747" y="1825625"/>
+            <a:ext cx="4950506" cy="4351338"/>
+          </a:xfrm>
+          <a:prstGeom prst="rect">
+            <a:avLst/>
+          </a:prstGeom>
+        </p:spPr>
+      </p:pic>
+    </p:spTree>
+    <p:extLst>
+      <p:ext uri="{BB962C8B-B14F-4D97-AF65-F5344CB8AC3E}">
+        <p14:creationId xmlns:p14="http://schemas.microsoft.com/office/powerpoint/2010/main" val="3741009431"/>
+      </p:ext>
+    </p:extLst>
+  </p:cSld>
+  <p:clrMapOvr>
+    <a:masterClrMapping/>
+  </p:clrMapOvr>
+  <p:timing>
+    <p:tnLst>
+      <p:par>
+        <p:cTn id="1" dur="indefinite" restart="never" nodeType="tmRoot"/>
+      </p:par>
+    </p:tnLst>
+  </p:timing>
+</p:sld>
+</file>
+
+<file path=ppt/slides/slide18.xml><?xml version="1.0" encoding="utf-8"?>
+<p:sld xmlns:a="http://schemas.openxmlformats.org/drawingml/2006/main" xmlns:r="http://schemas.openxmlformats.org/officeDocument/2006/relationships" xmlns:p="http://schemas.openxmlformats.org/presentationml/2006/main">
+  <p:cSld>
+    <p:spTree>
+      <p:nvGrpSpPr>
+        <p:cNvPr id="1" name=""/>
+        <p:cNvGrpSpPr/>
+        <p:nvPr/>
+      </p:nvGrpSpPr>
+      <p:grpSpPr>
+        <a:xfrm>
+          <a:off x="0" y="0"/>
+          <a:ext cx="0" cy="0"/>
+          <a:chOff x="0" y="0"/>
+          <a:chExt cx="0" cy="0"/>
+        </a:xfrm>
+      </p:grpSpPr>
+      <p:sp>
+        <p:nvSpPr>
+          <p:cNvPr id="2" name="Title 1"/>
+          <p:cNvSpPr>
+            <a:spLocks noGrp="1"/>
+          </p:cNvSpPr>
+          <p:nvPr>
+            <p:ph type="title"/>
+          </p:nvPr>
+        </p:nvSpPr>
+        <p:spPr/>
+        <p:txBody>
+          <a:bodyPr/>
+          <a:lstStyle/>
+          <a:p>
+            <a:r>
+              <a:rPr lang="en-US" dirty="0" smtClean="0"/>
               <a:t>Assign within-subjects variables</a:t>
             </a:r>
             <a:endParaRPr lang="en-US" dirty="0"/>
@@ -3937,7 +4184,7 @@
 </p:sld>
 </file>
 
-<file path=ppt/slides/slide17.xml><?xml version="1.0" encoding="utf-8"?>
+<file path=ppt/slides/slide19.xml><?xml version="1.0" encoding="utf-8"?>
 <p:sld xmlns:a="http://schemas.openxmlformats.org/drawingml/2006/main" xmlns:r="http://schemas.openxmlformats.org/officeDocument/2006/relationships" xmlns:p="http://schemas.openxmlformats.org/presentationml/2006/main">
   <p:cSld>
     <p:spTree>
@@ -4058,7 +4305,132 @@
 </p:sld>
 </file>
 
-<file path=ppt/slides/slide18.xml><?xml version="1.0" encoding="utf-8"?>
+<file path=ppt/slides/slide2.xml><?xml version="1.0" encoding="utf-8"?>
+<p:sld xmlns:a="http://schemas.openxmlformats.org/drawingml/2006/main" xmlns:r="http://schemas.openxmlformats.org/officeDocument/2006/relationships" xmlns:p="http://schemas.openxmlformats.org/presentationml/2006/main">
+  <p:cSld>
+    <p:spTree>
+      <p:nvGrpSpPr>
+        <p:cNvPr id="1" name=""/>
+        <p:cNvGrpSpPr/>
+        <p:nvPr/>
+      </p:nvGrpSpPr>
+      <p:grpSpPr>
+        <a:xfrm>
+          <a:off x="0" y="0"/>
+          <a:ext cx="0" cy="0"/>
+          <a:chOff x="0" y="0"/>
+          <a:chExt cx="0" cy="0"/>
+        </a:xfrm>
+      </p:grpSpPr>
+      <p:sp>
+        <p:nvSpPr>
+          <p:cNvPr id="2" name="Title 1"/>
+          <p:cNvSpPr>
+            <a:spLocks noGrp="1"/>
+          </p:cNvSpPr>
+          <p:nvPr>
+            <p:ph type="title"/>
+          </p:nvPr>
+        </p:nvSpPr>
+        <p:spPr/>
+        <p:txBody>
+          <a:bodyPr/>
+          <a:lstStyle/>
+          <a:p>
+            <a:r>
+              <a:rPr lang="en-US" dirty="0" smtClean="0"/>
+              <a:t>Open the data file</a:t>
+            </a:r>
+            <a:endParaRPr lang="en-US" dirty="0"/>
+          </a:p>
+        </p:txBody>
+      </p:sp>
+      <p:sp>
+        <p:nvSpPr>
+          <p:cNvPr id="3" name="Content Placeholder 2"/>
+          <p:cNvSpPr>
+            <a:spLocks noGrp="1"/>
+          </p:cNvSpPr>
+          <p:nvPr>
+            <p:ph idx="1"/>
+          </p:nvPr>
+        </p:nvSpPr>
+        <p:spPr/>
+        <p:txBody>
+          <a:bodyPr/>
+          <a:lstStyle/>
+          <a:p>
+            <a:r>
+              <a:rPr lang="en-US" dirty="0" smtClean="0"/>
+              <a:t>Get the data file (from </a:t>
+            </a:r>
+            <a:r>
+              <a:rPr lang="en-US" dirty="0" err="1" smtClean="0"/>
+              <a:t>Github</a:t>
+            </a:r>
+            <a:r>
+              <a:rPr lang="en-US" dirty="0" smtClean="0"/>
+              <a:t> or </a:t>
+            </a:r>
+            <a:r>
+              <a:rPr lang="en-US" dirty="0" err="1" smtClean="0"/>
+              <a:t>myBU</a:t>
+            </a:r>
+            <a:r>
+              <a:rPr lang="en-US" dirty="0" smtClean="0"/>
+              <a:t>) and put it in a directory where you can find it later).</a:t>
+            </a:r>
+          </a:p>
+          <a:p>
+            <a:r>
+              <a:rPr lang="en-US" dirty="0" smtClean="0"/>
+              <a:t>Open the data file (Homework4_data_spss.csv) by selecting “Read Text Data…” from the File menu.</a:t>
+            </a:r>
+          </a:p>
+          <a:p>
+            <a:r>
+              <a:rPr lang="en-US" dirty="0" smtClean="0"/>
+              <a:t>This will open the Text Import Wizard</a:t>
+            </a:r>
+          </a:p>
+          <a:p>
+            <a:r>
+              <a:rPr lang="en-US" dirty="0" smtClean="0"/>
+              <a:t>(For the assignment, an SPSS .</a:t>
+            </a:r>
+            <a:r>
+              <a:rPr lang="en-US" dirty="0" err="1" smtClean="0"/>
+              <a:t>sav</a:t>
+            </a:r>
+            <a:r>
+              <a:rPr lang="en-US" dirty="0" smtClean="0"/>
+              <a:t> file is provided, so you can skip this step)</a:t>
+            </a:r>
+            <a:endParaRPr lang="en-US" dirty="0"/>
+          </a:p>
+        </p:txBody>
+      </p:sp>
+    </p:spTree>
+    <p:extLst>
+      <p:ext uri="{BB962C8B-B14F-4D97-AF65-F5344CB8AC3E}">
+        <p14:creationId xmlns:p14="http://schemas.microsoft.com/office/powerpoint/2010/main" val="3846150543"/>
+      </p:ext>
+    </p:extLst>
+  </p:cSld>
+  <p:clrMapOvr>
+    <a:masterClrMapping/>
+  </p:clrMapOvr>
+  <p:timing>
+    <p:tnLst>
+      <p:par>
+        <p:cTn id="1" dur="indefinite" restart="never" nodeType="tmRoot"/>
+      </p:par>
+    </p:tnLst>
+  </p:timing>
+</p:sld>
+</file>
+
+<file path=ppt/slides/slide20.xml><?xml version="1.0" encoding="utf-8"?>
 <p:sld xmlns:a="http://schemas.openxmlformats.org/drawingml/2006/main" xmlns:r="http://schemas.openxmlformats.org/officeDocument/2006/relationships" xmlns:p="http://schemas.openxmlformats.org/presentationml/2006/main">
   <p:cSld>
     <p:spTree>
@@ -4214,7 +4586,7 @@
 </p:sld>
 </file>
 
-<file path=ppt/slides/slide19.xml><?xml version="1.0" encoding="utf-8"?>
+<file path=ppt/slides/slide21.xml><?xml version="1.0" encoding="utf-8"?>
 <p:sld xmlns:a="http://schemas.openxmlformats.org/drawingml/2006/main" xmlns:r="http://schemas.openxmlformats.org/officeDocument/2006/relationships" xmlns:p="http://schemas.openxmlformats.org/presentationml/2006/main">
   <p:cSld>
     <p:spTree>
@@ -4355,132 +4727,7 @@
 </p:sld>
 </file>
 
-<file path=ppt/slides/slide2.xml><?xml version="1.0" encoding="utf-8"?>
-<p:sld xmlns:a="http://schemas.openxmlformats.org/drawingml/2006/main" xmlns:r="http://schemas.openxmlformats.org/officeDocument/2006/relationships" xmlns:p="http://schemas.openxmlformats.org/presentationml/2006/main">
-  <p:cSld>
-    <p:spTree>
-      <p:nvGrpSpPr>
-        <p:cNvPr id="1" name=""/>
-        <p:cNvGrpSpPr/>
-        <p:nvPr/>
-      </p:nvGrpSpPr>
-      <p:grpSpPr>
-        <a:xfrm>
-          <a:off x="0" y="0"/>
-          <a:ext cx="0" cy="0"/>
-          <a:chOff x="0" y="0"/>
-          <a:chExt cx="0" cy="0"/>
-        </a:xfrm>
-      </p:grpSpPr>
-      <p:sp>
-        <p:nvSpPr>
-          <p:cNvPr id="2" name="Title 1"/>
-          <p:cNvSpPr>
-            <a:spLocks noGrp="1"/>
-          </p:cNvSpPr>
-          <p:nvPr>
-            <p:ph type="title"/>
-          </p:nvPr>
-        </p:nvSpPr>
-        <p:spPr/>
-        <p:txBody>
-          <a:bodyPr/>
-          <a:lstStyle/>
-          <a:p>
-            <a:r>
-              <a:rPr lang="en-US" dirty="0" smtClean="0"/>
-              <a:t>Open the data file</a:t>
-            </a:r>
-            <a:endParaRPr lang="en-US" dirty="0"/>
-          </a:p>
-        </p:txBody>
-      </p:sp>
-      <p:sp>
-        <p:nvSpPr>
-          <p:cNvPr id="3" name="Content Placeholder 2"/>
-          <p:cNvSpPr>
-            <a:spLocks noGrp="1"/>
-          </p:cNvSpPr>
-          <p:nvPr>
-            <p:ph idx="1"/>
-          </p:nvPr>
-        </p:nvSpPr>
-        <p:spPr/>
-        <p:txBody>
-          <a:bodyPr/>
-          <a:lstStyle/>
-          <a:p>
-            <a:r>
-              <a:rPr lang="en-US" dirty="0" smtClean="0"/>
-              <a:t>Get the data file (from </a:t>
-            </a:r>
-            <a:r>
-              <a:rPr lang="en-US" dirty="0" err="1" smtClean="0"/>
-              <a:t>Github</a:t>
-            </a:r>
-            <a:r>
-              <a:rPr lang="en-US" dirty="0" smtClean="0"/>
-              <a:t> or </a:t>
-            </a:r>
-            <a:r>
-              <a:rPr lang="en-US" dirty="0" err="1" smtClean="0"/>
-              <a:t>myBU</a:t>
-            </a:r>
-            <a:r>
-              <a:rPr lang="en-US" dirty="0" smtClean="0"/>
-              <a:t>) and put it in a directory where you can find it later).</a:t>
-            </a:r>
-          </a:p>
-          <a:p>
-            <a:r>
-              <a:rPr lang="en-US" dirty="0" smtClean="0"/>
-              <a:t>Open the data file (Homework4_data_spss.csv) by selecting “Read Text Data…” from the File menu.</a:t>
-            </a:r>
-          </a:p>
-          <a:p>
-            <a:r>
-              <a:rPr lang="en-US" dirty="0" smtClean="0"/>
-              <a:t>This will open the Text Import Wizard</a:t>
-            </a:r>
-          </a:p>
-          <a:p>
-            <a:r>
-              <a:rPr lang="en-US" dirty="0" smtClean="0"/>
-              <a:t>(For the assignment, an SPSS .</a:t>
-            </a:r>
-            <a:r>
-              <a:rPr lang="en-US" dirty="0" err="1" smtClean="0"/>
-              <a:t>sav</a:t>
-            </a:r>
-            <a:r>
-              <a:rPr lang="en-US" dirty="0" smtClean="0"/>
-              <a:t> file is provided, so you can skip this step)</a:t>
-            </a:r>
-            <a:endParaRPr lang="en-US" dirty="0"/>
-          </a:p>
-        </p:txBody>
-      </p:sp>
-    </p:spTree>
-    <p:extLst>
-      <p:ext uri="{BB962C8B-B14F-4D97-AF65-F5344CB8AC3E}">
-        <p14:creationId xmlns:p14="http://schemas.microsoft.com/office/powerpoint/2010/main" val="3846150543"/>
-      </p:ext>
-    </p:extLst>
-  </p:cSld>
-  <p:clrMapOvr>
-    <a:masterClrMapping/>
-  </p:clrMapOvr>
-  <p:timing>
-    <p:tnLst>
-      <p:par>
-        <p:cTn id="1" dur="indefinite" restart="never" nodeType="tmRoot"/>
-      </p:par>
-    </p:tnLst>
-  </p:timing>
-</p:sld>
-</file>
-
-<file path=ppt/slides/slide20.xml><?xml version="1.0" encoding="utf-8"?>
+<file path=ppt/slides/slide22.xml><?xml version="1.0" encoding="utf-8"?>
 <p:sld xmlns:a="http://schemas.openxmlformats.org/drawingml/2006/main" xmlns:r="http://schemas.openxmlformats.org/officeDocument/2006/relationships" xmlns:p="http://schemas.openxmlformats.org/presentationml/2006/main">
   <p:cSld>
     <p:spTree>
@@ -4601,7 +4848,7 @@
 </p:sld>
 </file>
 
-<file path=ppt/slides/slide21.xml><?xml version="1.0" encoding="utf-8"?>
+<file path=ppt/slides/slide23.xml><?xml version="1.0" encoding="utf-8"?>
 <p:sld xmlns:a="http://schemas.openxmlformats.org/drawingml/2006/main" xmlns:r="http://schemas.openxmlformats.org/officeDocument/2006/relationships" xmlns:p="http://schemas.openxmlformats.org/presentationml/2006/main">
   <p:cSld>
     <p:spTree>
@@ -4736,7 +4983,7 @@
 </p:sld>
 </file>
 
-<file path=ppt/slides/slide22.xml><?xml version="1.0" encoding="utf-8"?>
+<file path=ppt/slides/slide24.xml><?xml version="1.0" encoding="utf-8"?>
 <p:sld xmlns:a="http://schemas.openxmlformats.org/drawingml/2006/main" xmlns:r="http://schemas.openxmlformats.org/officeDocument/2006/relationships" xmlns:p="http://schemas.openxmlformats.org/presentationml/2006/main">
   <p:cSld>
     <p:spTree>
@@ -4844,7 +5091,7 @@
 </p:sld>
 </file>
 
-<file path=ppt/slides/slide23.xml><?xml version="1.0" encoding="utf-8"?>
+<file path=ppt/slides/slide25.xml><?xml version="1.0" encoding="utf-8"?>
 <p:sld xmlns:a="http://schemas.openxmlformats.org/drawingml/2006/main" xmlns:r="http://schemas.openxmlformats.org/officeDocument/2006/relationships" xmlns:p="http://schemas.openxmlformats.org/presentationml/2006/main">
   <p:cSld>
     <p:spTree>
@@ -4970,7 +5217,7 @@
 </p:sld>
 </file>
 
-<file path=ppt/slides/slide24.xml><?xml version="1.0" encoding="utf-8"?>
+<file path=ppt/slides/slide26.xml><?xml version="1.0" encoding="utf-8"?>
 <p:sld xmlns:a="http://schemas.openxmlformats.org/drawingml/2006/main" xmlns:r="http://schemas.openxmlformats.org/officeDocument/2006/relationships" xmlns:p="http://schemas.openxmlformats.org/presentationml/2006/main">
   <p:cSld>
     <p:spTree>
@@ -5098,7 +5345,7 @@
 </p:sld>
 </file>
 
-<file path=ppt/slides/slide25.xml><?xml version="1.0" encoding="utf-8"?>
+<file path=ppt/slides/slide27.xml><?xml version="1.0" encoding="utf-8"?>
 <p:sld xmlns:a="http://schemas.openxmlformats.org/drawingml/2006/main" xmlns:r="http://schemas.openxmlformats.org/officeDocument/2006/relationships" xmlns:p="http://schemas.openxmlformats.org/presentationml/2006/main">
   <p:cSld>
     <p:spTree>
@@ -5254,7 +5501,7 @@
 </p:sld>
 </file>
 
-<file path=ppt/slides/slide26.xml><?xml version="1.0" encoding="utf-8"?>
+<file path=ppt/slides/slide28.xml><?xml version="1.0" encoding="utf-8"?>
 <p:sld xmlns:a="http://schemas.openxmlformats.org/drawingml/2006/main" xmlns:r="http://schemas.openxmlformats.org/officeDocument/2006/relationships" xmlns:p="http://schemas.openxmlformats.org/presentationml/2006/main">
   <p:cSld>
     <p:spTree>
@@ -5364,7 +5611,7 @@
           <a:graphicData uri="http://schemas.openxmlformats.org/presentationml/2006/ole">
             <mc:AlternateContent xmlns:mc="http://schemas.openxmlformats.org/markup-compatibility/2006">
               <mc:Choice xmlns:v="urn:schemas-microsoft-com:vml" Requires="v">
-                <p:oleObj spid="_x0000_s3089" r:id="rId3" imgW="27098280" imgH="15263280" progId="">
+                <p:oleObj spid="_x0000_s3086" r:id="rId3" imgW="27098280" imgH="15263280" progId="">
                   <p:embed/>
                 </p:oleObj>
               </mc:Choice>
@@ -5419,7 +5666,7 @@
 </p:sld>
 </file>
 
-<file path=ppt/slides/slide27.xml><?xml version="1.0" encoding="utf-8"?>
+<file path=ppt/slides/slide29.xml><?xml version="1.0" encoding="utf-8"?>
 <p:sld xmlns:a="http://schemas.openxmlformats.org/drawingml/2006/main" xmlns:r="http://schemas.openxmlformats.org/officeDocument/2006/relationships" xmlns:p="http://schemas.openxmlformats.org/presentationml/2006/main">
   <p:cSld>
     <p:spTree>
@@ -5532,264 +5779,6 @@
     <p:extLst>
       <p:ext uri="{BB962C8B-B14F-4D97-AF65-F5344CB8AC3E}">
         <p14:creationId xmlns:p14="http://schemas.microsoft.com/office/powerpoint/2010/main" val="1362976887"/>
-      </p:ext>
-    </p:extLst>
-  </p:cSld>
-  <p:clrMapOvr>
-    <a:masterClrMapping/>
-  </p:clrMapOvr>
-  <p:timing>
-    <p:tnLst>
-      <p:par>
-        <p:cTn id="1" dur="indefinite" restart="never" nodeType="tmRoot"/>
-      </p:par>
-    </p:tnLst>
-  </p:timing>
-</p:sld>
-</file>
-
-<file path=ppt/slides/slide28.xml><?xml version="1.0" encoding="utf-8"?>
-<p:sld xmlns:a="http://schemas.openxmlformats.org/drawingml/2006/main" xmlns:r="http://schemas.openxmlformats.org/officeDocument/2006/relationships" xmlns:p="http://schemas.openxmlformats.org/presentationml/2006/main">
-  <p:cSld>
-    <p:spTree>
-      <p:nvGrpSpPr>
-        <p:cNvPr id="1" name=""/>
-        <p:cNvGrpSpPr/>
-        <p:nvPr/>
-      </p:nvGrpSpPr>
-      <p:grpSpPr>
-        <a:xfrm>
-          <a:off x="0" y="0"/>
-          <a:ext cx="0" cy="0"/>
-          <a:chOff x="0" y="0"/>
-          <a:chExt cx="0" cy="0"/>
-        </a:xfrm>
-      </p:grpSpPr>
-      <p:sp>
-        <p:nvSpPr>
-          <p:cNvPr id="2" name="Title 1"/>
-          <p:cNvSpPr>
-            <a:spLocks noGrp="1"/>
-          </p:cNvSpPr>
-          <p:nvPr>
-            <p:ph type="title"/>
-          </p:nvPr>
-        </p:nvSpPr>
-        <p:spPr/>
-        <p:txBody>
-          <a:bodyPr/>
-          <a:lstStyle/>
-          <a:p>
-            <a:r>
-              <a:rPr lang="en-US" dirty="0" smtClean="0"/>
-              <a:t>Add error bars</a:t>
-            </a:r>
-            <a:endParaRPr lang="en-US" dirty="0"/>
-          </a:p>
-        </p:txBody>
-      </p:sp>
-      <p:sp>
-        <p:nvSpPr>
-          <p:cNvPr id="3" name="Content Placeholder 2"/>
-          <p:cNvSpPr>
-            <a:spLocks noGrp="1"/>
-          </p:cNvSpPr>
-          <p:nvPr>
-            <p:ph sz="half" idx="1"/>
-          </p:nvPr>
-        </p:nvSpPr>
-        <p:spPr/>
-        <p:txBody>
-          <a:bodyPr/>
-          <a:lstStyle/>
-          <a:p>
-            <a:r>
-              <a:rPr lang="en-US" dirty="0" smtClean="0"/>
-              <a:t>Click “Options…”</a:t>
-            </a:r>
-          </a:p>
-          <a:p>
-            <a:r>
-              <a:rPr lang="en-US" dirty="0" smtClean="0"/>
-              <a:t>Check “Display error bars”</a:t>
-            </a:r>
-          </a:p>
-          <a:p>
-            <a:r>
-              <a:rPr lang="en-US" dirty="0" smtClean="0"/>
-              <a:t>The default setting (95% CI) is what we want.</a:t>
-            </a:r>
-          </a:p>
-          <a:p>
-            <a:r>
-              <a:rPr lang="en-US" dirty="0" smtClean="0"/>
-              <a:t>Click “Continue”</a:t>
-            </a:r>
-          </a:p>
-          <a:p>
-            <a:pPr marL="0" indent="0">
-              <a:buNone/>
-            </a:pPr>
-            <a:endParaRPr lang="en-US" dirty="0"/>
-          </a:p>
-        </p:txBody>
-      </p:sp>
-      <p:pic>
-        <p:nvPicPr>
-          <p:cNvPr id="6" name="Content Placeholder 5"/>
-          <p:cNvPicPr>
-            <a:picLocks noGrp="1" noChangeAspect="1"/>
-          </p:cNvPicPr>
-          <p:nvPr>
-            <p:ph sz="half" idx="2"/>
-          </p:nvPr>
-        </p:nvPicPr>
-        <p:blipFill>
-          <a:blip r:embed="rId2"/>
-          <a:stretch>
-            <a:fillRect/>
-          </a:stretch>
-        </p:blipFill>
-        <p:spPr>
-          <a:xfrm>
-            <a:off x="7309324" y="1825625"/>
-            <a:ext cx="2907352" cy="4351338"/>
-          </a:xfrm>
-          <a:prstGeom prst="rect">
-            <a:avLst/>
-          </a:prstGeom>
-        </p:spPr>
-      </p:pic>
-    </p:spTree>
-    <p:extLst>
-      <p:ext uri="{BB962C8B-B14F-4D97-AF65-F5344CB8AC3E}">
-        <p14:creationId xmlns:p14="http://schemas.microsoft.com/office/powerpoint/2010/main" val="4259224393"/>
-      </p:ext>
-    </p:extLst>
-  </p:cSld>
-  <p:clrMapOvr>
-    <a:masterClrMapping/>
-  </p:clrMapOvr>
-  <p:timing>
-    <p:tnLst>
-      <p:par>
-        <p:cTn id="1" dur="indefinite" restart="never" nodeType="tmRoot"/>
-      </p:par>
-    </p:tnLst>
-  </p:timing>
-</p:sld>
-</file>
-
-<file path=ppt/slides/slide29.xml><?xml version="1.0" encoding="utf-8"?>
-<p:sld xmlns:a="http://schemas.openxmlformats.org/drawingml/2006/main" xmlns:r="http://schemas.openxmlformats.org/officeDocument/2006/relationships" xmlns:p="http://schemas.openxmlformats.org/presentationml/2006/main">
-  <p:cSld>
-    <p:spTree>
-      <p:nvGrpSpPr>
-        <p:cNvPr id="1" name=""/>
-        <p:cNvGrpSpPr/>
-        <p:nvPr/>
-      </p:nvGrpSpPr>
-      <p:grpSpPr>
-        <a:xfrm>
-          <a:off x="0" y="0"/>
-          <a:ext cx="0" cy="0"/>
-          <a:chOff x="0" y="0"/>
-          <a:chExt cx="0" cy="0"/>
-        </a:xfrm>
-      </p:grpSpPr>
-      <p:sp>
-        <p:nvSpPr>
-          <p:cNvPr id="2" name="Title 1"/>
-          <p:cNvSpPr>
-            <a:spLocks noGrp="1"/>
-          </p:cNvSpPr>
-          <p:nvPr>
-            <p:ph type="title"/>
-          </p:nvPr>
-        </p:nvSpPr>
-        <p:spPr/>
-        <p:txBody>
-          <a:bodyPr/>
-          <a:lstStyle/>
-          <a:p>
-            <a:r>
-              <a:rPr lang="en-US" dirty="0" smtClean="0"/>
-              <a:t>Final touches</a:t>
-            </a:r>
-            <a:endParaRPr lang="en-US" dirty="0"/>
-          </a:p>
-        </p:txBody>
-      </p:sp>
-      <p:sp>
-        <p:nvSpPr>
-          <p:cNvPr id="3" name="Content Placeholder 2"/>
-          <p:cNvSpPr>
-            <a:spLocks noGrp="1"/>
-          </p:cNvSpPr>
-          <p:nvPr>
-            <p:ph sz="half" idx="1"/>
-          </p:nvPr>
-        </p:nvSpPr>
-        <p:spPr/>
-        <p:txBody>
-          <a:bodyPr/>
-          <a:lstStyle/>
-          <a:p>
-            <a:r>
-              <a:rPr lang="en-US" dirty="0" smtClean="0"/>
-              <a:t>Double-click the resulting graph to open it in the chart editor</a:t>
-            </a:r>
-          </a:p>
-          <a:p>
-            <a:r>
-              <a:rPr lang="en-US" dirty="0" smtClean="0"/>
-              <a:t>Double-click axis and legend labels to edit them and make them look nice</a:t>
-            </a:r>
-          </a:p>
-          <a:p>
-            <a:r>
-              <a:rPr lang="en-US" dirty="0" smtClean="0"/>
-              <a:t>There we go!</a:t>
-            </a:r>
-          </a:p>
-          <a:p>
-            <a:pPr marL="0" indent="0">
-              <a:buNone/>
-            </a:pPr>
-            <a:endParaRPr lang="en-US" dirty="0"/>
-          </a:p>
-        </p:txBody>
-      </p:sp>
-      <p:pic>
-        <p:nvPicPr>
-          <p:cNvPr id="5" name="Content Placeholder 4"/>
-          <p:cNvPicPr>
-            <a:picLocks noGrp="1" noChangeAspect="1"/>
-          </p:cNvPicPr>
-          <p:nvPr>
-            <p:ph sz="half" idx="2"/>
-          </p:nvPr>
-        </p:nvPicPr>
-        <p:blipFill>
-          <a:blip r:embed="rId2"/>
-          <a:stretch>
-            <a:fillRect/>
-          </a:stretch>
-        </p:blipFill>
-        <p:spPr>
-          <a:xfrm>
-            <a:off x="6172200" y="1925359"/>
-            <a:ext cx="5181600" cy="4151870"/>
-          </a:xfrm>
-          <a:prstGeom prst="rect">
-            <a:avLst/>
-          </a:prstGeom>
-        </p:spPr>
-      </p:pic>
-    </p:spTree>
-    <p:extLst>
-      <p:ext uri="{BB962C8B-B14F-4D97-AF65-F5344CB8AC3E}">
-        <p14:creationId xmlns:p14="http://schemas.microsoft.com/office/powerpoint/2010/main" val="3881427018"/>
       </p:ext>
     </p:extLst>
   </p:cSld>
@@ -5947,6 +5936,264 @@
           <a:p>
             <a:r>
               <a:rPr lang="en-US" dirty="0" smtClean="0"/>
+              <a:t>Add error bars</a:t>
+            </a:r>
+            <a:endParaRPr lang="en-US" dirty="0"/>
+          </a:p>
+        </p:txBody>
+      </p:sp>
+      <p:sp>
+        <p:nvSpPr>
+          <p:cNvPr id="3" name="Content Placeholder 2"/>
+          <p:cNvSpPr>
+            <a:spLocks noGrp="1"/>
+          </p:cNvSpPr>
+          <p:nvPr>
+            <p:ph sz="half" idx="1"/>
+          </p:nvPr>
+        </p:nvSpPr>
+        <p:spPr/>
+        <p:txBody>
+          <a:bodyPr/>
+          <a:lstStyle/>
+          <a:p>
+            <a:r>
+              <a:rPr lang="en-US" dirty="0" smtClean="0"/>
+              <a:t>Click “Options…”</a:t>
+            </a:r>
+          </a:p>
+          <a:p>
+            <a:r>
+              <a:rPr lang="en-US" dirty="0" smtClean="0"/>
+              <a:t>Check “Display error bars”</a:t>
+            </a:r>
+          </a:p>
+          <a:p>
+            <a:r>
+              <a:rPr lang="en-US" dirty="0" smtClean="0"/>
+              <a:t>The default setting (95% CI) is what we want.</a:t>
+            </a:r>
+          </a:p>
+          <a:p>
+            <a:r>
+              <a:rPr lang="en-US" dirty="0" smtClean="0"/>
+              <a:t>Click “Continue”</a:t>
+            </a:r>
+          </a:p>
+          <a:p>
+            <a:pPr marL="0" indent="0">
+              <a:buNone/>
+            </a:pPr>
+            <a:endParaRPr lang="en-US" dirty="0"/>
+          </a:p>
+        </p:txBody>
+      </p:sp>
+      <p:pic>
+        <p:nvPicPr>
+          <p:cNvPr id="6" name="Content Placeholder 5"/>
+          <p:cNvPicPr>
+            <a:picLocks noGrp="1" noChangeAspect="1"/>
+          </p:cNvPicPr>
+          <p:nvPr>
+            <p:ph sz="half" idx="2"/>
+          </p:nvPr>
+        </p:nvPicPr>
+        <p:blipFill>
+          <a:blip r:embed="rId2"/>
+          <a:stretch>
+            <a:fillRect/>
+          </a:stretch>
+        </p:blipFill>
+        <p:spPr>
+          <a:xfrm>
+            <a:off x="7309324" y="1825625"/>
+            <a:ext cx="2907352" cy="4351338"/>
+          </a:xfrm>
+          <a:prstGeom prst="rect">
+            <a:avLst/>
+          </a:prstGeom>
+        </p:spPr>
+      </p:pic>
+    </p:spTree>
+    <p:extLst>
+      <p:ext uri="{BB962C8B-B14F-4D97-AF65-F5344CB8AC3E}">
+        <p14:creationId xmlns:p14="http://schemas.microsoft.com/office/powerpoint/2010/main" val="4259224393"/>
+      </p:ext>
+    </p:extLst>
+  </p:cSld>
+  <p:clrMapOvr>
+    <a:masterClrMapping/>
+  </p:clrMapOvr>
+  <p:timing>
+    <p:tnLst>
+      <p:par>
+        <p:cTn id="1" dur="indefinite" restart="never" nodeType="tmRoot"/>
+      </p:par>
+    </p:tnLst>
+  </p:timing>
+</p:sld>
+</file>
+
+<file path=ppt/slides/slide31.xml><?xml version="1.0" encoding="utf-8"?>
+<p:sld xmlns:a="http://schemas.openxmlformats.org/drawingml/2006/main" xmlns:r="http://schemas.openxmlformats.org/officeDocument/2006/relationships" xmlns:p="http://schemas.openxmlformats.org/presentationml/2006/main">
+  <p:cSld>
+    <p:spTree>
+      <p:nvGrpSpPr>
+        <p:cNvPr id="1" name=""/>
+        <p:cNvGrpSpPr/>
+        <p:nvPr/>
+      </p:nvGrpSpPr>
+      <p:grpSpPr>
+        <a:xfrm>
+          <a:off x="0" y="0"/>
+          <a:ext cx="0" cy="0"/>
+          <a:chOff x="0" y="0"/>
+          <a:chExt cx="0" cy="0"/>
+        </a:xfrm>
+      </p:grpSpPr>
+      <p:sp>
+        <p:nvSpPr>
+          <p:cNvPr id="2" name="Title 1"/>
+          <p:cNvSpPr>
+            <a:spLocks noGrp="1"/>
+          </p:cNvSpPr>
+          <p:nvPr>
+            <p:ph type="title"/>
+          </p:nvPr>
+        </p:nvSpPr>
+        <p:spPr/>
+        <p:txBody>
+          <a:bodyPr/>
+          <a:lstStyle/>
+          <a:p>
+            <a:r>
+              <a:rPr lang="en-US" dirty="0" smtClean="0"/>
+              <a:t>Final touches</a:t>
+            </a:r>
+            <a:endParaRPr lang="en-US" dirty="0"/>
+          </a:p>
+        </p:txBody>
+      </p:sp>
+      <p:sp>
+        <p:nvSpPr>
+          <p:cNvPr id="3" name="Content Placeholder 2"/>
+          <p:cNvSpPr>
+            <a:spLocks noGrp="1"/>
+          </p:cNvSpPr>
+          <p:nvPr>
+            <p:ph sz="half" idx="1"/>
+          </p:nvPr>
+        </p:nvSpPr>
+        <p:spPr/>
+        <p:txBody>
+          <a:bodyPr/>
+          <a:lstStyle/>
+          <a:p>
+            <a:r>
+              <a:rPr lang="en-US" dirty="0" smtClean="0"/>
+              <a:t>Double-click the resulting graph to open it in the chart editor</a:t>
+            </a:r>
+          </a:p>
+          <a:p>
+            <a:r>
+              <a:rPr lang="en-US" dirty="0" smtClean="0"/>
+              <a:t>Double-click axis and legend labels to edit them and make them look nice</a:t>
+            </a:r>
+          </a:p>
+          <a:p>
+            <a:r>
+              <a:rPr lang="en-US" dirty="0" smtClean="0"/>
+              <a:t>There we go!</a:t>
+            </a:r>
+          </a:p>
+          <a:p>
+            <a:pPr marL="0" indent="0">
+              <a:buNone/>
+            </a:pPr>
+            <a:endParaRPr lang="en-US" dirty="0"/>
+          </a:p>
+        </p:txBody>
+      </p:sp>
+      <p:pic>
+        <p:nvPicPr>
+          <p:cNvPr id="5" name="Content Placeholder 4"/>
+          <p:cNvPicPr>
+            <a:picLocks noGrp="1" noChangeAspect="1"/>
+          </p:cNvPicPr>
+          <p:nvPr>
+            <p:ph sz="half" idx="2"/>
+          </p:nvPr>
+        </p:nvPicPr>
+        <p:blipFill>
+          <a:blip r:embed="rId2"/>
+          <a:stretch>
+            <a:fillRect/>
+          </a:stretch>
+        </p:blipFill>
+        <p:spPr>
+          <a:xfrm>
+            <a:off x="6172200" y="1925359"/>
+            <a:ext cx="5181600" cy="4151870"/>
+          </a:xfrm>
+          <a:prstGeom prst="rect">
+            <a:avLst/>
+          </a:prstGeom>
+        </p:spPr>
+      </p:pic>
+    </p:spTree>
+    <p:extLst>
+      <p:ext uri="{BB962C8B-B14F-4D97-AF65-F5344CB8AC3E}">
+        <p14:creationId xmlns:p14="http://schemas.microsoft.com/office/powerpoint/2010/main" val="3881427018"/>
+      </p:ext>
+    </p:extLst>
+  </p:cSld>
+  <p:clrMapOvr>
+    <a:masterClrMapping/>
+  </p:clrMapOvr>
+  <p:timing>
+    <p:tnLst>
+      <p:par>
+        <p:cTn id="1" dur="indefinite" restart="never" nodeType="tmRoot"/>
+      </p:par>
+    </p:tnLst>
+  </p:timing>
+</p:sld>
+</file>
+
+<file path=ppt/slides/slide32.xml><?xml version="1.0" encoding="utf-8"?>
+<p:sld xmlns:a="http://schemas.openxmlformats.org/drawingml/2006/main" xmlns:r="http://schemas.openxmlformats.org/officeDocument/2006/relationships" xmlns:p="http://schemas.openxmlformats.org/presentationml/2006/main">
+  <p:cSld>
+    <p:spTree>
+      <p:nvGrpSpPr>
+        <p:cNvPr id="1" name=""/>
+        <p:cNvGrpSpPr/>
+        <p:nvPr/>
+      </p:nvGrpSpPr>
+      <p:grpSpPr>
+        <a:xfrm>
+          <a:off x="0" y="0"/>
+          <a:ext cx="0" cy="0"/>
+          <a:chOff x="0" y="0"/>
+          <a:chExt cx="0" cy="0"/>
+        </a:xfrm>
+      </p:grpSpPr>
+      <p:sp>
+        <p:nvSpPr>
+          <p:cNvPr id="2" name="Title 1"/>
+          <p:cNvSpPr>
+            <a:spLocks noGrp="1"/>
+          </p:cNvSpPr>
+          <p:nvPr>
+            <p:ph type="title"/>
+          </p:nvPr>
+        </p:nvSpPr>
+        <p:spPr/>
+        <p:txBody>
+          <a:bodyPr/>
+          <a:lstStyle/>
+          <a:p>
+            <a:r>
+              <a:rPr lang="en-US" dirty="0" smtClean="0"/>
               <a:t>The hypothesis tests</a:t>
             </a:r>
             <a:endParaRPr lang="en-US" dirty="0"/>
@@ -6102,7 +6349,7 @@
 </p:sld>
 </file>
 
-<file path=ppt/slides/slide31.xml><?xml version="1.0" encoding="utf-8"?>
+<file path=ppt/slides/slide33.xml><?xml version="1.0" encoding="utf-8"?>
 <p:sld xmlns:a="http://schemas.openxmlformats.org/drawingml/2006/main" xmlns:r="http://schemas.openxmlformats.org/officeDocument/2006/relationships" xmlns:p="http://schemas.openxmlformats.org/presentationml/2006/main">
   <p:cSld>
     <p:spTree>
@@ -6240,7 +6487,7 @@
 </p:sld>
 </file>
 
-<file path=ppt/slides/slide32.xml><?xml version="1.0" encoding="utf-8"?>
+<file path=ppt/slides/slide34.xml><?xml version="1.0" encoding="utf-8"?>
 <p:sld xmlns:a="http://schemas.openxmlformats.org/drawingml/2006/main" xmlns:r="http://schemas.openxmlformats.org/officeDocument/2006/relationships" xmlns:p="http://schemas.openxmlformats.org/presentationml/2006/main">
   <p:cSld>
     <p:spTree>
@@ -6391,16 +6638,12 @@
                     <m:sSubSup>
                       <m:sSubSupPr>
                         <m:ctrlPr>
-                          <a:rPr lang="en-US" i="1">
-                            <a:latin typeface="Cambria Math"/>
-                          </a:rPr>
+                          <a:rPr lang="en-US" i="1"/>
                         </m:ctrlPr>
                       </m:sSubSupPr>
                       <m:e>
                         <m:r>
-                          <a:rPr lang="en-US" i="1">
-                            <a:latin typeface="Cambria Math"/>
-                          </a:rPr>
+                          <a:rPr lang="en-US" i="1"/>
                           <m:t>𝜂</m:t>
                         </m:r>
                       </m:e>
@@ -6414,9 +6657,7 @@
                       </m:sub>
                       <m:sup>
                         <m:r>
-                          <a:rPr lang="en-US" i="1">
-                            <a:latin typeface="Cambria Math"/>
-                          </a:rPr>
+                          <a:rPr lang="en-US" i="1"/>
                           <m:t>2</m:t>
                         </m:r>
                       </m:sup>
@@ -6425,11 +6666,7 @@
                 </a14:m>
                 <a:r>
                   <a:rPr lang="en-US" dirty="0"/>
-                  <a:t> = </a:t>
-                </a:r>
-                <a:r>
-                  <a:rPr lang="en-US" dirty="0" smtClean="0"/>
-                  <a:t>0.19, </a:t>
+                  <a:t> = 0.01, </a:t>
                 </a:r>
                 <a:r>
                   <a:rPr lang="en-US" i="1" dirty="0"/>
@@ -6465,10 +6702,10 @@
               </p:nvPr>
             </p:nvSpPr>
             <p:spPr>
-              <a:blipFill rotWithShape="1">
+              <a:blipFill rotWithShape="0">
                 <a:blip r:embed="rId2"/>
                 <a:stretch>
-                  <a:fillRect l="-1882" t="-3501" r="-588"/>
+                  <a:fillRect l="-1882" t="-3501" r="-471"/>
                 </a:stretch>
               </a:blipFill>
             </p:spPr>
@@ -6477,7 +6714,290 @@
               <a:lstStyle/>
               <a:p>
                 <a:r>
-                  <a:rPr lang="en-GB">
+                  <a:rPr lang="en-US">
+                    <a:noFill/>
+                  </a:rPr>
+                  <a:t> </a:t>
+                </a:r>
+              </a:p>
+            </p:txBody>
+          </p:sp>
+        </mc:Fallback>
+      </mc:AlternateContent>
+      <p:pic>
+        <p:nvPicPr>
+          <p:cNvPr id="6" name="Content Placeholder 5"/>
+          <p:cNvPicPr>
+            <a:picLocks noGrp="1" noChangeAspect="1"/>
+          </p:cNvPicPr>
+          <p:nvPr>
+            <p:ph sz="half" idx="2"/>
+          </p:nvPr>
+        </p:nvPicPr>
+        <p:blipFill>
+          <a:blip r:embed="rId3"/>
+          <a:stretch>
+            <a:fillRect/>
+          </a:stretch>
+        </p:blipFill>
+        <p:spPr>
+          <a:xfrm>
+            <a:off x="6172200" y="3077889"/>
+            <a:ext cx="5181600" cy="1846809"/>
+          </a:xfrm>
+          <a:prstGeom prst="rect">
+            <a:avLst/>
+          </a:prstGeom>
+        </p:spPr>
+      </p:pic>
+    </p:spTree>
+    <p:extLst>
+      <p:ext uri="{BB962C8B-B14F-4D97-AF65-F5344CB8AC3E}">
+        <p14:creationId xmlns:p14="http://schemas.microsoft.com/office/powerpoint/2010/main" val="1140283491"/>
+      </p:ext>
+    </p:extLst>
+  </p:cSld>
+  <p:clrMapOvr>
+    <a:masterClrMapping/>
+  </p:clrMapOvr>
+  <p:timing>
+    <p:tnLst>
+      <p:par>
+        <p:cTn id="1" dur="indefinite" restart="never" nodeType="tmRoot"/>
+      </p:par>
+    </p:tnLst>
+  </p:timing>
+</p:sld>
+</file>
+
+<file path=ppt/slides/slide35.xml><?xml version="1.0" encoding="utf-8"?>
+<p:sld xmlns:a="http://schemas.openxmlformats.org/drawingml/2006/main" xmlns:r="http://schemas.openxmlformats.org/officeDocument/2006/relationships" xmlns:p="http://schemas.openxmlformats.org/presentationml/2006/main">
+  <p:cSld>
+    <p:spTree>
+      <p:nvGrpSpPr>
+        <p:cNvPr id="1" name=""/>
+        <p:cNvGrpSpPr/>
+        <p:nvPr/>
+      </p:nvGrpSpPr>
+      <p:grpSpPr>
+        <a:xfrm>
+          <a:off x="0" y="0"/>
+          <a:ext cx="0" cy="0"/>
+          <a:chOff x="0" y="0"/>
+          <a:chExt cx="0" cy="0"/>
+        </a:xfrm>
+      </p:grpSpPr>
+      <p:sp>
+        <p:nvSpPr>
+          <p:cNvPr id="2" name="Title 1"/>
+          <p:cNvSpPr>
+            <a:spLocks noGrp="1"/>
+          </p:cNvSpPr>
+          <p:nvPr>
+            <p:ph type="title"/>
+          </p:nvPr>
+        </p:nvSpPr>
+        <p:spPr/>
+        <p:txBody>
+          <a:bodyPr/>
+          <a:lstStyle/>
+          <a:p>
+            <a:r>
+              <a:rPr lang="en-US" dirty="0" smtClean="0"/>
+              <a:t>The hypothesis tests</a:t>
+            </a:r>
+            <a:endParaRPr lang="en-US" dirty="0"/>
+          </a:p>
+        </p:txBody>
+      </p:sp>
+      <mc:AlternateContent xmlns:mc="http://schemas.openxmlformats.org/markup-compatibility/2006">
+        <mc:Choice xmlns:a14="http://schemas.microsoft.com/office/drawing/2010/main" Requires="a14">
+          <p:sp>
+            <p:nvSpPr>
+              <p:cNvPr id="3" name="Content Placeholder 2"/>
+              <p:cNvSpPr>
+                <a:spLocks noGrp="1"/>
+              </p:cNvSpPr>
+              <p:nvPr>
+                <p:ph sz="half" idx="1"/>
+              </p:nvPr>
+            </p:nvSpPr>
+            <p:spPr/>
+            <p:txBody>
+              <a:bodyPr>
+                <a:normAutofit fontScale="92500" lnSpcReduction="20000"/>
+              </a:bodyPr>
+              <a:lstStyle/>
+              <a:p>
+                <a:r>
+                  <a:rPr lang="en-US" dirty="0" smtClean="0"/>
+                  <a:t>Note down:</a:t>
+                </a:r>
+              </a:p>
+              <a:p>
+                <a:pPr lvl="1"/>
+                <a:r>
+                  <a:rPr lang="en-US" dirty="0" err="1" smtClean="0"/>
+                  <a:t>df</a:t>
+                </a:r>
+                <a:r>
+                  <a:rPr lang="en-US" dirty="0" smtClean="0"/>
+                  <a:t> numerator (</a:t>
+                </a:r>
+                <a:r>
+                  <a:rPr lang="en-US" dirty="0" err="1" smtClean="0"/>
+                  <a:t>df</a:t>
+                </a:r>
+                <a:r>
+                  <a:rPr lang="en-US" dirty="0" smtClean="0"/>
+                  <a:t> effect)</a:t>
+                </a:r>
+              </a:p>
+              <a:p>
+                <a:pPr lvl="1"/>
+                <a:r>
+                  <a:rPr lang="en-US" dirty="0" err="1" smtClean="0"/>
+                  <a:t>df</a:t>
+                </a:r>
+                <a:r>
+                  <a:rPr lang="en-US" dirty="0" smtClean="0"/>
+                  <a:t> denominator (</a:t>
+                </a:r>
+                <a:r>
+                  <a:rPr lang="en-US" dirty="0" err="1" smtClean="0"/>
+                  <a:t>df</a:t>
+                </a:r>
+                <a:r>
+                  <a:rPr lang="en-US" dirty="0" smtClean="0"/>
+                  <a:t> error)</a:t>
+                </a:r>
+              </a:p>
+              <a:p>
+                <a:pPr lvl="1"/>
+                <a:r>
+                  <a:rPr lang="en-US" dirty="0" smtClean="0"/>
+                  <a:t>F-value</a:t>
+                </a:r>
+              </a:p>
+              <a:p>
+                <a:pPr lvl="1"/>
+                <a:r>
+                  <a:rPr lang="en-US" dirty="0" smtClean="0"/>
+                  <a:t>p-value</a:t>
+                </a:r>
+              </a:p>
+              <a:p>
+                <a:pPr lvl="1"/>
+                <a:r>
+                  <a:rPr lang="en-US" dirty="0" smtClean="0"/>
+                  <a:t>Partial Eta squared</a:t>
+                </a:r>
+              </a:p>
+              <a:p>
+                <a:r>
+                  <a:rPr lang="en-US" dirty="0" smtClean="0"/>
+                  <a:t>Then report them like this in the text:</a:t>
+                </a:r>
+              </a:p>
+              <a:p>
+                <a:r>
+                  <a:rPr lang="en-US" dirty="0" smtClean="0"/>
+                  <a:t>There was a significant effect of beef, </a:t>
+                </a:r>
+                <a:r>
+                  <a:rPr lang="en-US" i="1" dirty="0"/>
+                  <a:t>F</a:t>
+                </a:r>
+                <a:r>
+                  <a:rPr lang="en-US" dirty="0"/>
+                  <a:t>(1, 36) = </a:t>
+                </a:r>
+                <a:r>
+                  <a:rPr lang="en-US" dirty="0" smtClean="0"/>
+                  <a:t>8.63, </a:t>
+                </a:r>
+                <a14:m>
+                  <m:oMath xmlns:m="http://schemas.openxmlformats.org/officeDocument/2006/math">
+                    <m:sSubSup>
+                      <m:sSubSupPr>
+                        <m:ctrlPr>
+                          <a:rPr lang="en-US" i="1"/>
+                        </m:ctrlPr>
+                      </m:sSubSupPr>
+                      <m:e>
+                        <m:r>
+                          <a:rPr lang="en-US" i="1"/>
+                          <m:t>𝜂</m:t>
+                        </m:r>
+                      </m:e>
+                      <m:sub>
+                        <m:r>
+                          <a:rPr lang="en-US" b="0" i="1" smtClean="0">
+                            <a:latin typeface="Cambria Math" panose="02040503050406030204" pitchFamily="18" charset="0"/>
+                          </a:rPr>
+                          <m:t>𝑃</m:t>
+                        </m:r>
+                      </m:sub>
+                      <m:sup>
+                        <m:r>
+                          <a:rPr lang="en-US" i="1"/>
+                          <m:t>2</m:t>
+                        </m:r>
+                      </m:sup>
+                    </m:sSubSup>
+                  </m:oMath>
+                </a14:m>
+                <a:r>
+                  <a:rPr lang="en-US" dirty="0"/>
+                  <a:t> = 0.01, </a:t>
+                </a:r>
+                <a:r>
+                  <a:rPr lang="en-US" i="1" dirty="0"/>
+                  <a:t>p</a:t>
+                </a:r>
+                <a:r>
+                  <a:rPr lang="en-US" dirty="0"/>
+                  <a:t> &lt; .</a:t>
+                </a:r>
+                <a:r>
+                  <a:rPr lang="en-US" dirty="0" smtClean="0"/>
+                  <a:t>01.</a:t>
+                </a:r>
+              </a:p>
+              <a:p>
+                <a:r>
+                  <a:rPr lang="en-US" dirty="0" smtClean="0"/>
+                  <a:t>Do this for every significant factor. </a:t>
+                </a:r>
+              </a:p>
+            </p:txBody>
+          </p:sp>
+        </mc:Choice>
+        <mc:Fallback>
+          <p:sp>
+            <p:nvSpPr>
+              <p:cNvPr id="3" name="Content Placeholder 2"/>
+              <p:cNvSpPr>
+                <a:spLocks noGrp="1" noRot="1" noChangeAspect="1" noMove="1" noResize="1" noEditPoints="1" noAdjustHandles="1" noChangeArrowheads="1" noChangeShapeType="1" noTextEdit="1"/>
+              </p:cNvSpPr>
+              <p:nvPr>
+                <p:ph sz="half" idx="1"/>
+              </p:nvPr>
+            </p:nvSpPr>
+            <p:spPr>
+              <a:blipFill rotWithShape="0">
+                <a:blip r:embed="rId2"/>
+                <a:stretch>
+                  <a:fillRect l="-1882" t="-3501" r="-471"/>
+                </a:stretch>
+              </a:blipFill>
+            </p:spPr>
+            <p:txBody>
+              <a:bodyPr/>
+              <a:lstStyle/>
+              <a:p>
+                <a:r>
+                  <a:rPr lang="en-US">
                     <a:noFill/>
                   </a:rPr>
                   <a:t> </a:t>
@@ -6533,7 +7053,7 @@
 </p:sld>
 </file>
 
-<file path=ppt/slides/slide33.xml><?xml version="1.0" encoding="utf-8"?>
+<file path=ppt/slides/slide36.xml><?xml version="1.0" encoding="utf-8"?>
 <p:sld xmlns:a="http://schemas.openxmlformats.org/drawingml/2006/main" xmlns:r="http://schemas.openxmlformats.org/officeDocument/2006/relationships" xmlns:p="http://schemas.openxmlformats.org/presentationml/2006/main">
   <p:cSld>
     <p:spTree>
@@ -6573,8 +7093,8 @@
           </a:p>
         </p:txBody>
       </p:sp>
-      <mc:AlternateContent xmlns:mc="http://schemas.openxmlformats.org/markup-compatibility/2006" xmlns:a14="http://schemas.microsoft.com/office/drawing/2010/main">
-        <mc:Choice Requires="a14">
+      <mc:AlternateContent xmlns:mc="http://schemas.openxmlformats.org/markup-compatibility/2006">
+        <mc:Choice xmlns:a14="http://schemas.microsoft.com/office/drawing/2010/main" Requires="a14">
           <p:sp>
             <p:nvSpPr>
               <p:cNvPr id="3" name="Content Placeholder 2"/>
@@ -6619,16 +7139,12 @@
                     <m:sSubSup>
                       <m:sSubSupPr>
                         <m:ctrlPr>
-                          <a:rPr lang="en-US" i="1">
-                            <a:latin typeface="Cambria Math"/>
-                          </a:rPr>
+                          <a:rPr lang="en-US" i="1"/>
                         </m:ctrlPr>
                       </m:sSubSupPr>
                       <m:e>
                         <m:r>
-                          <a:rPr lang="en-US" i="1">
-                            <a:latin typeface="Cambria Math"/>
-                          </a:rPr>
+                          <a:rPr lang="en-US" i="1"/>
                           <m:t>𝜂</m:t>
                         </m:r>
                       </m:e>
@@ -6642,9 +7158,7 @@
                       </m:sub>
                       <m:sup>
                         <m:r>
-                          <a:rPr lang="en-US" i="1">
-                            <a:latin typeface="Cambria Math"/>
-                          </a:rPr>
+                          <a:rPr lang="en-US" i="1"/>
                           <m:t>2</m:t>
                         </m:r>
                       </m:sup>
@@ -6671,7 +7185,7 @@
             </p:txBody>
           </p:sp>
         </mc:Choice>
-        <mc:Fallback xmlns="">
+        <mc:Fallback>
           <p:sp>
             <p:nvSpPr>
               <p:cNvPr id="3" name="Content Placeholder 2"/>
@@ -6751,7 +7265,7 @@
 </p:sld>
 </file>
 
-<file path=ppt/slides/slide34.xml><?xml version="1.0" encoding="utf-8"?>
+<file path=ppt/slides/slide37.xml><?xml version="1.0" encoding="utf-8"?>
 <p:sld xmlns:a="http://schemas.openxmlformats.org/drawingml/2006/main" xmlns:r="http://schemas.openxmlformats.org/officeDocument/2006/relationships" xmlns:p="http://schemas.openxmlformats.org/presentationml/2006/main">
   <p:cSld>
     <p:spTree>
@@ -6803,15 +7317,10 @@
                 <p:ph sz="half" idx="1"/>
               </p:nvPr>
             </p:nvSpPr>
-            <p:spPr>
-              <a:xfrm>
-                <a:off x="838200" y="1825625"/>
-                <a:ext cx="5181600" cy="4839126"/>
-              </a:xfrm>
-            </p:spPr>
+            <p:spPr/>
             <p:txBody>
               <a:bodyPr>
-                <a:normAutofit fontScale="77500" lnSpcReduction="20000"/>
+                <a:normAutofit fontScale="70000" lnSpcReduction="20000"/>
               </a:bodyPr>
               <a:lstStyle/>
               <a:p>
@@ -6837,27 +7346,19 @@
                 </a:r>
                 <a:r>
                   <a:rPr lang="en-US" dirty="0"/>
-                  <a:t>(1, 36) = </a:t>
-                </a:r>
-                <a:r>
-                  <a:rPr lang="en-US" dirty="0" smtClean="0"/>
-                  <a:t>571.82, </a:t>
+                  <a:t>(1, 36) = 571.82 </a:t>
                 </a:r>
                 <a14:m>
                   <m:oMath xmlns:m="http://schemas.openxmlformats.org/officeDocument/2006/math">
                     <m:sSubSup>
                       <m:sSubSupPr>
                         <m:ctrlPr>
-                          <a:rPr lang="en-US" i="1">
-                            <a:latin typeface="Cambria Math"/>
-                          </a:rPr>
+                          <a:rPr lang="en-US" i="1"/>
                         </m:ctrlPr>
                       </m:sSubSupPr>
                       <m:e>
                         <m:r>
-                          <a:rPr lang="en-US" i="1">
-                            <a:latin typeface="Cambria Math"/>
-                          </a:rPr>
+                          <a:rPr lang="en-US" i="1"/>
                           <m:t>𝜂</m:t>
                         </m:r>
                       </m:e>
@@ -6871,9 +7372,7 @@
                       </m:sub>
                       <m:sup>
                         <m:r>
-                          <a:rPr lang="en-US" i="1">
-                            <a:latin typeface="Cambria Math"/>
-                          </a:rPr>
+                          <a:rPr lang="en-US" i="1"/>
                           <m:t>2</m:t>
                         </m:r>
                       </m:sup>
@@ -6909,14 +7408,10 @@
               </p:nvPr>
             </p:nvSpPr>
             <p:spPr>
-              <a:xfrm>
-                <a:off x="838200" y="1825625"/>
-                <a:ext cx="5181600" cy="4839126"/>
-              </a:xfrm>
-              <a:blipFill rotWithShape="1">
+              <a:blipFill rotWithShape="0">
                 <a:blip r:embed="rId2"/>
                 <a:stretch>
-                  <a:fillRect l="-1412" t="-2519" r="-2118" b="-2141"/>
+                  <a:fillRect l="-1059" t="-2521" r="-2000"/>
                 </a:stretch>
               </a:blipFill>
             </p:spPr>
@@ -6925,7 +7420,7 @@
               <a:lstStyle/>
               <a:p>
                 <a:r>
-                  <a:rPr lang="en-GB">
+                  <a:rPr lang="en-US">
                     <a:noFill/>
                   </a:rPr>
                   <a:t> </a:t>
@@ -6972,18 +7467,10 @@
         <p:spPr/>
         <p:txBody>
           <a:bodyPr>
-            <a:normAutofit fontScale="77500" lnSpcReduction="20000"/>
+            <a:normAutofit fontScale="70000" lnSpcReduction="20000"/>
           </a:bodyPr>
           <a:lstStyle/>
           <a:p>
-            <a:r>
-              <a:rPr lang="en-US" dirty="0" smtClean="0"/>
-              <a:t>Note that no pairwise comparisons are needed when both factors in the interaction only have </a:t>
-            </a:r>
-            <a:r>
-              <a:rPr lang="en-US" smtClean="0"/>
-              <a:t>two levels</a:t>
-            </a:r>
             <a:endParaRPr lang="en-US" dirty="0"/>
           </a:p>
         </p:txBody>
@@ -7008,7 +7495,7 @@
 </p:sld>
 </file>
 
-<file path=ppt/slides/slide35.xml><?xml version="1.0" encoding="utf-8"?>
+<file path=ppt/slides/slide38.xml><?xml version="1.0" encoding="utf-8"?>
 <p:sld xmlns:a="http://schemas.openxmlformats.org/drawingml/2006/main" xmlns:r="http://schemas.openxmlformats.org/officeDocument/2006/relationships" xmlns:p="http://schemas.openxmlformats.org/presentationml/2006/main">
   <p:cSld>
     <p:spTree>
@@ -7152,7 +7639,7 @@
 </p:sld>
 </file>
 
-<file path=ppt/slides/slide36.xml><?xml version="1.0" encoding="utf-8"?>
+<file path=ppt/slides/slide39.xml><?xml version="1.0" encoding="utf-8"?>
 <p:sld xmlns:a="http://schemas.openxmlformats.org/drawingml/2006/main" xmlns:r="http://schemas.openxmlformats.org/officeDocument/2006/relationships" xmlns:p="http://schemas.openxmlformats.org/presentationml/2006/main">
   <p:cSld>
     <p:spTree>
@@ -7287,7 +7774,7 @@
           <a:graphicData uri="http://schemas.openxmlformats.org/presentationml/2006/ole">
             <mc:AlternateContent xmlns:mc="http://schemas.openxmlformats.org/markup-compatibility/2006">
               <mc:Choice xmlns:v="urn:schemas-microsoft-com:vml" Requires="v">
-                <p:oleObj spid="_x0000_s4106" r:id="rId3" imgW="27225360" imgH="15898320" progId="">
+                <p:oleObj spid="_x0000_s4103" r:id="rId3" imgW="27225360" imgH="15898320" progId="">
                   <p:embed/>
                 </p:oleObj>
               </mc:Choice>
@@ -7368,7 +7855,131 @@
 </p:sld>
 </file>
 
-<file path=ppt/slides/slide37.xml><?xml version="1.0" encoding="utf-8"?>
+<file path=ppt/slides/slide4.xml><?xml version="1.0" encoding="utf-8"?>
+<p:sld xmlns:a="http://schemas.openxmlformats.org/drawingml/2006/main" xmlns:r="http://schemas.openxmlformats.org/officeDocument/2006/relationships" xmlns:p="http://schemas.openxmlformats.org/presentationml/2006/main">
+  <p:cSld>
+    <p:spTree>
+      <p:nvGrpSpPr>
+        <p:cNvPr id="1" name=""/>
+        <p:cNvGrpSpPr/>
+        <p:nvPr/>
+      </p:nvGrpSpPr>
+      <p:grpSpPr>
+        <a:xfrm>
+          <a:off x="0" y="0"/>
+          <a:ext cx="0" cy="0"/>
+          <a:chOff x="0" y="0"/>
+          <a:chExt cx="0" cy="0"/>
+        </a:xfrm>
+      </p:grpSpPr>
+      <p:sp>
+        <p:nvSpPr>
+          <p:cNvPr id="2" name="Title 1"/>
+          <p:cNvSpPr>
+            <a:spLocks noGrp="1"/>
+          </p:cNvSpPr>
+          <p:nvPr>
+            <p:ph type="title"/>
+          </p:nvPr>
+        </p:nvSpPr>
+        <p:spPr/>
+        <p:txBody>
+          <a:bodyPr/>
+          <a:lstStyle/>
+          <a:p>
+            <a:r>
+              <a:rPr lang="en-US" dirty="0" smtClean="0"/>
+              <a:t>Text import wizard</a:t>
+            </a:r>
+            <a:endParaRPr lang="en-US" dirty="0"/>
+          </a:p>
+        </p:txBody>
+      </p:sp>
+      <p:sp>
+        <p:nvSpPr>
+          <p:cNvPr id="3" name="Content Placeholder 2"/>
+          <p:cNvSpPr>
+            <a:spLocks noGrp="1"/>
+          </p:cNvSpPr>
+          <p:nvPr>
+            <p:ph idx="1"/>
+          </p:nvPr>
+        </p:nvSpPr>
+        <p:spPr>
+          <a:xfrm>
+            <a:off x="838200" y="1825625"/>
+            <a:ext cx="4871830" cy="4351338"/>
+          </a:xfrm>
+        </p:spPr>
+        <p:txBody>
+          <a:bodyPr/>
+          <a:lstStyle/>
+          <a:p>
+            <a:r>
+              <a:rPr lang="en-US" dirty="0" smtClean="0"/>
+              <a:t>Select “Delimited” (since the data are comma delimited)</a:t>
+            </a:r>
+          </a:p>
+          <a:p>
+            <a:r>
+              <a:rPr lang="en-US" dirty="0" smtClean="0"/>
+              <a:t>Select “Yes”, since the first line contains column names</a:t>
+            </a:r>
+          </a:p>
+          <a:p>
+            <a:r>
+              <a:rPr lang="en-US" dirty="0" smtClean="0"/>
+              <a:t>Press Next</a:t>
+            </a:r>
+            <a:endParaRPr lang="en-US" dirty="0"/>
+          </a:p>
+        </p:txBody>
+      </p:sp>
+      <p:pic>
+        <p:nvPicPr>
+          <p:cNvPr id="5" name="Picture 4"/>
+          <p:cNvPicPr>
+            <a:picLocks noChangeAspect="1"/>
+          </p:cNvPicPr>
+          <p:nvPr/>
+        </p:nvPicPr>
+        <p:blipFill>
+          <a:blip r:embed="rId2"/>
+          <a:stretch>
+            <a:fillRect/>
+          </a:stretch>
+        </p:blipFill>
+        <p:spPr>
+          <a:xfrm>
+            <a:off x="5796170" y="1133890"/>
+            <a:ext cx="4723838" cy="4572000"/>
+          </a:xfrm>
+          <a:prstGeom prst="rect">
+            <a:avLst/>
+          </a:prstGeom>
+        </p:spPr>
+      </p:pic>
+    </p:spTree>
+    <p:extLst>
+      <p:ext uri="{BB962C8B-B14F-4D97-AF65-F5344CB8AC3E}">
+        <p14:creationId xmlns:p14="http://schemas.microsoft.com/office/powerpoint/2010/main" val="1726033333"/>
+      </p:ext>
+    </p:extLst>
+  </p:cSld>
+  <p:clrMapOvr>
+    <a:masterClrMapping/>
+  </p:clrMapOvr>
+  <p:timing>
+    <p:tnLst>
+      <p:par>
+        <p:cTn id="1" dur="indefinite" restart="never" nodeType="tmRoot"/>
+      </p:par>
+    </p:tnLst>
+  </p:timing>
+</p:sld>
+</file>
+
+<file path=ppt/slides/slide40.xml><?xml version="1.0" encoding="utf-8"?>
 <p:sld xmlns:a="http://schemas.openxmlformats.org/drawingml/2006/main" xmlns:r="http://schemas.openxmlformats.org/officeDocument/2006/relationships" xmlns:p="http://schemas.openxmlformats.org/presentationml/2006/main">
   <p:cSld>
     <p:spTree>
@@ -7500,7 +8111,7 @@
 </p:sld>
 </file>
 
-<file path=ppt/slides/slide38.xml><?xml version="1.0" encoding="utf-8"?>
+<file path=ppt/slides/slide41.xml><?xml version="1.0" encoding="utf-8"?>
 <p:sld xmlns:a="http://schemas.openxmlformats.org/drawingml/2006/main" xmlns:r="http://schemas.openxmlformats.org/officeDocument/2006/relationships" xmlns:p="http://schemas.openxmlformats.org/presentationml/2006/main">
   <p:cSld>
     <p:spTree>
@@ -7634,7 +8245,7 @@
 </p:sld>
 </file>
 
-<file path=ppt/slides/slide39.xml><?xml version="1.0" encoding="utf-8"?>
+<file path=ppt/slides/slide42.xml><?xml version="1.0" encoding="utf-8"?>
 <p:sld xmlns:a="http://schemas.openxmlformats.org/drawingml/2006/main" xmlns:r="http://schemas.openxmlformats.org/officeDocument/2006/relationships" xmlns:p="http://schemas.openxmlformats.org/presentationml/2006/main">
   <p:cSld>
     <p:spTree>
@@ -7705,130 +8316,6 @@
     <p:extLst>
       <p:ext uri="{BB962C8B-B14F-4D97-AF65-F5344CB8AC3E}">
         <p14:creationId xmlns:p14="http://schemas.microsoft.com/office/powerpoint/2010/main" val="497935006"/>
-      </p:ext>
-    </p:extLst>
-  </p:cSld>
-  <p:clrMapOvr>
-    <a:masterClrMapping/>
-  </p:clrMapOvr>
-  <p:timing>
-    <p:tnLst>
-      <p:par>
-        <p:cTn id="1" dur="indefinite" restart="never" nodeType="tmRoot"/>
-      </p:par>
-    </p:tnLst>
-  </p:timing>
-</p:sld>
-</file>
-
-<file path=ppt/slides/slide4.xml><?xml version="1.0" encoding="utf-8"?>
-<p:sld xmlns:a="http://schemas.openxmlformats.org/drawingml/2006/main" xmlns:r="http://schemas.openxmlformats.org/officeDocument/2006/relationships" xmlns:p="http://schemas.openxmlformats.org/presentationml/2006/main">
-  <p:cSld>
-    <p:spTree>
-      <p:nvGrpSpPr>
-        <p:cNvPr id="1" name=""/>
-        <p:cNvGrpSpPr/>
-        <p:nvPr/>
-      </p:nvGrpSpPr>
-      <p:grpSpPr>
-        <a:xfrm>
-          <a:off x="0" y="0"/>
-          <a:ext cx="0" cy="0"/>
-          <a:chOff x="0" y="0"/>
-          <a:chExt cx="0" cy="0"/>
-        </a:xfrm>
-      </p:grpSpPr>
-      <p:sp>
-        <p:nvSpPr>
-          <p:cNvPr id="2" name="Title 1"/>
-          <p:cNvSpPr>
-            <a:spLocks noGrp="1"/>
-          </p:cNvSpPr>
-          <p:nvPr>
-            <p:ph type="title"/>
-          </p:nvPr>
-        </p:nvSpPr>
-        <p:spPr/>
-        <p:txBody>
-          <a:bodyPr/>
-          <a:lstStyle/>
-          <a:p>
-            <a:r>
-              <a:rPr lang="en-US" dirty="0" smtClean="0"/>
-              <a:t>Text import wizard</a:t>
-            </a:r>
-            <a:endParaRPr lang="en-US" dirty="0"/>
-          </a:p>
-        </p:txBody>
-      </p:sp>
-      <p:sp>
-        <p:nvSpPr>
-          <p:cNvPr id="3" name="Content Placeholder 2"/>
-          <p:cNvSpPr>
-            <a:spLocks noGrp="1"/>
-          </p:cNvSpPr>
-          <p:nvPr>
-            <p:ph idx="1"/>
-          </p:nvPr>
-        </p:nvSpPr>
-        <p:spPr>
-          <a:xfrm>
-            <a:off x="838200" y="1825625"/>
-            <a:ext cx="4871830" cy="4351338"/>
-          </a:xfrm>
-        </p:spPr>
-        <p:txBody>
-          <a:bodyPr/>
-          <a:lstStyle/>
-          <a:p>
-            <a:r>
-              <a:rPr lang="en-US" dirty="0" smtClean="0"/>
-              <a:t>Select “Delimited” (since the data are comma delimited)</a:t>
-            </a:r>
-          </a:p>
-          <a:p>
-            <a:r>
-              <a:rPr lang="en-US" dirty="0" smtClean="0"/>
-              <a:t>Select “Yes”, since the first line contains column names</a:t>
-            </a:r>
-          </a:p>
-          <a:p>
-            <a:r>
-              <a:rPr lang="en-US" dirty="0" smtClean="0"/>
-              <a:t>Press Next</a:t>
-            </a:r>
-            <a:endParaRPr lang="en-US" dirty="0"/>
-          </a:p>
-        </p:txBody>
-      </p:sp>
-      <p:pic>
-        <p:nvPicPr>
-          <p:cNvPr id="5" name="Picture 4"/>
-          <p:cNvPicPr>
-            <a:picLocks noChangeAspect="1"/>
-          </p:cNvPicPr>
-          <p:nvPr/>
-        </p:nvPicPr>
-        <p:blipFill>
-          <a:blip r:embed="rId2"/>
-          <a:stretch>
-            <a:fillRect/>
-          </a:stretch>
-        </p:blipFill>
-        <p:spPr>
-          <a:xfrm>
-            <a:off x="5796170" y="1133890"/>
-            <a:ext cx="4723838" cy="4572000"/>
-          </a:xfrm>
-          <a:prstGeom prst="rect">
-            <a:avLst/>
-          </a:prstGeom>
-        </p:spPr>
-      </p:pic>
-    </p:spTree>
-    <p:extLst>
-      <p:ext uri="{BB962C8B-B14F-4D97-AF65-F5344CB8AC3E}">
-        <p14:creationId xmlns:p14="http://schemas.microsoft.com/office/powerpoint/2010/main" val="1726033333"/>
       </p:ext>
     </p:extLst>
   </p:cSld>
@@ -8456,7 +8943,7 @@
           <a:graphicData uri="http://schemas.openxmlformats.org/presentationml/2006/ole">
             <mc:AlternateContent xmlns:mc="http://schemas.openxmlformats.org/markup-compatibility/2006">
               <mc:Choice xmlns:v="urn:schemas-microsoft-com:vml" Requires="v">
-                <p:oleObj spid="_x0000_s1059" r:id="rId3" imgW="27110880" imgH="15301440" progId="">
+                <p:oleObj spid="_x0000_s1056" r:id="rId3" imgW="27110880" imgH="15301440" progId="">
                   <p:embed/>
                 </p:oleObj>
               </mc:Choice>
@@ -8554,7 +9041,7 @@
     </a:clrScheme>
     <a:fontScheme name="Office">
       <a:majorFont>
-        <a:latin typeface="Calibri Light"/>
+        <a:latin typeface="Calibri Light" panose="020F0302020204030204"/>
         <a:ea typeface=""/>
         <a:cs typeface=""/>
         <a:font script="Jpan" typeface="ＭＳ Ｐゴシック"/>
@@ -8589,7 +9076,7 @@
         <a:font script="Geor" typeface="Sylfaen"/>
       </a:majorFont>
       <a:minorFont>
-        <a:latin typeface="Calibri"/>
+        <a:latin typeface="Calibri" panose="020F0502020204030204"/>
         <a:ea typeface=""/>
         <a:cs typeface=""/>
         <a:font script="Jpan" typeface="ＭＳ Ｐゴシック"/>
@@ -8766,7 +9253,7 @@
   <a:extraClrSchemeLst/>
   <a:extLst>
     <a:ext uri="{05A4C25C-085E-4340-85A3-A5531E510DB2}">
-      <thm15:themeFamily xmlns:thm15="http://schemas.microsoft.com/office/thememl/2012/main" xmlns="" name="Office Theme" id="{62F939B6-93AF-4DB8-9C6B-D6C7DFDC589F}" vid="{4A3C46E8-61CC-4603-A589-7422A47A8E4A}"/>
+      <thm15:themeFamily xmlns:thm15="http://schemas.microsoft.com/office/thememl/2012/main" name="Office Theme" id="{62F939B6-93AF-4DB8-9C6B-D6C7DFDC589F}" vid="{4A3C46E8-61CC-4603-A589-7422A47A8E4A}"/>
     </a:ext>
   </a:extLst>
 </a:theme>

</xml_diff>

<commit_message>
More work on Class 6
</commit_message>
<xml_diff>
--- a/Homework 4/Homework 4 in SPSS.pptx
+++ b/Homework 4/Homework 4 in SPSS.pptx
@@ -20,33 +20,30 @@
     <p:sldId id="270" r:id="rId14"/>
     <p:sldId id="271" r:id="rId15"/>
     <p:sldId id="273" r:id="rId16"/>
-    <p:sldId id="274" r:id="rId17"/>
-    <p:sldId id="275" r:id="rId18"/>
-    <p:sldId id="276" r:id="rId19"/>
-    <p:sldId id="277" r:id="rId20"/>
-    <p:sldId id="280" r:id="rId21"/>
-    <p:sldId id="281" r:id="rId22"/>
-    <p:sldId id="282" r:id="rId23"/>
-    <p:sldId id="283" r:id="rId24"/>
-    <p:sldId id="284" r:id="rId25"/>
-    <p:sldId id="285" r:id="rId26"/>
-    <p:sldId id="286" r:id="rId27"/>
-    <p:sldId id="287" r:id="rId28"/>
-    <p:sldId id="288" r:id="rId29"/>
-    <p:sldId id="289" r:id="rId30"/>
-    <p:sldId id="290" r:id="rId31"/>
-    <p:sldId id="291" r:id="rId32"/>
-    <p:sldId id="293" r:id="rId33"/>
-    <p:sldId id="292" r:id="rId34"/>
-    <p:sldId id="294" r:id="rId35"/>
-    <p:sldId id="295" r:id="rId36"/>
-    <p:sldId id="296" r:id="rId37"/>
-    <p:sldId id="297" r:id="rId38"/>
-    <p:sldId id="298" r:id="rId39"/>
-    <p:sldId id="299" r:id="rId40"/>
-    <p:sldId id="300" r:id="rId41"/>
-    <p:sldId id="301" r:id="rId42"/>
-    <p:sldId id="302" r:id="rId43"/>
+    <p:sldId id="276" r:id="rId17"/>
+    <p:sldId id="277" r:id="rId18"/>
+    <p:sldId id="280" r:id="rId19"/>
+    <p:sldId id="281" r:id="rId20"/>
+    <p:sldId id="282" r:id="rId21"/>
+    <p:sldId id="283" r:id="rId22"/>
+    <p:sldId id="284" r:id="rId23"/>
+    <p:sldId id="285" r:id="rId24"/>
+    <p:sldId id="286" r:id="rId25"/>
+    <p:sldId id="287" r:id="rId26"/>
+    <p:sldId id="288" r:id="rId27"/>
+    <p:sldId id="289" r:id="rId28"/>
+    <p:sldId id="290" r:id="rId29"/>
+    <p:sldId id="291" r:id="rId30"/>
+    <p:sldId id="293" r:id="rId31"/>
+    <p:sldId id="292" r:id="rId32"/>
+    <p:sldId id="295" r:id="rId33"/>
+    <p:sldId id="296" r:id="rId34"/>
+    <p:sldId id="297" r:id="rId35"/>
+    <p:sldId id="298" r:id="rId36"/>
+    <p:sldId id="299" r:id="rId37"/>
+    <p:sldId id="300" r:id="rId38"/>
+    <p:sldId id="301" r:id="rId39"/>
+    <p:sldId id="302" r:id="rId40"/>
   </p:sldIdLst>
   <p:sldSz cx="12192000" cy="6858000"/>
   <p:notesSz cx="6858000" cy="9144000"/>
@@ -279,7 +276,7 @@
           <a:p>
             <a:fld id="{1BE25CBA-E170-42E9-9F93-AF8F30908BBD}" type="datetimeFigureOut">
               <a:rPr lang="en-US" smtClean="0"/>
-              <a:t>11/4/2014</a:t>
+              <a:t>11/5/2014</a:t>
             </a:fld>
             <a:endParaRPr lang="en-US"/>
           </a:p>
@@ -449,7 +446,7 @@
           <a:p>
             <a:fld id="{1BE25CBA-E170-42E9-9F93-AF8F30908BBD}" type="datetimeFigureOut">
               <a:rPr lang="en-US" smtClean="0"/>
-              <a:t>11/4/2014</a:t>
+              <a:t>11/5/2014</a:t>
             </a:fld>
             <a:endParaRPr lang="en-US"/>
           </a:p>
@@ -629,7 +626,7 @@
           <a:p>
             <a:fld id="{1BE25CBA-E170-42E9-9F93-AF8F30908BBD}" type="datetimeFigureOut">
               <a:rPr lang="en-US" smtClean="0"/>
-              <a:t>11/4/2014</a:t>
+              <a:t>11/5/2014</a:t>
             </a:fld>
             <a:endParaRPr lang="en-US"/>
           </a:p>
@@ -799,7 +796,7 @@
           <a:p>
             <a:fld id="{1BE25CBA-E170-42E9-9F93-AF8F30908BBD}" type="datetimeFigureOut">
               <a:rPr lang="en-US" smtClean="0"/>
-              <a:t>11/4/2014</a:t>
+              <a:t>11/5/2014</a:t>
             </a:fld>
             <a:endParaRPr lang="en-US"/>
           </a:p>
@@ -1045,7 +1042,7 @@
           <a:p>
             <a:fld id="{1BE25CBA-E170-42E9-9F93-AF8F30908BBD}" type="datetimeFigureOut">
               <a:rPr lang="en-US" smtClean="0"/>
-              <a:t>11/4/2014</a:t>
+              <a:t>11/5/2014</a:t>
             </a:fld>
             <a:endParaRPr lang="en-US"/>
           </a:p>
@@ -1277,7 +1274,7 @@
           <a:p>
             <a:fld id="{1BE25CBA-E170-42E9-9F93-AF8F30908BBD}" type="datetimeFigureOut">
               <a:rPr lang="en-US" smtClean="0"/>
-              <a:t>11/4/2014</a:t>
+              <a:t>11/5/2014</a:t>
             </a:fld>
             <a:endParaRPr lang="en-US"/>
           </a:p>
@@ -1644,7 +1641,7 @@
           <a:p>
             <a:fld id="{1BE25CBA-E170-42E9-9F93-AF8F30908BBD}" type="datetimeFigureOut">
               <a:rPr lang="en-US" smtClean="0"/>
-              <a:t>11/4/2014</a:t>
+              <a:t>11/5/2014</a:t>
             </a:fld>
             <a:endParaRPr lang="en-US"/>
           </a:p>
@@ -1762,7 +1759,7 @@
           <a:p>
             <a:fld id="{1BE25CBA-E170-42E9-9F93-AF8F30908BBD}" type="datetimeFigureOut">
               <a:rPr lang="en-US" smtClean="0"/>
-              <a:t>11/4/2014</a:t>
+              <a:t>11/5/2014</a:t>
             </a:fld>
             <a:endParaRPr lang="en-US"/>
           </a:p>
@@ -1857,7 +1854,7 @@
           <a:p>
             <a:fld id="{1BE25CBA-E170-42E9-9F93-AF8F30908BBD}" type="datetimeFigureOut">
               <a:rPr lang="en-US" smtClean="0"/>
-              <a:t>11/4/2014</a:t>
+              <a:t>11/5/2014</a:t>
             </a:fld>
             <a:endParaRPr lang="en-US"/>
           </a:p>
@@ -2134,7 +2131,7 @@
           <a:p>
             <a:fld id="{1BE25CBA-E170-42E9-9F93-AF8F30908BBD}" type="datetimeFigureOut">
               <a:rPr lang="en-US" smtClean="0"/>
-              <a:t>11/4/2014</a:t>
+              <a:t>11/5/2014</a:t>
             </a:fld>
             <a:endParaRPr lang="en-US"/>
           </a:p>
@@ -2387,7 +2384,7 @@
           <a:p>
             <a:fld id="{1BE25CBA-E170-42E9-9F93-AF8F30908BBD}" type="datetimeFigureOut">
               <a:rPr lang="en-US" smtClean="0"/>
-              <a:t>11/4/2014</a:t>
+              <a:t>11/5/2014</a:t>
             </a:fld>
             <a:endParaRPr lang="en-US"/>
           </a:p>
@@ -2600,7 +2597,7 @@
           <a:p>
             <a:fld id="{1BE25CBA-E170-42E9-9F93-AF8F30908BBD}" type="datetimeFigureOut">
               <a:rPr lang="en-US" smtClean="0"/>
-              <a:t>11/4/2014</a:t>
+              <a:t>11/5/2014</a:t>
             </a:fld>
             <a:endParaRPr lang="en-US"/>
           </a:p>
@@ -3397,7 +3394,7 @@
           <a:graphicData uri="http://schemas.openxmlformats.org/presentationml/2006/ole">
             <mc:AlternateContent xmlns:mc="http://schemas.openxmlformats.org/markup-compatibility/2006">
               <mc:Choice xmlns:v="urn:schemas-microsoft-com:vml" Requires="v">
-                <p:oleObj spid="_x0000_s2074" r:id="rId3" imgW="27580680" imgH="15631560" progId="">
+                <p:oleObj spid="_x0000_s2077" r:id="rId3" imgW="27580680" imgH="15631560" progId="">
                   <p:embed/>
                 </p:oleObj>
               </mc:Choice>
@@ -3845,250 +3842,6 @@
           <a:p>
             <a:r>
               <a:rPr lang="en-US" dirty="0" smtClean="0"/>
-              <a:t>Run the analysis</a:t>
-            </a:r>
-            <a:endParaRPr lang="en-US" dirty="0"/>
-          </a:p>
-        </p:txBody>
-      </p:sp>
-      <p:sp>
-        <p:nvSpPr>
-          <p:cNvPr id="3" name="Content Placeholder 2"/>
-          <p:cNvSpPr>
-            <a:spLocks noGrp="1"/>
-          </p:cNvSpPr>
-          <p:nvPr>
-            <p:ph sz="half" idx="1"/>
-          </p:nvPr>
-        </p:nvSpPr>
-        <p:spPr/>
-        <p:txBody>
-          <a:bodyPr/>
-          <a:lstStyle/>
-          <a:p>
-            <a:r>
-              <a:rPr lang="en-US" dirty="0" smtClean="0"/>
-              <a:t>Add a name for the dependent measure (e.g. “</a:t>
-            </a:r>
-            <a:r>
-              <a:rPr lang="en-US" dirty="0" err="1" smtClean="0"/>
-              <a:t>food_eaten</a:t>
-            </a:r>
-            <a:r>
-              <a:rPr lang="en-US" dirty="0" smtClean="0"/>
-              <a:t>”)</a:t>
-            </a:r>
-          </a:p>
-          <a:p>
-            <a:r>
-              <a:rPr lang="en-US" dirty="0" smtClean="0"/>
-              <a:t>Click “Add” and “Define”.</a:t>
-            </a:r>
-            <a:endParaRPr lang="en-US" dirty="0"/>
-          </a:p>
-        </p:txBody>
-      </p:sp>
-      <p:pic>
-        <p:nvPicPr>
-          <p:cNvPr id="5" name="Content Placeholder 4"/>
-          <p:cNvPicPr>
-            <a:picLocks noGrp="1" noChangeAspect="1"/>
-          </p:cNvPicPr>
-          <p:nvPr>
-            <p:ph sz="half" idx="2"/>
-          </p:nvPr>
-        </p:nvPicPr>
-        <p:blipFill>
-          <a:blip r:embed="rId2"/>
-          <a:stretch>
-            <a:fillRect/>
-          </a:stretch>
-        </p:blipFill>
-        <p:spPr>
-          <a:xfrm>
-            <a:off x="7270205" y="1825625"/>
-            <a:ext cx="2985589" cy="4351338"/>
-          </a:xfrm>
-          <a:prstGeom prst="rect">
-            <a:avLst/>
-          </a:prstGeom>
-        </p:spPr>
-      </p:pic>
-    </p:spTree>
-    <p:extLst>
-      <p:ext uri="{BB962C8B-B14F-4D97-AF65-F5344CB8AC3E}">
-        <p14:creationId xmlns:p14="http://schemas.microsoft.com/office/powerpoint/2010/main" val="185833518"/>
-      </p:ext>
-    </p:extLst>
-  </p:cSld>
-  <p:clrMapOvr>
-    <a:masterClrMapping/>
-  </p:clrMapOvr>
-  <p:timing>
-    <p:tnLst>
-      <p:par>
-        <p:cTn id="1" dur="indefinite" restart="never" nodeType="tmRoot"/>
-      </p:par>
-    </p:tnLst>
-  </p:timing>
-</p:sld>
-</file>
-
-<file path=ppt/slides/slide17.xml><?xml version="1.0" encoding="utf-8"?>
-<p:sld xmlns:a="http://schemas.openxmlformats.org/drawingml/2006/main" xmlns:r="http://schemas.openxmlformats.org/officeDocument/2006/relationships" xmlns:p="http://schemas.openxmlformats.org/presentationml/2006/main">
-  <p:cSld>
-    <p:spTree>
-      <p:nvGrpSpPr>
-        <p:cNvPr id="1" name=""/>
-        <p:cNvGrpSpPr/>
-        <p:nvPr/>
-      </p:nvGrpSpPr>
-      <p:grpSpPr>
-        <a:xfrm>
-          <a:off x="0" y="0"/>
-          <a:ext cx="0" cy="0"/>
-          <a:chOff x="0" y="0"/>
-          <a:chExt cx="0" cy="0"/>
-        </a:xfrm>
-      </p:grpSpPr>
-      <p:sp>
-        <p:nvSpPr>
-          <p:cNvPr id="2" name="Title 1"/>
-          <p:cNvSpPr>
-            <a:spLocks noGrp="1"/>
-          </p:cNvSpPr>
-          <p:nvPr>
-            <p:ph type="title"/>
-          </p:nvPr>
-        </p:nvSpPr>
-        <p:spPr/>
-        <p:txBody>
-          <a:bodyPr/>
-          <a:lstStyle/>
-          <a:p>
-            <a:r>
-              <a:rPr lang="en-US" dirty="0" smtClean="0"/>
-              <a:t>Assign within-subjects variables</a:t>
-            </a:r>
-            <a:endParaRPr lang="en-US" dirty="0"/>
-          </a:p>
-        </p:txBody>
-      </p:sp>
-      <p:sp>
-        <p:nvSpPr>
-          <p:cNvPr id="3" name="Content Placeholder 2"/>
-          <p:cNvSpPr>
-            <a:spLocks noGrp="1"/>
-          </p:cNvSpPr>
-          <p:nvPr>
-            <p:ph sz="half" idx="1"/>
-          </p:nvPr>
-        </p:nvSpPr>
-        <p:spPr/>
-        <p:txBody>
-          <a:bodyPr/>
-          <a:lstStyle/>
-          <a:p>
-            <a:r>
-              <a:rPr lang="en-US" dirty="0" smtClean="0"/>
-              <a:t>Click on each column name, then on the corresponding level of the within subjects variables and then on the arrow to assign it.</a:t>
-            </a:r>
-          </a:p>
-          <a:p>
-            <a:r>
-              <a:rPr lang="en-US" dirty="0" smtClean="0"/>
-              <a:t>You need to decide which level corresponds to which numbers</a:t>
-            </a:r>
-          </a:p>
-          <a:p>
-            <a:pPr lvl="1"/>
-            <a:r>
-              <a:rPr lang="en-US" dirty="0" smtClean="0"/>
-              <a:t>e.g. 1,1 could correspond to beef, fish and 2,2 could correspond to no fish, no beef, etc.</a:t>
-            </a:r>
-          </a:p>
-        </p:txBody>
-      </p:sp>
-      <p:pic>
-        <p:nvPicPr>
-          <p:cNvPr id="5" name="Content Placeholder 4"/>
-          <p:cNvPicPr>
-            <a:picLocks noGrp="1" noChangeAspect="1"/>
-          </p:cNvPicPr>
-          <p:nvPr>
-            <p:ph sz="half" idx="2"/>
-          </p:nvPr>
-        </p:nvPicPr>
-        <p:blipFill>
-          <a:blip r:embed="rId2"/>
-          <a:stretch>
-            <a:fillRect/>
-          </a:stretch>
-        </p:blipFill>
-        <p:spPr>
-          <a:xfrm>
-            <a:off x="6287747" y="1825625"/>
-            <a:ext cx="4950506" cy="4351338"/>
-          </a:xfrm>
-          <a:prstGeom prst="rect">
-            <a:avLst/>
-          </a:prstGeom>
-        </p:spPr>
-      </p:pic>
-    </p:spTree>
-    <p:extLst>
-      <p:ext uri="{BB962C8B-B14F-4D97-AF65-F5344CB8AC3E}">
-        <p14:creationId xmlns:p14="http://schemas.microsoft.com/office/powerpoint/2010/main" val="3741009431"/>
-      </p:ext>
-    </p:extLst>
-  </p:cSld>
-  <p:clrMapOvr>
-    <a:masterClrMapping/>
-  </p:clrMapOvr>
-  <p:timing>
-    <p:tnLst>
-      <p:par>
-        <p:cTn id="1" dur="indefinite" restart="never" nodeType="tmRoot"/>
-      </p:par>
-    </p:tnLst>
-  </p:timing>
-</p:sld>
-</file>
-
-<file path=ppt/slides/slide18.xml><?xml version="1.0" encoding="utf-8"?>
-<p:sld xmlns:a="http://schemas.openxmlformats.org/drawingml/2006/main" xmlns:r="http://schemas.openxmlformats.org/officeDocument/2006/relationships" xmlns:p="http://schemas.openxmlformats.org/presentationml/2006/main">
-  <p:cSld>
-    <p:spTree>
-      <p:nvGrpSpPr>
-        <p:cNvPr id="1" name=""/>
-        <p:cNvGrpSpPr/>
-        <p:nvPr/>
-      </p:nvGrpSpPr>
-      <p:grpSpPr>
-        <a:xfrm>
-          <a:off x="0" y="0"/>
-          <a:ext cx="0" cy="0"/>
-          <a:chOff x="0" y="0"/>
-          <a:chExt cx="0" cy="0"/>
-        </a:xfrm>
-      </p:grpSpPr>
-      <p:sp>
-        <p:nvSpPr>
-          <p:cNvPr id="2" name="Title 1"/>
-          <p:cNvSpPr>
-            <a:spLocks noGrp="1"/>
-          </p:cNvSpPr>
-          <p:nvPr>
-            <p:ph type="title"/>
-          </p:nvPr>
-        </p:nvSpPr>
-        <p:spPr/>
-        <p:txBody>
-          <a:bodyPr/>
-          <a:lstStyle/>
-          <a:p>
-            <a:r>
-              <a:rPr lang="en-US" dirty="0" smtClean="0"/>
               <a:t>Assign within-subjects variables</a:t>
             </a:r>
             <a:endParaRPr lang="en-US" dirty="0"/>
@@ -4184,7 +3937,7 @@
 </p:sld>
 </file>
 
-<file path=ppt/slides/slide19.xml><?xml version="1.0" encoding="utf-8"?>
+<file path=ppt/slides/slide17.xml><?xml version="1.0" encoding="utf-8"?>
 <p:sld xmlns:a="http://schemas.openxmlformats.org/drawingml/2006/main" xmlns:r="http://schemas.openxmlformats.org/officeDocument/2006/relationships" xmlns:p="http://schemas.openxmlformats.org/presentationml/2006/main">
   <p:cSld>
     <p:spTree>
@@ -4305,6 +4058,303 @@
 </p:sld>
 </file>
 
+<file path=ppt/slides/slide18.xml><?xml version="1.0" encoding="utf-8"?>
+<p:sld xmlns:a="http://schemas.openxmlformats.org/drawingml/2006/main" xmlns:r="http://schemas.openxmlformats.org/officeDocument/2006/relationships" xmlns:p="http://schemas.openxmlformats.org/presentationml/2006/main">
+  <p:cSld>
+    <p:spTree>
+      <p:nvGrpSpPr>
+        <p:cNvPr id="1" name=""/>
+        <p:cNvGrpSpPr/>
+        <p:nvPr/>
+      </p:nvGrpSpPr>
+      <p:grpSpPr>
+        <a:xfrm>
+          <a:off x="0" y="0"/>
+          <a:ext cx="0" cy="0"/>
+          <a:chOff x="0" y="0"/>
+          <a:chExt cx="0" cy="0"/>
+        </a:xfrm>
+      </p:grpSpPr>
+      <p:sp>
+        <p:nvSpPr>
+          <p:cNvPr id="2" name="Title 1"/>
+          <p:cNvSpPr>
+            <a:spLocks noGrp="1"/>
+          </p:cNvSpPr>
+          <p:nvPr>
+            <p:ph type="title"/>
+          </p:nvPr>
+        </p:nvSpPr>
+        <p:spPr/>
+        <p:txBody>
+          <a:bodyPr/>
+          <a:lstStyle/>
+          <a:p>
+            <a:r>
+              <a:rPr lang="en-US" dirty="0" smtClean="0"/>
+              <a:t>Post-hoc comparisons</a:t>
+            </a:r>
+            <a:endParaRPr lang="en-US" dirty="0"/>
+          </a:p>
+        </p:txBody>
+      </p:sp>
+      <p:sp>
+        <p:nvSpPr>
+          <p:cNvPr id="3" name="Content Placeholder 2"/>
+          <p:cNvSpPr>
+            <a:spLocks noGrp="1"/>
+          </p:cNvSpPr>
+          <p:nvPr>
+            <p:ph sz="half" idx="1"/>
+          </p:nvPr>
+        </p:nvSpPr>
+        <p:spPr/>
+        <p:txBody>
+          <a:bodyPr>
+            <a:normAutofit lnSpcReduction="10000"/>
+          </a:bodyPr>
+          <a:lstStyle/>
+          <a:p>
+            <a:r>
+              <a:rPr lang="en-US" dirty="0" smtClean="0"/>
+              <a:t>Click “Post Hoc…”</a:t>
+            </a:r>
+          </a:p>
+          <a:p>
+            <a:r>
+              <a:rPr lang="en-US" dirty="0" smtClean="0"/>
+              <a:t>Note that only factors with 3 or more levels are shown in the post hoc window</a:t>
+            </a:r>
+          </a:p>
+          <a:p>
+            <a:r>
+              <a:rPr lang="en-US" dirty="0" smtClean="0"/>
+              <a:t>Select “</a:t>
+            </a:r>
+            <a:r>
+              <a:rPr lang="en-US" dirty="0" err="1" smtClean="0"/>
+              <a:t>breed_factor</a:t>
+            </a:r>
+            <a:r>
+              <a:rPr lang="en-US" dirty="0" smtClean="0"/>
+              <a:t>” and move it over to the “Post hoc tests for” field</a:t>
+            </a:r>
+          </a:p>
+          <a:p>
+            <a:r>
+              <a:rPr lang="en-US" dirty="0" smtClean="0"/>
+              <a:t>Select any tests you want, e.g. </a:t>
+            </a:r>
+            <a:r>
+              <a:rPr lang="en-US" dirty="0" err="1" smtClean="0"/>
+              <a:t>Bonferroni</a:t>
+            </a:r>
+            <a:r>
+              <a:rPr lang="en-US" dirty="0" smtClean="0"/>
+              <a:t> and </a:t>
+            </a:r>
+            <a:r>
+              <a:rPr lang="en-US" dirty="0" err="1" smtClean="0"/>
+              <a:t>Tukey</a:t>
+            </a:r>
+            <a:endParaRPr lang="en-US" dirty="0" smtClean="0"/>
+          </a:p>
+          <a:p>
+            <a:r>
+              <a:rPr lang="en-US" dirty="0" smtClean="0"/>
+              <a:t>Click “Continue”</a:t>
+            </a:r>
+            <a:endParaRPr lang="en-US" dirty="0"/>
+          </a:p>
+        </p:txBody>
+      </p:sp>
+      <p:pic>
+        <p:nvPicPr>
+          <p:cNvPr id="5" name="Content Placeholder 4"/>
+          <p:cNvPicPr>
+            <a:picLocks noGrp="1" noChangeAspect="1"/>
+          </p:cNvPicPr>
+          <p:nvPr>
+            <p:ph sz="half" idx="2"/>
+          </p:nvPr>
+        </p:nvPicPr>
+        <p:blipFill>
+          <a:blip r:embed="rId2"/>
+          <a:stretch>
+            <a:fillRect/>
+          </a:stretch>
+        </p:blipFill>
+        <p:spPr>
+          <a:xfrm>
+            <a:off x="6451047" y="1825625"/>
+            <a:ext cx="4623905" cy="4351338"/>
+          </a:xfrm>
+          <a:prstGeom prst="rect">
+            <a:avLst/>
+          </a:prstGeom>
+        </p:spPr>
+      </p:pic>
+    </p:spTree>
+    <p:extLst>
+      <p:ext uri="{BB962C8B-B14F-4D97-AF65-F5344CB8AC3E}">
+        <p14:creationId xmlns:p14="http://schemas.microsoft.com/office/powerpoint/2010/main" val="481779370"/>
+      </p:ext>
+    </p:extLst>
+  </p:cSld>
+  <p:clrMapOvr>
+    <a:masterClrMapping/>
+  </p:clrMapOvr>
+  <p:timing>
+    <p:tnLst>
+      <p:par>
+        <p:cTn id="1" dur="indefinite" restart="never" nodeType="tmRoot"/>
+      </p:par>
+    </p:tnLst>
+  </p:timing>
+</p:sld>
+</file>
+
+<file path=ppt/slides/slide19.xml><?xml version="1.0" encoding="utf-8"?>
+<p:sld xmlns:a="http://schemas.openxmlformats.org/drawingml/2006/main" xmlns:r="http://schemas.openxmlformats.org/officeDocument/2006/relationships" xmlns:p="http://schemas.openxmlformats.org/presentationml/2006/main">
+  <p:cSld>
+    <p:spTree>
+      <p:nvGrpSpPr>
+        <p:cNvPr id="1" name=""/>
+        <p:cNvGrpSpPr/>
+        <p:nvPr/>
+      </p:nvGrpSpPr>
+      <p:grpSpPr>
+        <a:xfrm>
+          <a:off x="0" y="0"/>
+          <a:ext cx="0" cy="0"/>
+          <a:chOff x="0" y="0"/>
+          <a:chExt cx="0" cy="0"/>
+        </a:xfrm>
+      </p:grpSpPr>
+      <p:sp>
+        <p:nvSpPr>
+          <p:cNvPr id="2" name="Title 1"/>
+          <p:cNvSpPr>
+            <a:spLocks noGrp="1"/>
+          </p:cNvSpPr>
+          <p:nvPr>
+            <p:ph type="title"/>
+          </p:nvPr>
+        </p:nvSpPr>
+        <p:spPr/>
+        <p:txBody>
+          <a:bodyPr/>
+          <a:lstStyle/>
+          <a:p>
+            <a:r>
+              <a:rPr lang="en-US" dirty="0" smtClean="0"/>
+              <a:t>Options</a:t>
+            </a:r>
+            <a:endParaRPr lang="en-US" dirty="0"/>
+          </a:p>
+        </p:txBody>
+      </p:sp>
+      <p:sp>
+        <p:nvSpPr>
+          <p:cNvPr id="3" name="Content Placeholder 2"/>
+          <p:cNvSpPr>
+            <a:spLocks noGrp="1"/>
+          </p:cNvSpPr>
+          <p:nvPr>
+            <p:ph sz="half" idx="1"/>
+          </p:nvPr>
+        </p:nvSpPr>
+        <p:spPr/>
+        <p:txBody>
+          <a:bodyPr>
+            <a:normAutofit lnSpcReduction="10000"/>
+          </a:bodyPr>
+          <a:lstStyle/>
+          <a:p>
+            <a:r>
+              <a:rPr lang="en-US" dirty="0" smtClean="0"/>
+              <a:t>Click “Options…”</a:t>
+            </a:r>
+          </a:p>
+          <a:p>
+            <a:r>
+              <a:rPr lang="en-US" dirty="0" smtClean="0"/>
+              <a:t>Get marginal means for all main effects and the three way interaction (the two-way interactions are less interesting)</a:t>
+            </a:r>
+          </a:p>
+          <a:p>
+            <a:r>
+              <a:rPr lang="en-US" dirty="0" smtClean="0"/>
+              <a:t>Get descriptive statistics and estimates of effect size</a:t>
+            </a:r>
+          </a:p>
+          <a:p>
+            <a:r>
+              <a:rPr lang="en-US" dirty="0" smtClean="0"/>
+              <a:t>Get homogeneity tests</a:t>
+            </a:r>
+          </a:p>
+          <a:p>
+            <a:r>
+              <a:rPr lang="en-US" dirty="0" smtClean="0"/>
+              <a:t>Click “Continue”</a:t>
+            </a:r>
+          </a:p>
+          <a:p>
+            <a:r>
+              <a:rPr lang="en-US" dirty="0" smtClean="0"/>
+              <a:t>Click “OK” to run the analysis.</a:t>
+            </a:r>
+            <a:endParaRPr lang="en-US" dirty="0"/>
+          </a:p>
+        </p:txBody>
+      </p:sp>
+      <p:pic>
+        <p:nvPicPr>
+          <p:cNvPr id="6" name="Content Placeholder 5"/>
+          <p:cNvPicPr>
+            <a:picLocks noGrp="1" noChangeAspect="1"/>
+          </p:cNvPicPr>
+          <p:nvPr>
+            <p:ph sz="half" idx="2"/>
+          </p:nvPr>
+        </p:nvPicPr>
+        <p:blipFill>
+          <a:blip r:embed="rId2"/>
+          <a:stretch>
+            <a:fillRect/>
+          </a:stretch>
+        </p:blipFill>
+        <p:spPr>
+          <a:xfrm>
+            <a:off x="6750399" y="1825625"/>
+            <a:ext cx="4025202" cy="4351338"/>
+          </a:xfrm>
+          <a:prstGeom prst="rect">
+            <a:avLst/>
+          </a:prstGeom>
+        </p:spPr>
+      </p:pic>
+    </p:spTree>
+    <p:extLst>
+      <p:ext uri="{BB962C8B-B14F-4D97-AF65-F5344CB8AC3E}">
+        <p14:creationId xmlns:p14="http://schemas.microsoft.com/office/powerpoint/2010/main" val="612478154"/>
+      </p:ext>
+    </p:extLst>
+  </p:cSld>
+  <p:clrMapOvr>
+    <a:masterClrMapping/>
+  </p:clrMapOvr>
+  <p:timing>
+    <p:tnLst>
+      <p:par>
+        <p:cTn id="1" dur="indefinite" restart="never" nodeType="tmRoot"/>
+      </p:par>
+    </p:tnLst>
+  </p:timing>
+</p:sld>
+</file>
+
 <file path=ppt/slides/slide2.xml><?xml version="1.0" encoding="utf-8"?>
 <p:sld xmlns:a="http://schemas.openxmlformats.org/drawingml/2006/main" xmlns:r="http://schemas.openxmlformats.org/officeDocument/2006/relationships" xmlns:p="http://schemas.openxmlformats.org/presentationml/2006/main">
   <p:cSld>
@@ -4464,303 +4514,6 @@
           <a:p>
             <a:r>
               <a:rPr lang="en-US" dirty="0" smtClean="0"/>
-              <a:t>Post-hoc comparisons</a:t>
-            </a:r>
-            <a:endParaRPr lang="en-US" dirty="0"/>
-          </a:p>
-        </p:txBody>
-      </p:sp>
-      <p:sp>
-        <p:nvSpPr>
-          <p:cNvPr id="3" name="Content Placeholder 2"/>
-          <p:cNvSpPr>
-            <a:spLocks noGrp="1"/>
-          </p:cNvSpPr>
-          <p:nvPr>
-            <p:ph sz="half" idx="1"/>
-          </p:nvPr>
-        </p:nvSpPr>
-        <p:spPr/>
-        <p:txBody>
-          <a:bodyPr>
-            <a:normAutofit lnSpcReduction="10000"/>
-          </a:bodyPr>
-          <a:lstStyle/>
-          <a:p>
-            <a:r>
-              <a:rPr lang="en-US" dirty="0" smtClean="0"/>
-              <a:t>Click “Post Hoc…”</a:t>
-            </a:r>
-          </a:p>
-          <a:p>
-            <a:r>
-              <a:rPr lang="en-US" dirty="0" smtClean="0"/>
-              <a:t>Note that only factors with 3 or more levels are shown in the post hoc window</a:t>
-            </a:r>
-          </a:p>
-          <a:p>
-            <a:r>
-              <a:rPr lang="en-US" dirty="0" smtClean="0"/>
-              <a:t>Select “</a:t>
-            </a:r>
-            <a:r>
-              <a:rPr lang="en-US" dirty="0" err="1" smtClean="0"/>
-              <a:t>breed_factor</a:t>
-            </a:r>
-            <a:r>
-              <a:rPr lang="en-US" dirty="0" smtClean="0"/>
-              <a:t>” and move it over to the “Post hoc tests for” field</a:t>
-            </a:r>
-          </a:p>
-          <a:p>
-            <a:r>
-              <a:rPr lang="en-US" dirty="0" smtClean="0"/>
-              <a:t>Select any tests you want, e.g. </a:t>
-            </a:r>
-            <a:r>
-              <a:rPr lang="en-US" dirty="0" err="1" smtClean="0"/>
-              <a:t>Bonferroni</a:t>
-            </a:r>
-            <a:r>
-              <a:rPr lang="en-US" dirty="0" smtClean="0"/>
-              <a:t> and </a:t>
-            </a:r>
-            <a:r>
-              <a:rPr lang="en-US" dirty="0" err="1" smtClean="0"/>
-              <a:t>Tukey</a:t>
-            </a:r>
-            <a:endParaRPr lang="en-US" dirty="0" smtClean="0"/>
-          </a:p>
-          <a:p>
-            <a:r>
-              <a:rPr lang="en-US" dirty="0" smtClean="0"/>
-              <a:t>Click “Continue”</a:t>
-            </a:r>
-            <a:endParaRPr lang="en-US" dirty="0"/>
-          </a:p>
-        </p:txBody>
-      </p:sp>
-      <p:pic>
-        <p:nvPicPr>
-          <p:cNvPr id="5" name="Content Placeholder 4"/>
-          <p:cNvPicPr>
-            <a:picLocks noGrp="1" noChangeAspect="1"/>
-          </p:cNvPicPr>
-          <p:nvPr>
-            <p:ph sz="half" idx="2"/>
-          </p:nvPr>
-        </p:nvPicPr>
-        <p:blipFill>
-          <a:blip r:embed="rId2"/>
-          <a:stretch>
-            <a:fillRect/>
-          </a:stretch>
-        </p:blipFill>
-        <p:spPr>
-          <a:xfrm>
-            <a:off x="6451047" y="1825625"/>
-            <a:ext cx="4623905" cy="4351338"/>
-          </a:xfrm>
-          <a:prstGeom prst="rect">
-            <a:avLst/>
-          </a:prstGeom>
-        </p:spPr>
-      </p:pic>
-    </p:spTree>
-    <p:extLst>
-      <p:ext uri="{BB962C8B-B14F-4D97-AF65-F5344CB8AC3E}">
-        <p14:creationId xmlns:p14="http://schemas.microsoft.com/office/powerpoint/2010/main" val="481779370"/>
-      </p:ext>
-    </p:extLst>
-  </p:cSld>
-  <p:clrMapOvr>
-    <a:masterClrMapping/>
-  </p:clrMapOvr>
-  <p:timing>
-    <p:tnLst>
-      <p:par>
-        <p:cTn id="1" dur="indefinite" restart="never" nodeType="tmRoot"/>
-      </p:par>
-    </p:tnLst>
-  </p:timing>
-</p:sld>
-</file>
-
-<file path=ppt/slides/slide21.xml><?xml version="1.0" encoding="utf-8"?>
-<p:sld xmlns:a="http://schemas.openxmlformats.org/drawingml/2006/main" xmlns:r="http://schemas.openxmlformats.org/officeDocument/2006/relationships" xmlns:p="http://schemas.openxmlformats.org/presentationml/2006/main">
-  <p:cSld>
-    <p:spTree>
-      <p:nvGrpSpPr>
-        <p:cNvPr id="1" name=""/>
-        <p:cNvGrpSpPr/>
-        <p:nvPr/>
-      </p:nvGrpSpPr>
-      <p:grpSpPr>
-        <a:xfrm>
-          <a:off x="0" y="0"/>
-          <a:ext cx="0" cy="0"/>
-          <a:chOff x="0" y="0"/>
-          <a:chExt cx="0" cy="0"/>
-        </a:xfrm>
-      </p:grpSpPr>
-      <p:sp>
-        <p:nvSpPr>
-          <p:cNvPr id="2" name="Title 1"/>
-          <p:cNvSpPr>
-            <a:spLocks noGrp="1"/>
-          </p:cNvSpPr>
-          <p:nvPr>
-            <p:ph type="title"/>
-          </p:nvPr>
-        </p:nvSpPr>
-        <p:spPr/>
-        <p:txBody>
-          <a:bodyPr/>
-          <a:lstStyle/>
-          <a:p>
-            <a:r>
-              <a:rPr lang="en-US" dirty="0" smtClean="0"/>
-              <a:t>Options</a:t>
-            </a:r>
-            <a:endParaRPr lang="en-US" dirty="0"/>
-          </a:p>
-        </p:txBody>
-      </p:sp>
-      <p:sp>
-        <p:nvSpPr>
-          <p:cNvPr id="3" name="Content Placeholder 2"/>
-          <p:cNvSpPr>
-            <a:spLocks noGrp="1"/>
-          </p:cNvSpPr>
-          <p:nvPr>
-            <p:ph sz="half" idx="1"/>
-          </p:nvPr>
-        </p:nvSpPr>
-        <p:spPr/>
-        <p:txBody>
-          <a:bodyPr>
-            <a:normAutofit lnSpcReduction="10000"/>
-          </a:bodyPr>
-          <a:lstStyle/>
-          <a:p>
-            <a:r>
-              <a:rPr lang="en-US" dirty="0" smtClean="0"/>
-              <a:t>Click “Options…”</a:t>
-            </a:r>
-          </a:p>
-          <a:p>
-            <a:r>
-              <a:rPr lang="en-US" dirty="0" smtClean="0"/>
-              <a:t>Get marginal means for all main effects and the three way interaction (the two-way interactions are less interesting)</a:t>
-            </a:r>
-          </a:p>
-          <a:p>
-            <a:r>
-              <a:rPr lang="en-US" dirty="0" smtClean="0"/>
-              <a:t>Get descriptive statistics and estimates of effect size</a:t>
-            </a:r>
-          </a:p>
-          <a:p>
-            <a:r>
-              <a:rPr lang="en-US" dirty="0" smtClean="0"/>
-              <a:t>Get homogeneity tests</a:t>
-            </a:r>
-          </a:p>
-          <a:p>
-            <a:r>
-              <a:rPr lang="en-US" dirty="0" smtClean="0"/>
-              <a:t>Click “Continue”</a:t>
-            </a:r>
-          </a:p>
-          <a:p>
-            <a:r>
-              <a:rPr lang="en-US" dirty="0" smtClean="0"/>
-              <a:t>Click “OK” to run the analysis.</a:t>
-            </a:r>
-            <a:endParaRPr lang="en-US" dirty="0"/>
-          </a:p>
-        </p:txBody>
-      </p:sp>
-      <p:pic>
-        <p:nvPicPr>
-          <p:cNvPr id="6" name="Content Placeholder 5"/>
-          <p:cNvPicPr>
-            <a:picLocks noGrp="1" noChangeAspect="1"/>
-          </p:cNvPicPr>
-          <p:nvPr>
-            <p:ph sz="half" idx="2"/>
-          </p:nvPr>
-        </p:nvPicPr>
-        <p:blipFill>
-          <a:blip r:embed="rId2"/>
-          <a:stretch>
-            <a:fillRect/>
-          </a:stretch>
-        </p:blipFill>
-        <p:spPr>
-          <a:xfrm>
-            <a:off x="6750399" y="1825625"/>
-            <a:ext cx="4025202" cy="4351338"/>
-          </a:xfrm>
-          <a:prstGeom prst="rect">
-            <a:avLst/>
-          </a:prstGeom>
-        </p:spPr>
-      </p:pic>
-    </p:spTree>
-    <p:extLst>
-      <p:ext uri="{BB962C8B-B14F-4D97-AF65-F5344CB8AC3E}">
-        <p14:creationId xmlns:p14="http://schemas.microsoft.com/office/powerpoint/2010/main" val="612478154"/>
-      </p:ext>
-    </p:extLst>
-  </p:cSld>
-  <p:clrMapOvr>
-    <a:masterClrMapping/>
-  </p:clrMapOvr>
-  <p:timing>
-    <p:tnLst>
-      <p:par>
-        <p:cTn id="1" dur="indefinite" restart="never" nodeType="tmRoot"/>
-      </p:par>
-    </p:tnLst>
-  </p:timing>
-</p:sld>
-</file>
-
-<file path=ppt/slides/slide22.xml><?xml version="1.0" encoding="utf-8"?>
-<p:sld xmlns:a="http://schemas.openxmlformats.org/drawingml/2006/main" xmlns:r="http://schemas.openxmlformats.org/officeDocument/2006/relationships" xmlns:p="http://schemas.openxmlformats.org/presentationml/2006/main">
-  <p:cSld>
-    <p:spTree>
-      <p:nvGrpSpPr>
-        <p:cNvPr id="1" name=""/>
-        <p:cNvGrpSpPr/>
-        <p:nvPr/>
-      </p:nvGrpSpPr>
-      <p:grpSpPr>
-        <a:xfrm>
-          <a:off x="0" y="0"/>
-          <a:ext cx="0" cy="0"/>
-          <a:chOff x="0" y="0"/>
-          <a:chExt cx="0" cy="0"/>
-        </a:xfrm>
-      </p:grpSpPr>
-      <p:sp>
-        <p:nvSpPr>
-          <p:cNvPr id="2" name="Title 1"/>
-          <p:cNvSpPr>
-            <a:spLocks noGrp="1"/>
-          </p:cNvSpPr>
-          <p:nvPr>
-            <p:ph type="title"/>
-          </p:nvPr>
-        </p:nvSpPr>
-        <p:spPr/>
-        <p:txBody>
-          <a:bodyPr/>
-          <a:lstStyle/>
-          <a:p>
-            <a:r>
-              <a:rPr lang="en-US" dirty="0" smtClean="0"/>
               <a:t>Output</a:t>
             </a:r>
             <a:endParaRPr lang="en-US" dirty="0"/>
@@ -4848,7 +4601,7 @@
 </p:sld>
 </file>
 
-<file path=ppt/slides/slide23.xml><?xml version="1.0" encoding="utf-8"?>
+<file path=ppt/slides/slide21.xml><?xml version="1.0" encoding="utf-8"?>
 <p:sld xmlns:a="http://schemas.openxmlformats.org/drawingml/2006/main" xmlns:r="http://schemas.openxmlformats.org/officeDocument/2006/relationships" xmlns:p="http://schemas.openxmlformats.org/presentationml/2006/main">
   <p:cSld>
     <p:spTree>
@@ -4983,7 +4736,7 @@
 </p:sld>
 </file>
 
-<file path=ppt/slides/slide24.xml><?xml version="1.0" encoding="utf-8"?>
+<file path=ppt/slides/slide22.xml><?xml version="1.0" encoding="utf-8"?>
 <p:sld xmlns:a="http://schemas.openxmlformats.org/drawingml/2006/main" xmlns:r="http://schemas.openxmlformats.org/officeDocument/2006/relationships" xmlns:p="http://schemas.openxmlformats.org/presentationml/2006/main">
   <p:cSld>
     <p:spTree>
@@ -5091,7 +4844,7 @@
 </p:sld>
 </file>
 
-<file path=ppt/slides/slide25.xml><?xml version="1.0" encoding="utf-8"?>
+<file path=ppt/slides/slide23.xml><?xml version="1.0" encoding="utf-8"?>
 <p:sld xmlns:a="http://schemas.openxmlformats.org/drawingml/2006/main" xmlns:r="http://schemas.openxmlformats.org/officeDocument/2006/relationships" xmlns:p="http://schemas.openxmlformats.org/presentationml/2006/main">
   <p:cSld>
     <p:spTree>
@@ -5217,7 +4970,7 @@
 </p:sld>
 </file>
 
-<file path=ppt/slides/slide26.xml><?xml version="1.0" encoding="utf-8"?>
+<file path=ppt/slides/slide24.xml><?xml version="1.0" encoding="utf-8"?>
 <p:sld xmlns:a="http://schemas.openxmlformats.org/drawingml/2006/main" xmlns:r="http://schemas.openxmlformats.org/officeDocument/2006/relationships" xmlns:p="http://schemas.openxmlformats.org/presentationml/2006/main">
   <p:cSld>
     <p:spTree>
@@ -5345,7 +5098,7 @@
 </p:sld>
 </file>
 
-<file path=ppt/slides/slide27.xml><?xml version="1.0" encoding="utf-8"?>
+<file path=ppt/slides/slide25.xml><?xml version="1.0" encoding="utf-8"?>
 <p:sld xmlns:a="http://schemas.openxmlformats.org/drawingml/2006/main" xmlns:r="http://schemas.openxmlformats.org/officeDocument/2006/relationships" xmlns:p="http://schemas.openxmlformats.org/presentationml/2006/main">
   <p:cSld>
     <p:spTree>
@@ -5501,7 +5254,7 @@
 </p:sld>
 </file>
 
-<file path=ppt/slides/slide28.xml><?xml version="1.0" encoding="utf-8"?>
+<file path=ppt/slides/slide26.xml><?xml version="1.0" encoding="utf-8"?>
 <p:sld xmlns:a="http://schemas.openxmlformats.org/drawingml/2006/main" xmlns:r="http://schemas.openxmlformats.org/officeDocument/2006/relationships" xmlns:p="http://schemas.openxmlformats.org/presentationml/2006/main">
   <p:cSld>
     <p:spTree>
@@ -5611,7 +5364,7 @@
           <a:graphicData uri="http://schemas.openxmlformats.org/presentationml/2006/ole">
             <mc:AlternateContent xmlns:mc="http://schemas.openxmlformats.org/markup-compatibility/2006">
               <mc:Choice xmlns:v="urn:schemas-microsoft-com:vml" Requires="v">
-                <p:oleObj spid="_x0000_s3086" r:id="rId3" imgW="27098280" imgH="15263280" progId="">
+                <p:oleObj spid="_x0000_s3089" r:id="rId3" imgW="27098280" imgH="15263280" progId="">
                   <p:embed/>
                 </p:oleObj>
               </mc:Choice>
@@ -5666,7 +5419,7 @@
 </p:sld>
 </file>
 
-<file path=ppt/slides/slide29.xml><?xml version="1.0" encoding="utf-8"?>
+<file path=ppt/slides/slide27.xml><?xml version="1.0" encoding="utf-8"?>
 <p:sld xmlns:a="http://schemas.openxmlformats.org/drawingml/2006/main" xmlns:r="http://schemas.openxmlformats.org/officeDocument/2006/relationships" xmlns:p="http://schemas.openxmlformats.org/presentationml/2006/main">
   <p:cSld>
     <p:spTree>
@@ -5779,6 +5532,264 @@
     <p:extLst>
       <p:ext uri="{BB962C8B-B14F-4D97-AF65-F5344CB8AC3E}">
         <p14:creationId xmlns:p14="http://schemas.microsoft.com/office/powerpoint/2010/main" val="1362976887"/>
+      </p:ext>
+    </p:extLst>
+  </p:cSld>
+  <p:clrMapOvr>
+    <a:masterClrMapping/>
+  </p:clrMapOvr>
+  <p:timing>
+    <p:tnLst>
+      <p:par>
+        <p:cTn id="1" dur="indefinite" restart="never" nodeType="tmRoot"/>
+      </p:par>
+    </p:tnLst>
+  </p:timing>
+</p:sld>
+</file>
+
+<file path=ppt/slides/slide28.xml><?xml version="1.0" encoding="utf-8"?>
+<p:sld xmlns:a="http://schemas.openxmlformats.org/drawingml/2006/main" xmlns:r="http://schemas.openxmlformats.org/officeDocument/2006/relationships" xmlns:p="http://schemas.openxmlformats.org/presentationml/2006/main">
+  <p:cSld>
+    <p:spTree>
+      <p:nvGrpSpPr>
+        <p:cNvPr id="1" name=""/>
+        <p:cNvGrpSpPr/>
+        <p:nvPr/>
+      </p:nvGrpSpPr>
+      <p:grpSpPr>
+        <a:xfrm>
+          <a:off x="0" y="0"/>
+          <a:ext cx="0" cy="0"/>
+          <a:chOff x="0" y="0"/>
+          <a:chExt cx="0" cy="0"/>
+        </a:xfrm>
+      </p:grpSpPr>
+      <p:sp>
+        <p:nvSpPr>
+          <p:cNvPr id="2" name="Title 1"/>
+          <p:cNvSpPr>
+            <a:spLocks noGrp="1"/>
+          </p:cNvSpPr>
+          <p:nvPr>
+            <p:ph type="title"/>
+          </p:nvPr>
+        </p:nvSpPr>
+        <p:spPr/>
+        <p:txBody>
+          <a:bodyPr/>
+          <a:lstStyle/>
+          <a:p>
+            <a:r>
+              <a:rPr lang="en-US" dirty="0" smtClean="0"/>
+              <a:t>Add error bars</a:t>
+            </a:r>
+            <a:endParaRPr lang="en-US" dirty="0"/>
+          </a:p>
+        </p:txBody>
+      </p:sp>
+      <p:sp>
+        <p:nvSpPr>
+          <p:cNvPr id="3" name="Content Placeholder 2"/>
+          <p:cNvSpPr>
+            <a:spLocks noGrp="1"/>
+          </p:cNvSpPr>
+          <p:nvPr>
+            <p:ph sz="half" idx="1"/>
+          </p:nvPr>
+        </p:nvSpPr>
+        <p:spPr/>
+        <p:txBody>
+          <a:bodyPr/>
+          <a:lstStyle/>
+          <a:p>
+            <a:r>
+              <a:rPr lang="en-US" dirty="0" smtClean="0"/>
+              <a:t>Click “Options…”</a:t>
+            </a:r>
+          </a:p>
+          <a:p>
+            <a:r>
+              <a:rPr lang="en-US" dirty="0" smtClean="0"/>
+              <a:t>Check “Display error bars”</a:t>
+            </a:r>
+          </a:p>
+          <a:p>
+            <a:r>
+              <a:rPr lang="en-US" dirty="0" smtClean="0"/>
+              <a:t>The default setting (95% CI) is what we want.</a:t>
+            </a:r>
+          </a:p>
+          <a:p>
+            <a:r>
+              <a:rPr lang="en-US" dirty="0" smtClean="0"/>
+              <a:t>Click “Continue”</a:t>
+            </a:r>
+          </a:p>
+          <a:p>
+            <a:pPr marL="0" indent="0">
+              <a:buNone/>
+            </a:pPr>
+            <a:endParaRPr lang="en-US" dirty="0"/>
+          </a:p>
+        </p:txBody>
+      </p:sp>
+      <p:pic>
+        <p:nvPicPr>
+          <p:cNvPr id="6" name="Content Placeholder 5"/>
+          <p:cNvPicPr>
+            <a:picLocks noGrp="1" noChangeAspect="1"/>
+          </p:cNvPicPr>
+          <p:nvPr>
+            <p:ph sz="half" idx="2"/>
+          </p:nvPr>
+        </p:nvPicPr>
+        <p:blipFill>
+          <a:blip r:embed="rId2"/>
+          <a:stretch>
+            <a:fillRect/>
+          </a:stretch>
+        </p:blipFill>
+        <p:spPr>
+          <a:xfrm>
+            <a:off x="7309324" y="1825625"/>
+            <a:ext cx="2907352" cy="4351338"/>
+          </a:xfrm>
+          <a:prstGeom prst="rect">
+            <a:avLst/>
+          </a:prstGeom>
+        </p:spPr>
+      </p:pic>
+    </p:spTree>
+    <p:extLst>
+      <p:ext uri="{BB962C8B-B14F-4D97-AF65-F5344CB8AC3E}">
+        <p14:creationId xmlns:p14="http://schemas.microsoft.com/office/powerpoint/2010/main" val="4259224393"/>
+      </p:ext>
+    </p:extLst>
+  </p:cSld>
+  <p:clrMapOvr>
+    <a:masterClrMapping/>
+  </p:clrMapOvr>
+  <p:timing>
+    <p:tnLst>
+      <p:par>
+        <p:cTn id="1" dur="indefinite" restart="never" nodeType="tmRoot"/>
+      </p:par>
+    </p:tnLst>
+  </p:timing>
+</p:sld>
+</file>
+
+<file path=ppt/slides/slide29.xml><?xml version="1.0" encoding="utf-8"?>
+<p:sld xmlns:a="http://schemas.openxmlformats.org/drawingml/2006/main" xmlns:r="http://schemas.openxmlformats.org/officeDocument/2006/relationships" xmlns:p="http://schemas.openxmlformats.org/presentationml/2006/main">
+  <p:cSld>
+    <p:spTree>
+      <p:nvGrpSpPr>
+        <p:cNvPr id="1" name=""/>
+        <p:cNvGrpSpPr/>
+        <p:nvPr/>
+      </p:nvGrpSpPr>
+      <p:grpSpPr>
+        <a:xfrm>
+          <a:off x="0" y="0"/>
+          <a:ext cx="0" cy="0"/>
+          <a:chOff x="0" y="0"/>
+          <a:chExt cx="0" cy="0"/>
+        </a:xfrm>
+      </p:grpSpPr>
+      <p:sp>
+        <p:nvSpPr>
+          <p:cNvPr id="2" name="Title 1"/>
+          <p:cNvSpPr>
+            <a:spLocks noGrp="1"/>
+          </p:cNvSpPr>
+          <p:nvPr>
+            <p:ph type="title"/>
+          </p:nvPr>
+        </p:nvSpPr>
+        <p:spPr/>
+        <p:txBody>
+          <a:bodyPr/>
+          <a:lstStyle/>
+          <a:p>
+            <a:r>
+              <a:rPr lang="en-US" dirty="0" smtClean="0"/>
+              <a:t>Final touches</a:t>
+            </a:r>
+            <a:endParaRPr lang="en-US" dirty="0"/>
+          </a:p>
+        </p:txBody>
+      </p:sp>
+      <p:sp>
+        <p:nvSpPr>
+          <p:cNvPr id="3" name="Content Placeholder 2"/>
+          <p:cNvSpPr>
+            <a:spLocks noGrp="1"/>
+          </p:cNvSpPr>
+          <p:nvPr>
+            <p:ph sz="half" idx="1"/>
+          </p:nvPr>
+        </p:nvSpPr>
+        <p:spPr/>
+        <p:txBody>
+          <a:bodyPr/>
+          <a:lstStyle/>
+          <a:p>
+            <a:r>
+              <a:rPr lang="en-US" dirty="0" smtClean="0"/>
+              <a:t>Double-click the resulting graph to open it in the chart editor</a:t>
+            </a:r>
+          </a:p>
+          <a:p>
+            <a:r>
+              <a:rPr lang="en-US" dirty="0" smtClean="0"/>
+              <a:t>Double-click axis and legend labels to edit them and make them look nice</a:t>
+            </a:r>
+          </a:p>
+          <a:p>
+            <a:r>
+              <a:rPr lang="en-US" dirty="0" smtClean="0"/>
+              <a:t>There we go!</a:t>
+            </a:r>
+          </a:p>
+          <a:p>
+            <a:pPr marL="0" indent="0">
+              <a:buNone/>
+            </a:pPr>
+            <a:endParaRPr lang="en-US" dirty="0"/>
+          </a:p>
+        </p:txBody>
+      </p:sp>
+      <p:pic>
+        <p:nvPicPr>
+          <p:cNvPr id="5" name="Content Placeholder 4"/>
+          <p:cNvPicPr>
+            <a:picLocks noGrp="1" noChangeAspect="1"/>
+          </p:cNvPicPr>
+          <p:nvPr>
+            <p:ph sz="half" idx="2"/>
+          </p:nvPr>
+        </p:nvPicPr>
+        <p:blipFill>
+          <a:blip r:embed="rId2"/>
+          <a:stretch>
+            <a:fillRect/>
+          </a:stretch>
+        </p:blipFill>
+        <p:spPr>
+          <a:xfrm>
+            <a:off x="6172200" y="1925359"/>
+            <a:ext cx="5181600" cy="4151870"/>
+          </a:xfrm>
+          <a:prstGeom prst="rect">
+            <a:avLst/>
+          </a:prstGeom>
+        </p:spPr>
+      </p:pic>
+    </p:spTree>
+    <p:extLst>
+      <p:ext uri="{BB962C8B-B14F-4D97-AF65-F5344CB8AC3E}">
+        <p14:creationId xmlns:p14="http://schemas.microsoft.com/office/powerpoint/2010/main" val="3881427018"/>
       </p:ext>
     </p:extLst>
   </p:cSld>
@@ -5936,264 +5947,6 @@
           <a:p>
             <a:r>
               <a:rPr lang="en-US" dirty="0" smtClean="0"/>
-              <a:t>Add error bars</a:t>
-            </a:r>
-            <a:endParaRPr lang="en-US" dirty="0"/>
-          </a:p>
-        </p:txBody>
-      </p:sp>
-      <p:sp>
-        <p:nvSpPr>
-          <p:cNvPr id="3" name="Content Placeholder 2"/>
-          <p:cNvSpPr>
-            <a:spLocks noGrp="1"/>
-          </p:cNvSpPr>
-          <p:nvPr>
-            <p:ph sz="half" idx="1"/>
-          </p:nvPr>
-        </p:nvSpPr>
-        <p:spPr/>
-        <p:txBody>
-          <a:bodyPr/>
-          <a:lstStyle/>
-          <a:p>
-            <a:r>
-              <a:rPr lang="en-US" dirty="0" smtClean="0"/>
-              <a:t>Click “Options…”</a:t>
-            </a:r>
-          </a:p>
-          <a:p>
-            <a:r>
-              <a:rPr lang="en-US" dirty="0" smtClean="0"/>
-              <a:t>Check “Display error bars”</a:t>
-            </a:r>
-          </a:p>
-          <a:p>
-            <a:r>
-              <a:rPr lang="en-US" dirty="0" smtClean="0"/>
-              <a:t>The default setting (95% CI) is what we want.</a:t>
-            </a:r>
-          </a:p>
-          <a:p>
-            <a:r>
-              <a:rPr lang="en-US" dirty="0" smtClean="0"/>
-              <a:t>Click “Continue”</a:t>
-            </a:r>
-          </a:p>
-          <a:p>
-            <a:pPr marL="0" indent="0">
-              <a:buNone/>
-            </a:pPr>
-            <a:endParaRPr lang="en-US" dirty="0"/>
-          </a:p>
-        </p:txBody>
-      </p:sp>
-      <p:pic>
-        <p:nvPicPr>
-          <p:cNvPr id="6" name="Content Placeholder 5"/>
-          <p:cNvPicPr>
-            <a:picLocks noGrp="1" noChangeAspect="1"/>
-          </p:cNvPicPr>
-          <p:nvPr>
-            <p:ph sz="half" idx="2"/>
-          </p:nvPr>
-        </p:nvPicPr>
-        <p:blipFill>
-          <a:blip r:embed="rId2"/>
-          <a:stretch>
-            <a:fillRect/>
-          </a:stretch>
-        </p:blipFill>
-        <p:spPr>
-          <a:xfrm>
-            <a:off x="7309324" y="1825625"/>
-            <a:ext cx="2907352" cy="4351338"/>
-          </a:xfrm>
-          <a:prstGeom prst="rect">
-            <a:avLst/>
-          </a:prstGeom>
-        </p:spPr>
-      </p:pic>
-    </p:spTree>
-    <p:extLst>
-      <p:ext uri="{BB962C8B-B14F-4D97-AF65-F5344CB8AC3E}">
-        <p14:creationId xmlns:p14="http://schemas.microsoft.com/office/powerpoint/2010/main" val="4259224393"/>
-      </p:ext>
-    </p:extLst>
-  </p:cSld>
-  <p:clrMapOvr>
-    <a:masterClrMapping/>
-  </p:clrMapOvr>
-  <p:timing>
-    <p:tnLst>
-      <p:par>
-        <p:cTn id="1" dur="indefinite" restart="never" nodeType="tmRoot"/>
-      </p:par>
-    </p:tnLst>
-  </p:timing>
-</p:sld>
-</file>
-
-<file path=ppt/slides/slide31.xml><?xml version="1.0" encoding="utf-8"?>
-<p:sld xmlns:a="http://schemas.openxmlformats.org/drawingml/2006/main" xmlns:r="http://schemas.openxmlformats.org/officeDocument/2006/relationships" xmlns:p="http://schemas.openxmlformats.org/presentationml/2006/main">
-  <p:cSld>
-    <p:spTree>
-      <p:nvGrpSpPr>
-        <p:cNvPr id="1" name=""/>
-        <p:cNvGrpSpPr/>
-        <p:nvPr/>
-      </p:nvGrpSpPr>
-      <p:grpSpPr>
-        <a:xfrm>
-          <a:off x="0" y="0"/>
-          <a:ext cx="0" cy="0"/>
-          <a:chOff x="0" y="0"/>
-          <a:chExt cx="0" cy="0"/>
-        </a:xfrm>
-      </p:grpSpPr>
-      <p:sp>
-        <p:nvSpPr>
-          <p:cNvPr id="2" name="Title 1"/>
-          <p:cNvSpPr>
-            <a:spLocks noGrp="1"/>
-          </p:cNvSpPr>
-          <p:nvPr>
-            <p:ph type="title"/>
-          </p:nvPr>
-        </p:nvSpPr>
-        <p:spPr/>
-        <p:txBody>
-          <a:bodyPr/>
-          <a:lstStyle/>
-          <a:p>
-            <a:r>
-              <a:rPr lang="en-US" dirty="0" smtClean="0"/>
-              <a:t>Final touches</a:t>
-            </a:r>
-            <a:endParaRPr lang="en-US" dirty="0"/>
-          </a:p>
-        </p:txBody>
-      </p:sp>
-      <p:sp>
-        <p:nvSpPr>
-          <p:cNvPr id="3" name="Content Placeholder 2"/>
-          <p:cNvSpPr>
-            <a:spLocks noGrp="1"/>
-          </p:cNvSpPr>
-          <p:nvPr>
-            <p:ph sz="half" idx="1"/>
-          </p:nvPr>
-        </p:nvSpPr>
-        <p:spPr/>
-        <p:txBody>
-          <a:bodyPr/>
-          <a:lstStyle/>
-          <a:p>
-            <a:r>
-              <a:rPr lang="en-US" dirty="0" smtClean="0"/>
-              <a:t>Double-click the resulting graph to open it in the chart editor</a:t>
-            </a:r>
-          </a:p>
-          <a:p>
-            <a:r>
-              <a:rPr lang="en-US" dirty="0" smtClean="0"/>
-              <a:t>Double-click axis and legend labels to edit them and make them look nice</a:t>
-            </a:r>
-          </a:p>
-          <a:p>
-            <a:r>
-              <a:rPr lang="en-US" dirty="0" smtClean="0"/>
-              <a:t>There we go!</a:t>
-            </a:r>
-          </a:p>
-          <a:p>
-            <a:pPr marL="0" indent="0">
-              <a:buNone/>
-            </a:pPr>
-            <a:endParaRPr lang="en-US" dirty="0"/>
-          </a:p>
-        </p:txBody>
-      </p:sp>
-      <p:pic>
-        <p:nvPicPr>
-          <p:cNvPr id="5" name="Content Placeholder 4"/>
-          <p:cNvPicPr>
-            <a:picLocks noGrp="1" noChangeAspect="1"/>
-          </p:cNvPicPr>
-          <p:nvPr>
-            <p:ph sz="half" idx="2"/>
-          </p:nvPr>
-        </p:nvPicPr>
-        <p:blipFill>
-          <a:blip r:embed="rId2"/>
-          <a:stretch>
-            <a:fillRect/>
-          </a:stretch>
-        </p:blipFill>
-        <p:spPr>
-          <a:xfrm>
-            <a:off x="6172200" y="1925359"/>
-            <a:ext cx="5181600" cy="4151870"/>
-          </a:xfrm>
-          <a:prstGeom prst="rect">
-            <a:avLst/>
-          </a:prstGeom>
-        </p:spPr>
-      </p:pic>
-    </p:spTree>
-    <p:extLst>
-      <p:ext uri="{BB962C8B-B14F-4D97-AF65-F5344CB8AC3E}">
-        <p14:creationId xmlns:p14="http://schemas.microsoft.com/office/powerpoint/2010/main" val="3881427018"/>
-      </p:ext>
-    </p:extLst>
-  </p:cSld>
-  <p:clrMapOvr>
-    <a:masterClrMapping/>
-  </p:clrMapOvr>
-  <p:timing>
-    <p:tnLst>
-      <p:par>
-        <p:cTn id="1" dur="indefinite" restart="never" nodeType="tmRoot"/>
-      </p:par>
-    </p:tnLst>
-  </p:timing>
-</p:sld>
-</file>
-
-<file path=ppt/slides/slide32.xml><?xml version="1.0" encoding="utf-8"?>
-<p:sld xmlns:a="http://schemas.openxmlformats.org/drawingml/2006/main" xmlns:r="http://schemas.openxmlformats.org/officeDocument/2006/relationships" xmlns:p="http://schemas.openxmlformats.org/presentationml/2006/main">
-  <p:cSld>
-    <p:spTree>
-      <p:nvGrpSpPr>
-        <p:cNvPr id="1" name=""/>
-        <p:cNvGrpSpPr/>
-        <p:nvPr/>
-      </p:nvGrpSpPr>
-      <p:grpSpPr>
-        <a:xfrm>
-          <a:off x="0" y="0"/>
-          <a:ext cx="0" cy="0"/>
-          <a:chOff x="0" y="0"/>
-          <a:chExt cx="0" cy="0"/>
-        </a:xfrm>
-      </p:grpSpPr>
-      <p:sp>
-        <p:nvSpPr>
-          <p:cNvPr id="2" name="Title 1"/>
-          <p:cNvSpPr>
-            <a:spLocks noGrp="1"/>
-          </p:cNvSpPr>
-          <p:nvPr>
-            <p:ph type="title"/>
-          </p:nvPr>
-        </p:nvSpPr>
-        <p:spPr/>
-        <p:txBody>
-          <a:bodyPr/>
-          <a:lstStyle/>
-          <a:p>
-            <a:r>
-              <a:rPr lang="en-US" dirty="0" smtClean="0"/>
               <a:t>The hypothesis tests</a:t>
             </a:r>
             <a:endParaRPr lang="en-US" dirty="0"/>
@@ -6349,7 +6102,7 @@
 </p:sld>
 </file>
 
-<file path=ppt/slides/slide33.xml><?xml version="1.0" encoding="utf-8"?>
+<file path=ppt/slides/slide31.xml><?xml version="1.0" encoding="utf-8"?>
 <p:sld xmlns:a="http://schemas.openxmlformats.org/drawingml/2006/main" xmlns:r="http://schemas.openxmlformats.org/officeDocument/2006/relationships" xmlns:p="http://schemas.openxmlformats.org/presentationml/2006/main">
   <p:cSld>
     <p:spTree>
@@ -6487,7 +6240,7 @@
 </p:sld>
 </file>
 
-<file path=ppt/slides/slide34.xml><?xml version="1.0" encoding="utf-8"?>
+<file path=ppt/slides/slide32.xml><?xml version="1.0" encoding="utf-8"?>
 <p:sld xmlns:a="http://schemas.openxmlformats.org/drawingml/2006/main" xmlns:r="http://schemas.openxmlformats.org/officeDocument/2006/relationships" xmlns:p="http://schemas.openxmlformats.org/presentationml/2006/main">
   <p:cSld>
     <p:spTree>
@@ -6638,12 +6391,16 @@
                     <m:sSubSup>
                       <m:sSubSupPr>
                         <m:ctrlPr>
-                          <a:rPr lang="en-US" i="1"/>
+                          <a:rPr lang="en-US" i="1">
+                            <a:latin typeface="Cambria Math"/>
+                          </a:rPr>
                         </m:ctrlPr>
                       </m:sSubSupPr>
                       <m:e>
                         <m:r>
-                          <a:rPr lang="en-US" i="1"/>
+                          <a:rPr lang="en-US" i="1">
+                            <a:latin typeface="Cambria Math"/>
+                          </a:rPr>
                           <m:t>𝜂</m:t>
                         </m:r>
                       </m:e>
@@ -6657,7 +6414,9 @@
                       </m:sub>
                       <m:sup>
                         <m:r>
-                          <a:rPr lang="en-US" i="1"/>
+                          <a:rPr lang="en-US" i="1">
+                            <a:latin typeface="Cambria Math"/>
+                          </a:rPr>
                           <m:t>2</m:t>
                         </m:r>
                       </m:sup>
@@ -6666,7 +6425,11 @@
                 </a14:m>
                 <a:r>
                   <a:rPr lang="en-US" dirty="0"/>
-                  <a:t> = 0.01, </a:t>
+                  <a:t> = </a:t>
+                </a:r>
+                <a:r>
+                  <a:rPr lang="en-US" dirty="0" smtClean="0"/>
+                  <a:t>0.19, </a:t>
                 </a:r>
                 <a:r>
                   <a:rPr lang="en-US" i="1" dirty="0"/>
@@ -6702,10 +6465,10 @@
               </p:nvPr>
             </p:nvSpPr>
             <p:spPr>
-              <a:blipFill rotWithShape="0">
+              <a:blipFill rotWithShape="1">
                 <a:blip r:embed="rId2"/>
                 <a:stretch>
-                  <a:fillRect l="-1882" t="-3501" r="-471"/>
+                  <a:fillRect l="-1882" t="-3501" r="-588"/>
                 </a:stretch>
               </a:blipFill>
             </p:spPr>
@@ -6714,290 +6477,7 @@
               <a:lstStyle/>
               <a:p>
                 <a:r>
-                  <a:rPr lang="en-US">
-                    <a:noFill/>
-                  </a:rPr>
-                  <a:t> </a:t>
-                </a:r>
-              </a:p>
-            </p:txBody>
-          </p:sp>
-        </mc:Fallback>
-      </mc:AlternateContent>
-      <p:pic>
-        <p:nvPicPr>
-          <p:cNvPr id="6" name="Content Placeholder 5"/>
-          <p:cNvPicPr>
-            <a:picLocks noGrp="1" noChangeAspect="1"/>
-          </p:cNvPicPr>
-          <p:nvPr>
-            <p:ph sz="half" idx="2"/>
-          </p:nvPr>
-        </p:nvPicPr>
-        <p:blipFill>
-          <a:blip r:embed="rId3"/>
-          <a:stretch>
-            <a:fillRect/>
-          </a:stretch>
-        </p:blipFill>
-        <p:spPr>
-          <a:xfrm>
-            <a:off x="6172200" y="3077889"/>
-            <a:ext cx="5181600" cy="1846809"/>
-          </a:xfrm>
-          <a:prstGeom prst="rect">
-            <a:avLst/>
-          </a:prstGeom>
-        </p:spPr>
-      </p:pic>
-    </p:spTree>
-    <p:extLst>
-      <p:ext uri="{BB962C8B-B14F-4D97-AF65-F5344CB8AC3E}">
-        <p14:creationId xmlns:p14="http://schemas.microsoft.com/office/powerpoint/2010/main" val="1140283491"/>
-      </p:ext>
-    </p:extLst>
-  </p:cSld>
-  <p:clrMapOvr>
-    <a:masterClrMapping/>
-  </p:clrMapOvr>
-  <p:timing>
-    <p:tnLst>
-      <p:par>
-        <p:cTn id="1" dur="indefinite" restart="never" nodeType="tmRoot"/>
-      </p:par>
-    </p:tnLst>
-  </p:timing>
-</p:sld>
-</file>
-
-<file path=ppt/slides/slide35.xml><?xml version="1.0" encoding="utf-8"?>
-<p:sld xmlns:a="http://schemas.openxmlformats.org/drawingml/2006/main" xmlns:r="http://schemas.openxmlformats.org/officeDocument/2006/relationships" xmlns:p="http://schemas.openxmlformats.org/presentationml/2006/main">
-  <p:cSld>
-    <p:spTree>
-      <p:nvGrpSpPr>
-        <p:cNvPr id="1" name=""/>
-        <p:cNvGrpSpPr/>
-        <p:nvPr/>
-      </p:nvGrpSpPr>
-      <p:grpSpPr>
-        <a:xfrm>
-          <a:off x="0" y="0"/>
-          <a:ext cx="0" cy="0"/>
-          <a:chOff x="0" y="0"/>
-          <a:chExt cx="0" cy="0"/>
-        </a:xfrm>
-      </p:grpSpPr>
-      <p:sp>
-        <p:nvSpPr>
-          <p:cNvPr id="2" name="Title 1"/>
-          <p:cNvSpPr>
-            <a:spLocks noGrp="1"/>
-          </p:cNvSpPr>
-          <p:nvPr>
-            <p:ph type="title"/>
-          </p:nvPr>
-        </p:nvSpPr>
-        <p:spPr/>
-        <p:txBody>
-          <a:bodyPr/>
-          <a:lstStyle/>
-          <a:p>
-            <a:r>
-              <a:rPr lang="en-US" dirty="0" smtClean="0"/>
-              <a:t>The hypothesis tests</a:t>
-            </a:r>
-            <a:endParaRPr lang="en-US" dirty="0"/>
-          </a:p>
-        </p:txBody>
-      </p:sp>
-      <mc:AlternateContent xmlns:mc="http://schemas.openxmlformats.org/markup-compatibility/2006">
-        <mc:Choice xmlns:a14="http://schemas.microsoft.com/office/drawing/2010/main" Requires="a14">
-          <p:sp>
-            <p:nvSpPr>
-              <p:cNvPr id="3" name="Content Placeholder 2"/>
-              <p:cNvSpPr>
-                <a:spLocks noGrp="1"/>
-              </p:cNvSpPr>
-              <p:nvPr>
-                <p:ph sz="half" idx="1"/>
-              </p:nvPr>
-            </p:nvSpPr>
-            <p:spPr/>
-            <p:txBody>
-              <a:bodyPr>
-                <a:normAutofit fontScale="92500" lnSpcReduction="20000"/>
-              </a:bodyPr>
-              <a:lstStyle/>
-              <a:p>
-                <a:r>
-                  <a:rPr lang="en-US" dirty="0" smtClean="0"/>
-                  <a:t>Note down:</a:t>
-                </a:r>
-              </a:p>
-              <a:p>
-                <a:pPr lvl="1"/>
-                <a:r>
-                  <a:rPr lang="en-US" dirty="0" err="1" smtClean="0"/>
-                  <a:t>df</a:t>
-                </a:r>
-                <a:r>
-                  <a:rPr lang="en-US" dirty="0" smtClean="0"/>
-                  <a:t> numerator (</a:t>
-                </a:r>
-                <a:r>
-                  <a:rPr lang="en-US" dirty="0" err="1" smtClean="0"/>
-                  <a:t>df</a:t>
-                </a:r>
-                <a:r>
-                  <a:rPr lang="en-US" dirty="0" smtClean="0"/>
-                  <a:t> effect)</a:t>
-                </a:r>
-              </a:p>
-              <a:p>
-                <a:pPr lvl="1"/>
-                <a:r>
-                  <a:rPr lang="en-US" dirty="0" err="1" smtClean="0"/>
-                  <a:t>df</a:t>
-                </a:r>
-                <a:r>
-                  <a:rPr lang="en-US" dirty="0" smtClean="0"/>
-                  <a:t> denominator (</a:t>
-                </a:r>
-                <a:r>
-                  <a:rPr lang="en-US" dirty="0" err="1" smtClean="0"/>
-                  <a:t>df</a:t>
-                </a:r>
-                <a:r>
-                  <a:rPr lang="en-US" dirty="0" smtClean="0"/>
-                  <a:t> error)</a:t>
-                </a:r>
-              </a:p>
-              <a:p>
-                <a:pPr lvl="1"/>
-                <a:r>
-                  <a:rPr lang="en-US" dirty="0" smtClean="0"/>
-                  <a:t>F-value</a:t>
-                </a:r>
-              </a:p>
-              <a:p>
-                <a:pPr lvl="1"/>
-                <a:r>
-                  <a:rPr lang="en-US" dirty="0" smtClean="0"/>
-                  <a:t>p-value</a:t>
-                </a:r>
-              </a:p>
-              <a:p>
-                <a:pPr lvl="1"/>
-                <a:r>
-                  <a:rPr lang="en-US" dirty="0" smtClean="0"/>
-                  <a:t>Partial Eta squared</a:t>
-                </a:r>
-              </a:p>
-              <a:p>
-                <a:r>
-                  <a:rPr lang="en-US" dirty="0" smtClean="0"/>
-                  <a:t>Then report them like this in the text:</a:t>
-                </a:r>
-              </a:p>
-              <a:p>
-                <a:r>
-                  <a:rPr lang="en-US" dirty="0" smtClean="0"/>
-                  <a:t>There was a significant effect of beef, </a:t>
-                </a:r>
-                <a:r>
-                  <a:rPr lang="en-US" i="1" dirty="0"/>
-                  <a:t>F</a:t>
-                </a:r>
-                <a:r>
-                  <a:rPr lang="en-US" dirty="0"/>
-                  <a:t>(1, 36) = </a:t>
-                </a:r>
-                <a:r>
-                  <a:rPr lang="en-US" dirty="0" smtClean="0"/>
-                  <a:t>8.63, </a:t>
-                </a:r>
-                <a14:m>
-                  <m:oMath xmlns:m="http://schemas.openxmlformats.org/officeDocument/2006/math">
-                    <m:sSubSup>
-                      <m:sSubSupPr>
-                        <m:ctrlPr>
-                          <a:rPr lang="en-US" i="1"/>
-                        </m:ctrlPr>
-                      </m:sSubSupPr>
-                      <m:e>
-                        <m:r>
-                          <a:rPr lang="en-US" i="1"/>
-                          <m:t>𝜂</m:t>
-                        </m:r>
-                      </m:e>
-                      <m:sub>
-                        <m:r>
-                          <a:rPr lang="en-US" b="0" i="1" smtClean="0">
-                            <a:latin typeface="Cambria Math" panose="02040503050406030204" pitchFamily="18" charset="0"/>
-                          </a:rPr>
-                          <m:t>𝑃</m:t>
-                        </m:r>
-                      </m:sub>
-                      <m:sup>
-                        <m:r>
-                          <a:rPr lang="en-US" i="1"/>
-                          <m:t>2</m:t>
-                        </m:r>
-                      </m:sup>
-                    </m:sSubSup>
-                  </m:oMath>
-                </a14:m>
-                <a:r>
-                  <a:rPr lang="en-US" dirty="0"/>
-                  <a:t> = 0.01, </a:t>
-                </a:r>
-                <a:r>
-                  <a:rPr lang="en-US" i="1" dirty="0"/>
-                  <a:t>p</a:t>
-                </a:r>
-                <a:r>
-                  <a:rPr lang="en-US" dirty="0"/>
-                  <a:t> &lt; .</a:t>
-                </a:r>
-                <a:r>
-                  <a:rPr lang="en-US" dirty="0" smtClean="0"/>
-                  <a:t>01.</a:t>
-                </a:r>
-              </a:p>
-              <a:p>
-                <a:r>
-                  <a:rPr lang="en-US" dirty="0" smtClean="0"/>
-                  <a:t>Do this for every significant factor. </a:t>
-                </a:r>
-              </a:p>
-            </p:txBody>
-          </p:sp>
-        </mc:Choice>
-        <mc:Fallback>
-          <p:sp>
-            <p:nvSpPr>
-              <p:cNvPr id="3" name="Content Placeholder 2"/>
-              <p:cNvSpPr>
-                <a:spLocks noGrp="1" noRot="1" noChangeAspect="1" noMove="1" noResize="1" noEditPoints="1" noAdjustHandles="1" noChangeArrowheads="1" noChangeShapeType="1" noTextEdit="1"/>
-              </p:cNvSpPr>
-              <p:nvPr>
-                <p:ph sz="half" idx="1"/>
-              </p:nvPr>
-            </p:nvSpPr>
-            <p:spPr>
-              <a:blipFill rotWithShape="0">
-                <a:blip r:embed="rId2"/>
-                <a:stretch>
-                  <a:fillRect l="-1882" t="-3501" r="-471"/>
-                </a:stretch>
-              </a:blipFill>
-            </p:spPr>
-            <p:txBody>
-              <a:bodyPr/>
-              <a:lstStyle/>
-              <a:p>
-                <a:r>
-                  <a:rPr lang="en-US">
+                  <a:rPr lang="en-GB">
                     <a:noFill/>
                   </a:rPr>
                   <a:t> </a:t>
@@ -7053,7 +6533,7 @@
 </p:sld>
 </file>
 
-<file path=ppt/slides/slide36.xml><?xml version="1.0" encoding="utf-8"?>
+<file path=ppt/slides/slide33.xml><?xml version="1.0" encoding="utf-8"?>
 <p:sld xmlns:a="http://schemas.openxmlformats.org/drawingml/2006/main" xmlns:r="http://schemas.openxmlformats.org/officeDocument/2006/relationships" xmlns:p="http://schemas.openxmlformats.org/presentationml/2006/main">
   <p:cSld>
     <p:spTree>
@@ -7093,8 +6573,8 @@
           </a:p>
         </p:txBody>
       </p:sp>
-      <mc:AlternateContent xmlns:mc="http://schemas.openxmlformats.org/markup-compatibility/2006">
-        <mc:Choice xmlns:a14="http://schemas.microsoft.com/office/drawing/2010/main" Requires="a14">
+      <mc:AlternateContent xmlns:mc="http://schemas.openxmlformats.org/markup-compatibility/2006" xmlns:a14="http://schemas.microsoft.com/office/drawing/2010/main">
+        <mc:Choice Requires="a14">
           <p:sp>
             <p:nvSpPr>
               <p:cNvPr id="3" name="Content Placeholder 2"/>
@@ -7139,12 +6619,16 @@
                     <m:sSubSup>
                       <m:sSubSupPr>
                         <m:ctrlPr>
-                          <a:rPr lang="en-US" i="1"/>
+                          <a:rPr lang="en-US" i="1">
+                            <a:latin typeface="Cambria Math"/>
+                          </a:rPr>
                         </m:ctrlPr>
                       </m:sSubSupPr>
                       <m:e>
                         <m:r>
-                          <a:rPr lang="en-US" i="1"/>
+                          <a:rPr lang="en-US" i="1">
+                            <a:latin typeface="Cambria Math"/>
+                          </a:rPr>
                           <m:t>𝜂</m:t>
                         </m:r>
                       </m:e>
@@ -7158,7 +6642,9 @@
                       </m:sub>
                       <m:sup>
                         <m:r>
-                          <a:rPr lang="en-US" i="1"/>
+                          <a:rPr lang="en-US" i="1">
+                            <a:latin typeface="Cambria Math"/>
+                          </a:rPr>
                           <m:t>2</m:t>
                         </m:r>
                       </m:sup>
@@ -7185,7 +6671,7 @@
             </p:txBody>
           </p:sp>
         </mc:Choice>
-        <mc:Fallback>
+        <mc:Fallback xmlns="">
           <p:sp>
             <p:nvSpPr>
               <p:cNvPr id="3" name="Content Placeholder 2"/>
@@ -7265,7 +6751,7 @@
 </p:sld>
 </file>
 
-<file path=ppt/slides/slide37.xml><?xml version="1.0" encoding="utf-8"?>
+<file path=ppt/slides/slide34.xml><?xml version="1.0" encoding="utf-8"?>
 <p:sld xmlns:a="http://schemas.openxmlformats.org/drawingml/2006/main" xmlns:r="http://schemas.openxmlformats.org/officeDocument/2006/relationships" xmlns:p="http://schemas.openxmlformats.org/presentationml/2006/main">
   <p:cSld>
     <p:spTree>
@@ -7317,10 +6803,15 @@
                 <p:ph sz="half" idx="1"/>
               </p:nvPr>
             </p:nvSpPr>
-            <p:spPr/>
+            <p:spPr>
+              <a:xfrm>
+                <a:off x="838200" y="1825625"/>
+                <a:ext cx="5181600" cy="4839126"/>
+              </a:xfrm>
+            </p:spPr>
             <p:txBody>
               <a:bodyPr>
-                <a:normAutofit fontScale="70000" lnSpcReduction="20000"/>
+                <a:normAutofit fontScale="77500" lnSpcReduction="20000"/>
               </a:bodyPr>
               <a:lstStyle/>
               <a:p>
@@ -7346,19 +6837,27 @@
                 </a:r>
                 <a:r>
                   <a:rPr lang="en-US" dirty="0"/>
-                  <a:t>(1, 36) = 571.82 </a:t>
+                  <a:t>(1, 36) = </a:t>
+                </a:r>
+                <a:r>
+                  <a:rPr lang="en-US" dirty="0" smtClean="0"/>
+                  <a:t>571.82, </a:t>
                 </a:r>
                 <a14:m>
                   <m:oMath xmlns:m="http://schemas.openxmlformats.org/officeDocument/2006/math">
                     <m:sSubSup>
                       <m:sSubSupPr>
                         <m:ctrlPr>
-                          <a:rPr lang="en-US" i="1"/>
+                          <a:rPr lang="en-US" i="1">
+                            <a:latin typeface="Cambria Math"/>
+                          </a:rPr>
                         </m:ctrlPr>
                       </m:sSubSupPr>
                       <m:e>
                         <m:r>
-                          <a:rPr lang="en-US" i="1"/>
+                          <a:rPr lang="en-US" i="1">
+                            <a:latin typeface="Cambria Math"/>
+                          </a:rPr>
                           <m:t>𝜂</m:t>
                         </m:r>
                       </m:e>
@@ -7372,7 +6871,9 @@
                       </m:sub>
                       <m:sup>
                         <m:r>
-                          <a:rPr lang="en-US" i="1"/>
+                          <a:rPr lang="en-US" i="1">
+                            <a:latin typeface="Cambria Math"/>
+                          </a:rPr>
                           <m:t>2</m:t>
                         </m:r>
                       </m:sup>
@@ -7408,10 +6909,14 @@
               </p:nvPr>
             </p:nvSpPr>
             <p:spPr>
-              <a:blipFill rotWithShape="0">
+              <a:xfrm>
+                <a:off x="838200" y="1825625"/>
+                <a:ext cx="5181600" cy="4839126"/>
+              </a:xfrm>
+              <a:blipFill rotWithShape="1">
                 <a:blip r:embed="rId2"/>
                 <a:stretch>
-                  <a:fillRect l="-1059" t="-2521" r="-2000"/>
+                  <a:fillRect l="-1412" t="-2519" r="-2118" b="-2141"/>
                 </a:stretch>
               </a:blipFill>
             </p:spPr>
@@ -7420,7 +6925,7 @@
               <a:lstStyle/>
               <a:p>
                 <a:r>
-                  <a:rPr lang="en-US">
+                  <a:rPr lang="en-GB">
                     <a:noFill/>
                   </a:rPr>
                   <a:t> </a:t>
@@ -7467,10 +6972,18 @@
         <p:spPr/>
         <p:txBody>
           <a:bodyPr>
-            <a:normAutofit fontScale="70000" lnSpcReduction="20000"/>
+            <a:normAutofit fontScale="77500" lnSpcReduction="20000"/>
           </a:bodyPr>
           <a:lstStyle/>
           <a:p>
+            <a:r>
+              <a:rPr lang="en-US" dirty="0" smtClean="0"/>
+              <a:t>Note that no pairwise comparisons are needed when both factors in the interaction only have </a:t>
+            </a:r>
+            <a:r>
+              <a:rPr lang="en-US" smtClean="0"/>
+              <a:t>two levels</a:t>
+            </a:r>
             <a:endParaRPr lang="en-US" dirty="0"/>
           </a:p>
         </p:txBody>
@@ -7495,7 +7008,7 @@
 </p:sld>
 </file>
 
-<file path=ppt/slides/slide38.xml><?xml version="1.0" encoding="utf-8"?>
+<file path=ppt/slides/slide35.xml><?xml version="1.0" encoding="utf-8"?>
 <p:sld xmlns:a="http://schemas.openxmlformats.org/drawingml/2006/main" xmlns:r="http://schemas.openxmlformats.org/officeDocument/2006/relationships" xmlns:p="http://schemas.openxmlformats.org/presentationml/2006/main">
   <p:cSld>
     <p:spTree>
@@ -7639,7 +7152,7 @@
 </p:sld>
 </file>
 
-<file path=ppt/slides/slide39.xml><?xml version="1.0" encoding="utf-8"?>
+<file path=ppt/slides/slide36.xml><?xml version="1.0" encoding="utf-8"?>
 <p:sld xmlns:a="http://schemas.openxmlformats.org/drawingml/2006/main" xmlns:r="http://schemas.openxmlformats.org/officeDocument/2006/relationships" xmlns:p="http://schemas.openxmlformats.org/presentationml/2006/main">
   <p:cSld>
     <p:spTree>
@@ -7774,7 +7287,7 @@
           <a:graphicData uri="http://schemas.openxmlformats.org/presentationml/2006/ole">
             <mc:AlternateContent xmlns:mc="http://schemas.openxmlformats.org/markup-compatibility/2006">
               <mc:Choice xmlns:v="urn:schemas-microsoft-com:vml" Requires="v">
-                <p:oleObj spid="_x0000_s4103" r:id="rId3" imgW="27225360" imgH="15898320" progId="">
+                <p:oleObj spid="_x0000_s4106" r:id="rId3" imgW="27225360" imgH="15898320" progId="">
                   <p:embed/>
                 </p:oleObj>
               </mc:Choice>
@@ -7855,131 +7368,7 @@
 </p:sld>
 </file>
 
-<file path=ppt/slides/slide4.xml><?xml version="1.0" encoding="utf-8"?>
-<p:sld xmlns:a="http://schemas.openxmlformats.org/drawingml/2006/main" xmlns:r="http://schemas.openxmlformats.org/officeDocument/2006/relationships" xmlns:p="http://schemas.openxmlformats.org/presentationml/2006/main">
-  <p:cSld>
-    <p:spTree>
-      <p:nvGrpSpPr>
-        <p:cNvPr id="1" name=""/>
-        <p:cNvGrpSpPr/>
-        <p:nvPr/>
-      </p:nvGrpSpPr>
-      <p:grpSpPr>
-        <a:xfrm>
-          <a:off x="0" y="0"/>
-          <a:ext cx="0" cy="0"/>
-          <a:chOff x="0" y="0"/>
-          <a:chExt cx="0" cy="0"/>
-        </a:xfrm>
-      </p:grpSpPr>
-      <p:sp>
-        <p:nvSpPr>
-          <p:cNvPr id="2" name="Title 1"/>
-          <p:cNvSpPr>
-            <a:spLocks noGrp="1"/>
-          </p:cNvSpPr>
-          <p:nvPr>
-            <p:ph type="title"/>
-          </p:nvPr>
-        </p:nvSpPr>
-        <p:spPr/>
-        <p:txBody>
-          <a:bodyPr/>
-          <a:lstStyle/>
-          <a:p>
-            <a:r>
-              <a:rPr lang="en-US" dirty="0" smtClean="0"/>
-              <a:t>Text import wizard</a:t>
-            </a:r>
-            <a:endParaRPr lang="en-US" dirty="0"/>
-          </a:p>
-        </p:txBody>
-      </p:sp>
-      <p:sp>
-        <p:nvSpPr>
-          <p:cNvPr id="3" name="Content Placeholder 2"/>
-          <p:cNvSpPr>
-            <a:spLocks noGrp="1"/>
-          </p:cNvSpPr>
-          <p:nvPr>
-            <p:ph idx="1"/>
-          </p:nvPr>
-        </p:nvSpPr>
-        <p:spPr>
-          <a:xfrm>
-            <a:off x="838200" y="1825625"/>
-            <a:ext cx="4871830" cy="4351338"/>
-          </a:xfrm>
-        </p:spPr>
-        <p:txBody>
-          <a:bodyPr/>
-          <a:lstStyle/>
-          <a:p>
-            <a:r>
-              <a:rPr lang="en-US" dirty="0" smtClean="0"/>
-              <a:t>Select “Delimited” (since the data are comma delimited)</a:t>
-            </a:r>
-          </a:p>
-          <a:p>
-            <a:r>
-              <a:rPr lang="en-US" dirty="0" smtClean="0"/>
-              <a:t>Select “Yes”, since the first line contains column names</a:t>
-            </a:r>
-          </a:p>
-          <a:p>
-            <a:r>
-              <a:rPr lang="en-US" dirty="0" smtClean="0"/>
-              <a:t>Press Next</a:t>
-            </a:r>
-            <a:endParaRPr lang="en-US" dirty="0"/>
-          </a:p>
-        </p:txBody>
-      </p:sp>
-      <p:pic>
-        <p:nvPicPr>
-          <p:cNvPr id="5" name="Picture 4"/>
-          <p:cNvPicPr>
-            <a:picLocks noChangeAspect="1"/>
-          </p:cNvPicPr>
-          <p:nvPr/>
-        </p:nvPicPr>
-        <p:blipFill>
-          <a:blip r:embed="rId2"/>
-          <a:stretch>
-            <a:fillRect/>
-          </a:stretch>
-        </p:blipFill>
-        <p:spPr>
-          <a:xfrm>
-            <a:off x="5796170" y="1133890"/>
-            <a:ext cx="4723838" cy="4572000"/>
-          </a:xfrm>
-          <a:prstGeom prst="rect">
-            <a:avLst/>
-          </a:prstGeom>
-        </p:spPr>
-      </p:pic>
-    </p:spTree>
-    <p:extLst>
-      <p:ext uri="{BB962C8B-B14F-4D97-AF65-F5344CB8AC3E}">
-        <p14:creationId xmlns:p14="http://schemas.microsoft.com/office/powerpoint/2010/main" val="1726033333"/>
-      </p:ext>
-    </p:extLst>
-  </p:cSld>
-  <p:clrMapOvr>
-    <a:masterClrMapping/>
-  </p:clrMapOvr>
-  <p:timing>
-    <p:tnLst>
-      <p:par>
-        <p:cTn id="1" dur="indefinite" restart="never" nodeType="tmRoot"/>
-      </p:par>
-    </p:tnLst>
-  </p:timing>
-</p:sld>
-</file>
-
-<file path=ppt/slides/slide40.xml><?xml version="1.0" encoding="utf-8"?>
+<file path=ppt/slides/slide37.xml><?xml version="1.0" encoding="utf-8"?>
 <p:sld xmlns:a="http://schemas.openxmlformats.org/drawingml/2006/main" xmlns:r="http://schemas.openxmlformats.org/officeDocument/2006/relationships" xmlns:p="http://schemas.openxmlformats.org/presentationml/2006/main">
   <p:cSld>
     <p:spTree>
@@ -8111,7 +7500,7 @@
 </p:sld>
 </file>
 
-<file path=ppt/slides/slide41.xml><?xml version="1.0" encoding="utf-8"?>
+<file path=ppt/slides/slide38.xml><?xml version="1.0" encoding="utf-8"?>
 <p:sld xmlns:a="http://schemas.openxmlformats.org/drawingml/2006/main" xmlns:r="http://schemas.openxmlformats.org/officeDocument/2006/relationships" xmlns:p="http://schemas.openxmlformats.org/presentationml/2006/main">
   <p:cSld>
     <p:spTree>
@@ -8245,7 +7634,7 @@
 </p:sld>
 </file>
 
-<file path=ppt/slides/slide42.xml><?xml version="1.0" encoding="utf-8"?>
+<file path=ppt/slides/slide39.xml><?xml version="1.0" encoding="utf-8"?>
 <p:sld xmlns:a="http://schemas.openxmlformats.org/drawingml/2006/main" xmlns:r="http://schemas.openxmlformats.org/officeDocument/2006/relationships" xmlns:p="http://schemas.openxmlformats.org/presentationml/2006/main">
   <p:cSld>
     <p:spTree>
@@ -8316,6 +7705,130 @@
     <p:extLst>
       <p:ext uri="{BB962C8B-B14F-4D97-AF65-F5344CB8AC3E}">
         <p14:creationId xmlns:p14="http://schemas.microsoft.com/office/powerpoint/2010/main" val="497935006"/>
+      </p:ext>
+    </p:extLst>
+  </p:cSld>
+  <p:clrMapOvr>
+    <a:masterClrMapping/>
+  </p:clrMapOvr>
+  <p:timing>
+    <p:tnLst>
+      <p:par>
+        <p:cTn id="1" dur="indefinite" restart="never" nodeType="tmRoot"/>
+      </p:par>
+    </p:tnLst>
+  </p:timing>
+</p:sld>
+</file>
+
+<file path=ppt/slides/slide4.xml><?xml version="1.0" encoding="utf-8"?>
+<p:sld xmlns:a="http://schemas.openxmlformats.org/drawingml/2006/main" xmlns:r="http://schemas.openxmlformats.org/officeDocument/2006/relationships" xmlns:p="http://schemas.openxmlformats.org/presentationml/2006/main">
+  <p:cSld>
+    <p:spTree>
+      <p:nvGrpSpPr>
+        <p:cNvPr id="1" name=""/>
+        <p:cNvGrpSpPr/>
+        <p:nvPr/>
+      </p:nvGrpSpPr>
+      <p:grpSpPr>
+        <a:xfrm>
+          <a:off x="0" y="0"/>
+          <a:ext cx="0" cy="0"/>
+          <a:chOff x="0" y="0"/>
+          <a:chExt cx="0" cy="0"/>
+        </a:xfrm>
+      </p:grpSpPr>
+      <p:sp>
+        <p:nvSpPr>
+          <p:cNvPr id="2" name="Title 1"/>
+          <p:cNvSpPr>
+            <a:spLocks noGrp="1"/>
+          </p:cNvSpPr>
+          <p:nvPr>
+            <p:ph type="title"/>
+          </p:nvPr>
+        </p:nvSpPr>
+        <p:spPr/>
+        <p:txBody>
+          <a:bodyPr/>
+          <a:lstStyle/>
+          <a:p>
+            <a:r>
+              <a:rPr lang="en-US" dirty="0" smtClean="0"/>
+              <a:t>Text import wizard</a:t>
+            </a:r>
+            <a:endParaRPr lang="en-US" dirty="0"/>
+          </a:p>
+        </p:txBody>
+      </p:sp>
+      <p:sp>
+        <p:nvSpPr>
+          <p:cNvPr id="3" name="Content Placeholder 2"/>
+          <p:cNvSpPr>
+            <a:spLocks noGrp="1"/>
+          </p:cNvSpPr>
+          <p:nvPr>
+            <p:ph idx="1"/>
+          </p:nvPr>
+        </p:nvSpPr>
+        <p:spPr>
+          <a:xfrm>
+            <a:off x="838200" y="1825625"/>
+            <a:ext cx="4871830" cy="4351338"/>
+          </a:xfrm>
+        </p:spPr>
+        <p:txBody>
+          <a:bodyPr/>
+          <a:lstStyle/>
+          <a:p>
+            <a:r>
+              <a:rPr lang="en-US" dirty="0" smtClean="0"/>
+              <a:t>Select “Delimited” (since the data are comma delimited)</a:t>
+            </a:r>
+          </a:p>
+          <a:p>
+            <a:r>
+              <a:rPr lang="en-US" dirty="0" smtClean="0"/>
+              <a:t>Select “Yes”, since the first line contains column names</a:t>
+            </a:r>
+          </a:p>
+          <a:p>
+            <a:r>
+              <a:rPr lang="en-US" dirty="0" smtClean="0"/>
+              <a:t>Press Next</a:t>
+            </a:r>
+            <a:endParaRPr lang="en-US" dirty="0"/>
+          </a:p>
+        </p:txBody>
+      </p:sp>
+      <p:pic>
+        <p:nvPicPr>
+          <p:cNvPr id="5" name="Picture 4"/>
+          <p:cNvPicPr>
+            <a:picLocks noChangeAspect="1"/>
+          </p:cNvPicPr>
+          <p:nvPr/>
+        </p:nvPicPr>
+        <p:blipFill>
+          <a:blip r:embed="rId2"/>
+          <a:stretch>
+            <a:fillRect/>
+          </a:stretch>
+        </p:blipFill>
+        <p:spPr>
+          <a:xfrm>
+            <a:off x="5796170" y="1133890"/>
+            <a:ext cx="4723838" cy="4572000"/>
+          </a:xfrm>
+          <a:prstGeom prst="rect">
+            <a:avLst/>
+          </a:prstGeom>
+        </p:spPr>
+      </p:pic>
+    </p:spTree>
+    <p:extLst>
+      <p:ext uri="{BB962C8B-B14F-4D97-AF65-F5344CB8AC3E}">
+        <p14:creationId xmlns:p14="http://schemas.microsoft.com/office/powerpoint/2010/main" val="1726033333"/>
       </p:ext>
     </p:extLst>
   </p:cSld>
@@ -8943,7 +8456,7 @@
           <a:graphicData uri="http://schemas.openxmlformats.org/presentationml/2006/ole">
             <mc:AlternateContent xmlns:mc="http://schemas.openxmlformats.org/markup-compatibility/2006">
               <mc:Choice xmlns:v="urn:schemas-microsoft-com:vml" Requires="v">
-                <p:oleObj spid="_x0000_s1056" r:id="rId3" imgW="27110880" imgH="15301440" progId="">
+                <p:oleObj spid="_x0000_s1059" r:id="rId3" imgW="27110880" imgH="15301440" progId="">
                   <p:embed/>
                 </p:oleObj>
               </mc:Choice>
@@ -9041,7 +8554,7 @@
     </a:clrScheme>
     <a:fontScheme name="Office">
       <a:majorFont>
-        <a:latin typeface="Calibri Light" panose="020F0302020204030204"/>
+        <a:latin typeface="Calibri Light"/>
         <a:ea typeface=""/>
         <a:cs typeface=""/>
         <a:font script="Jpan" typeface="ＭＳ Ｐゴシック"/>
@@ -9076,7 +8589,7 @@
         <a:font script="Geor" typeface="Sylfaen"/>
       </a:majorFont>
       <a:minorFont>
-        <a:latin typeface="Calibri" panose="020F0502020204030204"/>
+        <a:latin typeface="Calibri"/>
         <a:ea typeface=""/>
         <a:cs typeface=""/>
         <a:font script="Jpan" typeface="ＭＳ Ｐゴシック"/>
@@ -9253,7 +8766,7 @@
   <a:extraClrSchemeLst/>
   <a:extLst>
     <a:ext uri="{05A4C25C-085E-4340-85A3-A5531E510DB2}">
-      <thm15:themeFamily xmlns:thm15="http://schemas.microsoft.com/office/thememl/2012/main" name="Office Theme" id="{62F939B6-93AF-4DB8-9C6B-D6C7DFDC589F}" vid="{4A3C46E8-61CC-4603-A589-7422A47A8E4A}"/>
+      <thm15:themeFamily xmlns:thm15="http://schemas.microsoft.com/office/thememl/2012/main" xmlns="" name="Office Theme" id="{62F939B6-93AF-4DB8-9C6B-D6C7DFDC589F}" vid="{4A3C46E8-61CC-4603-A589-7422A47A8E4A}"/>
     </a:ext>
   </a:extLst>
 </a:theme>

</xml_diff>

<commit_message>
Yet more work on Class 6
</commit_message>
<xml_diff>
--- a/Homework 4/Homework 4 in SPSS.pptx
+++ b/Homework 4/Homework 4 in SPSS.pptx
@@ -20,33 +20,30 @@
     <p:sldId id="270" r:id="rId14"/>
     <p:sldId id="271" r:id="rId15"/>
     <p:sldId id="273" r:id="rId16"/>
-    <p:sldId id="274" r:id="rId17"/>
-    <p:sldId id="275" r:id="rId18"/>
-    <p:sldId id="276" r:id="rId19"/>
-    <p:sldId id="277" r:id="rId20"/>
-    <p:sldId id="280" r:id="rId21"/>
-    <p:sldId id="281" r:id="rId22"/>
-    <p:sldId id="282" r:id="rId23"/>
-    <p:sldId id="283" r:id="rId24"/>
-    <p:sldId id="284" r:id="rId25"/>
-    <p:sldId id="285" r:id="rId26"/>
-    <p:sldId id="286" r:id="rId27"/>
-    <p:sldId id="287" r:id="rId28"/>
-    <p:sldId id="288" r:id="rId29"/>
-    <p:sldId id="289" r:id="rId30"/>
-    <p:sldId id="290" r:id="rId31"/>
-    <p:sldId id="291" r:id="rId32"/>
-    <p:sldId id="293" r:id="rId33"/>
-    <p:sldId id="292" r:id="rId34"/>
-    <p:sldId id="294" r:id="rId35"/>
-    <p:sldId id="295" r:id="rId36"/>
-    <p:sldId id="296" r:id="rId37"/>
-    <p:sldId id="297" r:id="rId38"/>
-    <p:sldId id="298" r:id="rId39"/>
-    <p:sldId id="299" r:id="rId40"/>
-    <p:sldId id="300" r:id="rId41"/>
-    <p:sldId id="301" r:id="rId42"/>
-    <p:sldId id="302" r:id="rId43"/>
+    <p:sldId id="276" r:id="rId17"/>
+    <p:sldId id="277" r:id="rId18"/>
+    <p:sldId id="280" r:id="rId19"/>
+    <p:sldId id="281" r:id="rId20"/>
+    <p:sldId id="282" r:id="rId21"/>
+    <p:sldId id="283" r:id="rId22"/>
+    <p:sldId id="284" r:id="rId23"/>
+    <p:sldId id="285" r:id="rId24"/>
+    <p:sldId id="286" r:id="rId25"/>
+    <p:sldId id="287" r:id="rId26"/>
+    <p:sldId id="288" r:id="rId27"/>
+    <p:sldId id="289" r:id="rId28"/>
+    <p:sldId id="290" r:id="rId29"/>
+    <p:sldId id="291" r:id="rId30"/>
+    <p:sldId id="293" r:id="rId31"/>
+    <p:sldId id="292" r:id="rId32"/>
+    <p:sldId id="295" r:id="rId33"/>
+    <p:sldId id="296" r:id="rId34"/>
+    <p:sldId id="297" r:id="rId35"/>
+    <p:sldId id="298" r:id="rId36"/>
+    <p:sldId id="299" r:id="rId37"/>
+    <p:sldId id="300" r:id="rId38"/>
+    <p:sldId id="301" r:id="rId39"/>
+    <p:sldId id="302" r:id="rId40"/>
   </p:sldIdLst>
   <p:sldSz cx="12192000" cy="6858000"/>
   <p:notesSz cx="6858000" cy="9144000"/>
@@ -279,7 +276,7 @@
           <a:p>
             <a:fld id="{1BE25CBA-E170-42E9-9F93-AF8F30908BBD}" type="datetimeFigureOut">
               <a:rPr lang="en-US" smtClean="0"/>
-              <a:t>11/4/2014</a:t>
+              <a:t>11/5/2014</a:t>
             </a:fld>
             <a:endParaRPr lang="en-US"/>
           </a:p>
@@ -449,7 +446,7 @@
           <a:p>
             <a:fld id="{1BE25CBA-E170-42E9-9F93-AF8F30908BBD}" type="datetimeFigureOut">
               <a:rPr lang="en-US" smtClean="0"/>
-              <a:t>11/4/2014</a:t>
+              <a:t>11/5/2014</a:t>
             </a:fld>
             <a:endParaRPr lang="en-US"/>
           </a:p>
@@ -629,7 +626,7 @@
           <a:p>
             <a:fld id="{1BE25CBA-E170-42E9-9F93-AF8F30908BBD}" type="datetimeFigureOut">
               <a:rPr lang="en-US" smtClean="0"/>
-              <a:t>11/4/2014</a:t>
+              <a:t>11/5/2014</a:t>
             </a:fld>
             <a:endParaRPr lang="en-US"/>
           </a:p>
@@ -799,7 +796,7 @@
           <a:p>
             <a:fld id="{1BE25CBA-E170-42E9-9F93-AF8F30908BBD}" type="datetimeFigureOut">
               <a:rPr lang="en-US" smtClean="0"/>
-              <a:t>11/4/2014</a:t>
+              <a:t>11/5/2014</a:t>
             </a:fld>
             <a:endParaRPr lang="en-US"/>
           </a:p>
@@ -1045,7 +1042,7 @@
           <a:p>
             <a:fld id="{1BE25CBA-E170-42E9-9F93-AF8F30908BBD}" type="datetimeFigureOut">
               <a:rPr lang="en-US" smtClean="0"/>
-              <a:t>11/4/2014</a:t>
+              <a:t>11/5/2014</a:t>
             </a:fld>
             <a:endParaRPr lang="en-US"/>
           </a:p>
@@ -1277,7 +1274,7 @@
           <a:p>
             <a:fld id="{1BE25CBA-E170-42E9-9F93-AF8F30908BBD}" type="datetimeFigureOut">
               <a:rPr lang="en-US" smtClean="0"/>
-              <a:t>11/4/2014</a:t>
+              <a:t>11/5/2014</a:t>
             </a:fld>
             <a:endParaRPr lang="en-US"/>
           </a:p>
@@ -1644,7 +1641,7 @@
           <a:p>
             <a:fld id="{1BE25CBA-E170-42E9-9F93-AF8F30908BBD}" type="datetimeFigureOut">
               <a:rPr lang="en-US" smtClean="0"/>
-              <a:t>11/4/2014</a:t>
+              <a:t>11/5/2014</a:t>
             </a:fld>
             <a:endParaRPr lang="en-US"/>
           </a:p>
@@ -1762,7 +1759,7 @@
           <a:p>
             <a:fld id="{1BE25CBA-E170-42E9-9F93-AF8F30908BBD}" type="datetimeFigureOut">
               <a:rPr lang="en-US" smtClean="0"/>
-              <a:t>11/4/2014</a:t>
+              <a:t>11/5/2014</a:t>
             </a:fld>
             <a:endParaRPr lang="en-US"/>
           </a:p>
@@ -1857,7 +1854,7 @@
           <a:p>
             <a:fld id="{1BE25CBA-E170-42E9-9F93-AF8F30908BBD}" type="datetimeFigureOut">
               <a:rPr lang="en-US" smtClean="0"/>
-              <a:t>11/4/2014</a:t>
+              <a:t>11/5/2014</a:t>
             </a:fld>
             <a:endParaRPr lang="en-US"/>
           </a:p>
@@ -2134,7 +2131,7 @@
           <a:p>
             <a:fld id="{1BE25CBA-E170-42E9-9F93-AF8F30908BBD}" type="datetimeFigureOut">
               <a:rPr lang="en-US" smtClean="0"/>
-              <a:t>11/4/2014</a:t>
+              <a:t>11/5/2014</a:t>
             </a:fld>
             <a:endParaRPr lang="en-US"/>
           </a:p>
@@ -2387,7 +2384,7 @@
           <a:p>
             <a:fld id="{1BE25CBA-E170-42E9-9F93-AF8F30908BBD}" type="datetimeFigureOut">
               <a:rPr lang="en-US" smtClean="0"/>
-              <a:t>11/4/2014</a:t>
+              <a:t>11/5/2014</a:t>
             </a:fld>
             <a:endParaRPr lang="en-US"/>
           </a:p>
@@ -2600,7 +2597,7 @@
           <a:p>
             <a:fld id="{1BE25CBA-E170-42E9-9F93-AF8F30908BBD}" type="datetimeFigureOut">
               <a:rPr lang="en-US" smtClean="0"/>
-              <a:t>11/4/2014</a:t>
+              <a:t>11/5/2014</a:t>
             </a:fld>
             <a:endParaRPr lang="en-US"/>
           </a:p>
@@ -3397,7 +3394,7 @@
           <a:graphicData uri="http://schemas.openxmlformats.org/presentationml/2006/ole">
             <mc:AlternateContent xmlns:mc="http://schemas.openxmlformats.org/markup-compatibility/2006">
               <mc:Choice xmlns:v="urn:schemas-microsoft-com:vml" Requires="v">
-                <p:oleObj spid="_x0000_s2074" r:id="rId3" imgW="27580680" imgH="15631560" progId="">
+                <p:oleObj spid="_x0000_s2077" r:id="rId3" imgW="27580680" imgH="15631560" progId="">
                   <p:embed/>
                 </p:oleObj>
               </mc:Choice>
@@ -3845,250 +3842,6 @@
           <a:p>
             <a:r>
               <a:rPr lang="en-US" dirty="0" smtClean="0"/>
-              <a:t>Run the analysis</a:t>
-            </a:r>
-            <a:endParaRPr lang="en-US" dirty="0"/>
-          </a:p>
-        </p:txBody>
-      </p:sp>
-      <p:sp>
-        <p:nvSpPr>
-          <p:cNvPr id="3" name="Content Placeholder 2"/>
-          <p:cNvSpPr>
-            <a:spLocks noGrp="1"/>
-          </p:cNvSpPr>
-          <p:nvPr>
-            <p:ph sz="half" idx="1"/>
-          </p:nvPr>
-        </p:nvSpPr>
-        <p:spPr/>
-        <p:txBody>
-          <a:bodyPr/>
-          <a:lstStyle/>
-          <a:p>
-            <a:r>
-              <a:rPr lang="en-US" dirty="0" smtClean="0"/>
-              <a:t>Add a name for the dependent measure (e.g. “</a:t>
-            </a:r>
-            <a:r>
-              <a:rPr lang="en-US" dirty="0" err="1" smtClean="0"/>
-              <a:t>food_eaten</a:t>
-            </a:r>
-            <a:r>
-              <a:rPr lang="en-US" dirty="0" smtClean="0"/>
-              <a:t>”)</a:t>
-            </a:r>
-          </a:p>
-          <a:p>
-            <a:r>
-              <a:rPr lang="en-US" dirty="0" smtClean="0"/>
-              <a:t>Click “Add” and “Define”.</a:t>
-            </a:r>
-            <a:endParaRPr lang="en-US" dirty="0"/>
-          </a:p>
-        </p:txBody>
-      </p:sp>
-      <p:pic>
-        <p:nvPicPr>
-          <p:cNvPr id="5" name="Content Placeholder 4"/>
-          <p:cNvPicPr>
-            <a:picLocks noGrp="1" noChangeAspect="1"/>
-          </p:cNvPicPr>
-          <p:nvPr>
-            <p:ph sz="half" idx="2"/>
-          </p:nvPr>
-        </p:nvPicPr>
-        <p:blipFill>
-          <a:blip r:embed="rId2"/>
-          <a:stretch>
-            <a:fillRect/>
-          </a:stretch>
-        </p:blipFill>
-        <p:spPr>
-          <a:xfrm>
-            <a:off x="7270205" y="1825625"/>
-            <a:ext cx="2985589" cy="4351338"/>
-          </a:xfrm>
-          <a:prstGeom prst="rect">
-            <a:avLst/>
-          </a:prstGeom>
-        </p:spPr>
-      </p:pic>
-    </p:spTree>
-    <p:extLst>
-      <p:ext uri="{BB962C8B-B14F-4D97-AF65-F5344CB8AC3E}">
-        <p14:creationId xmlns:p14="http://schemas.microsoft.com/office/powerpoint/2010/main" val="185833518"/>
-      </p:ext>
-    </p:extLst>
-  </p:cSld>
-  <p:clrMapOvr>
-    <a:masterClrMapping/>
-  </p:clrMapOvr>
-  <p:timing>
-    <p:tnLst>
-      <p:par>
-        <p:cTn id="1" dur="indefinite" restart="never" nodeType="tmRoot"/>
-      </p:par>
-    </p:tnLst>
-  </p:timing>
-</p:sld>
-</file>
-
-<file path=ppt/slides/slide17.xml><?xml version="1.0" encoding="utf-8"?>
-<p:sld xmlns:a="http://schemas.openxmlformats.org/drawingml/2006/main" xmlns:r="http://schemas.openxmlformats.org/officeDocument/2006/relationships" xmlns:p="http://schemas.openxmlformats.org/presentationml/2006/main">
-  <p:cSld>
-    <p:spTree>
-      <p:nvGrpSpPr>
-        <p:cNvPr id="1" name=""/>
-        <p:cNvGrpSpPr/>
-        <p:nvPr/>
-      </p:nvGrpSpPr>
-      <p:grpSpPr>
-        <a:xfrm>
-          <a:off x="0" y="0"/>
-          <a:ext cx="0" cy="0"/>
-          <a:chOff x="0" y="0"/>
-          <a:chExt cx="0" cy="0"/>
-        </a:xfrm>
-      </p:grpSpPr>
-      <p:sp>
-        <p:nvSpPr>
-          <p:cNvPr id="2" name="Title 1"/>
-          <p:cNvSpPr>
-            <a:spLocks noGrp="1"/>
-          </p:cNvSpPr>
-          <p:nvPr>
-            <p:ph type="title"/>
-          </p:nvPr>
-        </p:nvSpPr>
-        <p:spPr/>
-        <p:txBody>
-          <a:bodyPr/>
-          <a:lstStyle/>
-          <a:p>
-            <a:r>
-              <a:rPr lang="en-US" dirty="0" smtClean="0"/>
-              <a:t>Assign within-subjects variables</a:t>
-            </a:r>
-            <a:endParaRPr lang="en-US" dirty="0"/>
-          </a:p>
-        </p:txBody>
-      </p:sp>
-      <p:sp>
-        <p:nvSpPr>
-          <p:cNvPr id="3" name="Content Placeholder 2"/>
-          <p:cNvSpPr>
-            <a:spLocks noGrp="1"/>
-          </p:cNvSpPr>
-          <p:nvPr>
-            <p:ph sz="half" idx="1"/>
-          </p:nvPr>
-        </p:nvSpPr>
-        <p:spPr/>
-        <p:txBody>
-          <a:bodyPr/>
-          <a:lstStyle/>
-          <a:p>
-            <a:r>
-              <a:rPr lang="en-US" dirty="0" smtClean="0"/>
-              <a:t>Click on each column name, then on the corresponding level of the within subjects variables and then on the arrow to assign it.</a:t>
-            </a:r>
-          </a:p>
-          <a:p>
-            <a:r>
-              <a:rPr lang="en-US" dirty="0" smtClean="0"/>
-              <a:t>You need to decide which level corresponds to which numbers</a:t>
-            </a:r>
-          </a:p>
-          <a:p>
-            <a:pPr lvl="1"/>
-            <a:r>
-              <a:rPr lang="en-US" dirty="0" smtClean="0"/>
-              <a:t>e.g. 1,1 could correspond to beef, fish and 2,2 could correspond to no fish, no beef, etc.</a:t>
-            </a:r>
-          </a:p>
-        </p:txBody>
-      </p:sp>
-      <p:pic>
-        <p:nvPicPr>
-          <p:cNvPr id="5" name="Content Placeholder 4"/>
-          <p:cNvPicPr>
-            <a:picLocks noGrp="1" noChangeAspect="1"/>
-          </p:cNvPicPr>
-          <p:nvPr>
-            <p:ph sz="half" idx="2"/>
-          </p:nvPr>
-        </p:nvPicPr>
-        <p:blipFill>
-          <a:blip r:embed="rId2"/>
-          <a:stretch>
-            <a:fillRect/>
-          </a:stretch>
-        </p:blipFill>
-        <p:spPr>
-          <a:xfrm>
-            <a:off x="6287747" y="1825625"/>
-            <a:ext cx="4950506" cy="4351338"/>
-          </a:xfrm>
-          <a:prstGeom prst="rect">
-            <a:avLst/>
-          </a:prstGeom>
-        </p:spPr>
-      </p:pic>
-    </p:spTree>
-    <p:extLst>
-      <p:ext uri="{BB962C8B-B14F-4D97-AF65-F5344CB8AC3E}">
-        <p14:creationId xmlns:p14="http://schemas.microsoft.com/office/powerpoint/2010/main" val="3741009431"/>
-      </p:ext>
-    </p:extLst>
-  </p:cSld>
-  <p:clrMapOvr>
-    <a:masterClrMapping/>
-  </p:clrMapOvr>
-  <p:timing>
-    <p:tnLst>
-      <p:par>
-        <p:cTn id="1" dur="indefinite" restart="never" nodeType="tmRoot"/>
-      </p:par>
-    </p:tnLst>
-  </p:timing>
-</p:sld>
-</file>
-
-<file path=ppt/slides/slide18.xml><?xml version="1.0" encoding="utf-8"?>
-<p:sld xmlns:a="http://schemas.openxmlformats.org/drawingml/2006/main" xmlns:r="http://schemas.openxmlformats.org/officeDocument/2006/relationships" xmlns:p="http://schemas.openxmlformats.org/presentationml/2006/main">
-  <p:cSld>
-    <p:spTree>
-      <p:nvGrpSpPr>
-        <p:cNvPr id="1" name=""/>
-        <p:cNvGrpSpPr/>
-        <p:nvPr/>
-      </p:nvGrpSpPr>
-      <p:grpSpPr>
-        <a:xfrm>
-          <a:off x="0" y="0"/>
-          <a:ext cx="0" cy="0"/>
-          <a:chOff x="0" y="0"/>
-          <a:chExt cx="0" cy="0"/>
-        </a:xfrm>
-      </p:grpSpPr>
-      <p:sp>
-        <p:nvSpPr>
-          <p:cNvPr id="2" name="Title 1"/>
-          <p:cNvSpPr>
-            <a:spLocks noGrp="1"/>
-          </p:cNvSpPr>
-          <p:nvPr>
-            <p:ph type="title"/>
-          </p:nvPr>
-        </p:nvSpPr>
-        <p:spPr/>
-        <p:txBody>
-          <a:bodyPr/>
-          <a:lstStyle/>
-          <a:p>
-            <a:r>
-              <a:rPr lang="en-US" dirty="0" smtClean="0"/>
               <a:t>Assign within-subjects variables</a:t>
             </a:r>
             <a:endParaRPr lang="en-US" dirty="0"/>
@@ -4184,7 +3937,7 @@
 </p:sld>
 </file>
 
-<file path=ppt/slides/slide19.xml><?xml version="1.0" encoding="utf-8"?>
+<file path=ppt/slides/slide17.xml><?xml version="1.0" encoding="utf-8"?>
 <p:sld xmlns:a="http://schemas.openxmlformats.org/drawingml/2006/main" xmlns:r="http://schemas.openxmlformats.org/officeDocument/2006/relationships" xmlns:p="http://schemas.openxmlformats.org/presentationml/2006/main">
   <p:cSld>
     <p:spTree>
@@ -4305,6 +4058,303 @@
 </p:sld>
 </file>
 
+<file path=ppt/slides/slide18.xml><?xml version="1.0" encoding="utf-8"?>
+<p:sld xmlns:a="http://schemas.openxmlformats.org/drawingml/2006/main" xmlns:r="http://schemas.openxmlformats.org/officeDocument/2006/relationships" xmlns:p="http://schemas.openxmlformats.org/presentationml/2006/main">
+  <p:cSld>
+    <p:spTree>
+      <p:nvGrpSpPr>
+        <p:cNvPr id="1" name=""/>
+        <p:cNvGrpSpPr/>
+        <p:nvPr/>
+      </p:nvGrpSpPr>
+      <p:grpSpPr>
+        <a:xfrm>
+          <a:off x="0" y="0"/>
+          <a:ext cx="0" cy="0"/>
+          <a:chOff x="0" y="0"/>
+          <a:chExt cx="0" cy="0"/>
+        </a:xfrm>
+      </p:grpSpPr>
+      <p:sp>
+        <p:nvSpPr>
+          <p:cNvPr id="2" name="Title 1"/>
+          <p:cNvSpPr>
+            <a:spLocks noGrp="1"/>
+          </p:cNvSpPr>
+          <p:nvPr>
+            <p:ph type="title"/>
+          </p:nvPr>
+        </p:nvSpPr>
+        <p:spPr/>
+        <p:txBody>
+          <a:bodyPr/>
+          <a:lstStyle/>
+          <a:p>
+            <a:r>
+              <a:rPr lang="en-US" dirty="0" smtClean="0"/>
+              <a:t>Post-hoc comparisons</a:t>
+            </a:r>
+            <a:endParaRPr lang="en-US" dirty="0"/>
+          </a:p>
+        </p:txBody>
+      </p:sp>
+      <p:sp>
+        <p:nvSpPr>
+          <p:cNvPr id="3" name="Content Placeholder 2"/>
+          <p:cNvSpPr>
+            <a:spLocks noGrp="1"/>
+          </p:cNvSpPr>
+          <p:nvPr>
+            <p:ph sz="half" idx="1"/>
+          </p:nvPr>
+        </p:nvSpPr>
+        <p:spPr/>
+        <p:txBody>
+          <a:bodyPr>
+            <a:normAutofit lnSpcReduction="10000"/>
+          </a:bodyPr>
+          <a:lstStyle/>
+          <a:p>
+            <a:r>
+              <a:rPr lang="en-US" dirty="0" smtClean="0"/>
+              <a:t>Click “Post Hoc…”</a:t>
+            </a:r>
+          </a:p>
+          <a:p>
+            <a:r>
+              <a:rPr lang="en-US" dirty="0" smtClean="0"/>
+              <a:t>Note that only factors with 3 or more levels are shown in the post hoc window</a:t>
+            </a:r>
+          </a:p>
+          <a:p>
+            <a:r>
+              <a:rPr lang="en-US" dirty="0" smtClean="0"/>
+              <a:t>Select “</a:t>
+            </a:r>
+            <a:r>
+              <a:rPr lang="en-US" dirty="0" err="1" smtClean="0"/>
+              <a:t>breed_factor</a:t>
+            </a:r>
+            <a:r>
+              <a:rPr lang="en-US" dirty="0" smtClean="0"/>
+              <a:t>” and move it over to the “Post hoc tests for” field</a:t>
+            </a:r>
+          </a:p>
+          <a:p>
+            <a:r>
+              <a:rPr lang="en-US" dirty="0" smtClean="0"/>
+              <a:t>Select any tests you want, e.g. </a:t>
+            </a:r>
+            <a:r>
+              <a:rPr lang="en-US" dirty="0" err="1" smtClean="0"/>
+              <a:t>Bonferroni</a:t>
+            </a:r>
+            <a:r>
+              <a:rPr lang="en-US" dirty="0" smtClean="0"/>
+              <a:t> and </a:t>
+            </a:r>
+            <a:r>
+              <a:rPr lang="en-US" dirty="0" err="1" smtClean="0"/>
+              <a:t>Tukey</a:t>
+            </a:r>
+            <a:endParaRPr lang="en-US" dirty="0" smtClean="0"/>
+          </a:p>
+          <a:p>
+            <a:r>
+              <a:rPr lang="en-US" dirty="0" smtClean="0"/>
+              <a:t>Click “Continue”</a:t>
+            </a:r>
+            <a:endParaRPr lang="en-US" dirty="0"/>
+          </a:p>
+        </p:txBody>
+      </p:sp>
+      <p:pic>
+        <p:nvPicPr>
+          <p:cNvPr id="5" name="Content Placeholder 4"/>
+          <p:cNvPicPr>
+            <a:picLocks noGrp="1" noChangeAspect="1"/>
+          </p:cNvPicPr>
+          <p:nvPr>
+            <p:ph sz="half" idx="2"/>
+          </p:nvPr>
+        </p:nvPicPr>
+        <p:blipFill>
+          <a:blip r:embed="rId2"/>
+          <a:stretch>
+            <a:fillRect/>
+          </a:stretch>
+        </p:blipFill>
+        <p:spPr>
+          <a:xfrm>
+            <a:off x="6451047" y="1825625"/>
+            <a:ext cx="4623905" cy="4351338"/>
+          </a:xfrm>
+          <a:prstGeom prst="rect">
+            <a:avLst/>
+          </a:prstGeom>
+        </p:spPr>
+      </p:pic>
+    </p:spTree>
+    <p:extLst>
+      <p:ext uri="{BB962C8B-B14F-4D97-AF65-F5344CB8AC3E}">
+        <p14:creationId xmlns:p14="http://schemas.microsoft.com/office/powerpoint/2010/main" val="481779370"/>
+      </p:ext>
+    </p:extLst>
+  </p:cSld>
+  <p:clrMapOvr>
+    <a:masterClrMapping/>
+  </p:clrMapOvr>
+  <p:timing>
+    <p:tnLst>
+      <p:par>
+        <p:cTn id="1" dur="indefinite" restart="never" nodeType="tmRoot"/>
+      </p:par>
+    </p:tnLst>
+  </p:timing>
+</p:sld>
+</file>
+
+<file path=ppt/slides/slide19.xml><?xml version="1.0" encoding="utf-8"?>
+<p:sld xmlns:a="http://schemas.openxmlformats.org/drawingml/2006/main" xmlns:r="http://schemas.openxmlformats.org/officeDocument/2006/relationships" xmlns:p="http://schemas.openxmlformats.org/presentationml/2006/main">
+  <p:cSld>
+    <p:spTree>
+      <p:nvGrpSpPr>
+        <p:cNvPr id="1" name=""/>
+        <p:cNvGrpSpPr/>
+        <p:nvPr/>
+      </p:nvGrpSpPr>
+      <p:grpSpPr>
+        <a:xfrm>
+          <a:off x="0" y="0"/>
+          <a:ext cx="0" cy="0"/>
+          <a:chOff x="0" y="0"/>
+          <a:chExt cx="0" cy="0"/>
+        </a:xfrm>
+      </p:grpSpPr>
+      <p:sp>
+        <p:nvSpPr>
+          <p:cNvPr id="2" name="Title 1"/>
+          <p:cNvSpPr>
+            <a:spLocks noGrp="1"/>
+          </p:cNvSpPr>
+          <p:nvPr>
+            <p:ph type="title"/>
+          </p:nvPr>
+        </p:nvSpPr>
+        <p:spPr/>
+        <p:txBody>
+          <a:bodyPr/>
+          <a:lstStyle/>
+          <a:p>
+            <a:r>
+              <a:rPr lang="en-US" dirty="0" smtClean="0"/>
+              <a:t>Options</a:t>
+            </a:r>
+            <a:endParaRPr lang="en-US" dirty="0"/>
+          </a:p>
+        </p:txBody>
+      </p:sp>
+      <p:sp>
+        <p:nvSpPr>
+          <p:cNvPr id="3" name="Content Placeholder 2"/>
+          <p:cNvSpPr>
+            <a:spLocks noGrp="1"/>
+          </p:cNvSpPr>
+          <p:nvPr>
+            <p:ph sz="half" idx="1"/>
+          </p:nvPr>
+        </p:nvSpPr>
+        <p:spPr/>
+        <p:txBody>
+          <a:bodyPr>
+            <a:normAutofit lnSpcReduction="10000"/>
+          </a:bodyPr>
+          <a:lstStyle/>
+          <a:p>
+            <a:r>
+              <a:rPr lang="en-US" dirty="0" smtClean="0"/>
+              <a:t>Click “Options…”</a:t>
+            </a:r>
+          </a:p>
+          <a:p>
+            <a:r>
+              <a:rPr lang="en-US" dirty="0" smtClean="0"/>
+              <a:t>Get marginal means for all main effects and the three way interaction (the two-way interactions are less interesting)</a:t>
+            </a:r>
+          </a:p>
+          <a:p>
+            <a:r>
+              <a:rPr lang="en-US" dirty="0" smtClean="0"/>
+              <a:t>Get descriptive statistics and estimates of effect size</a:t>
+            </a:r>
+          </a:p>
+          <a:p>
+            <a:r>
+              <a:rPr lang="en-US" dirty="0" smtClean="0"/>
+              <a:t>Get homogeneity tests</a:t>
+            </a:r>
+          </a:p>
+          <a:p>
+            <a:r>
+              <a:rPr lang="en-US" dirty="0" smtClean="0"/>
+              <a:t>Click “Continue”</a:t>
+            </a:r>
+          </a:p>
+          <a:p>
+            <a:r>
+              <a:rPr lang="en-US" dirty="0" smtClean="0"/>
+              <a:t>Click “OK” to run the analysis.</a:t>
+            </a:r>
+            <a:endParaRPr lang="en-US" dirty="0"/>
+          </a:p>
+        </p:txBody>
+      </p:sp>
+      <p:pic>
+        <p:nvPicPr>
+          <p:cNvPr id="6" name="Content Placeholder 5"/>
+          <p:cNvPicPr>
+            <a:picLocks noGrp="1" noChangeAspect="1"/>
+          </p:cNvPicPr>
+          <p:nvPr>
+            <p:ph sz="half" idx="2"/>
+          </p:nvPr>
+        </p:nvPicPr>
+        <p:blipFill>
+          <a:blip r:embed="rId2"/>
+          <a:stretch>
+            <a:fillRect/>
+          </a:stretch>
+        </p:blipFill>
+        <p:spPr>
+          <a:xfrm>
+            <a:off x="6750399" y="1825625"/>
+            <a:ext cx="4025202" cy="4351338"/>
+          </a:xfrm>
+          <a:prstGeom prst="rect">
+            <a:avLst/>
+          </a:prstGeom>
+        </p:spPr>
+      </p:pic>
+    </p:spTree>
+    <p:extLst>
+      <p:ext uri="{BB962C8B-B14F-4D97-AF65-F5344CB8AC3E}">
+        <p14:creationId xmlns:p14="http://schemas.microsoft.com/office/powerpoint/2010/main" val="612478154"/>
+      </p:ext>
+    </p:extLst>
+  </p:cSld>
+  <p:clrMapOvr>
+    <a:masterClrMapping/>
+  </p:clrMapOvr>
+  <p:timing>
+    <p:tnLst>
+      <p:par>
+        <p:cTn id="1" dur="indefinite" restart="never" nodeType="tmRoot"/>
+      </p:par>
+    </p:tnLst>
+  </p:timing>
+</p:sld>
+</file>
+
 <file path=ppt/slides/slide2.xml><?xml version="1.0" encoding="utf-8"?>
 <p:sld xmlns:a="http://schemas.openxmlformats.org/drawingml/2006/main" xmlns:r="http://schemas.openxmlformats.org/officeDocument/2006/relationships" xmlns:p="http://schemas.openxmlformats.org/presentationml/2006/main">
   <p:cSld>
@@ -4464,303 +4514,6 @@
           <a:p>
             <a:r>
               <a:rPr lang="en-US" dirty="0" smtClean="0"/>
-              <a:t>Post-hoc comparisons</a:t>
-            </a:r>
-            <a:endParaRPr lang="en-US" dirty="0"/>
-          </a:p>
-        </p:txBody>
-      </p:sp>
-      <p:sp>
-        <p:nvSpPr>
-          <p:cNvPr id="3" name="Content Placeholder 2"/>
-          <p:cNvSpPr>
-            <a:spLocks noGrp="1"/>
-          </p:cNvSpPr>
-          <p:nvPr>
-            <p:ph sz="half" idx="1"/>
-          </p:nvPr>
-        </p:nvSpPr>
-        <p:spPr/>
-        <p:txBody>
-          <a:bodyPr>
-            <a:normAutofit lnSpcReduction="10000"/>
-          </a:bodyPr>
-          <a:lstStyle/>
-          <a:p>
-            <a:r>
-              <a:rPr lang="en-US" dirty="0" smtClean="0"/>
-              <a:t>Click “Post Hoc…”</a:t>
-            </a:r>
-          </a:p>
-          <a:p>
-            <a:r>
-              <a:rPr lang="en-US" dirty="0" smtClean="0"/>
-              <a:t>Note that only factors with 3 or more levels are shown in the post hoc window</a:t>
-            </a:r>
-          </a:p>
-          <a:p>
-            <a:r>
-              <a:rPr lang="en-US" dirty="0" smtClean="0"/>
-              <a:t>Select “</a:t>
-            </a:r>
-            <a:r>
-              <a:rPr lang="en-US" dirty="0" err="1" smtClean="0"/>
-              <a:t>breed_factor</a:t>
-            </a:r>
-            <a:r>
-              <a:rPr lang="en-US" dirty="0" smtClean="0"/>
-              <a:t>” and move it over to the “Post hoc tests for” field</a:t>
-            </a:r>
-          </a:p>
-          <a:p>
-            <a:r>
-              <a:rPr lang="en-US" dirty="0" smtClean="0"/>
-              <a:t>Select any tests you want, e.g. </a:t>
-            </a:r>
-            <a:r>
-              <a:rPr lang="en-US" dirty="0" err="1" smtClean="0"/>
-              <a:t>Bonferroni</a:t>
-            </a:r>
-            <a:r>
-              <a:rPr lang="en-US" dirty="0" smtClean="0"/>
-              <a:t> and </a:t>
-            </a:r>
-            <a:r>
-              <a:rPr lang="en-US" dirty="0" err="1" smtClean="0"/>
-              <a:t>Tukey</a:t>
-            </a:r>
-            <a:endParaRPr lang="en-US" dirty="0" smtClean="0"/>
-          </a:p>
-          <a:p>
-            <a:r>
-              <a:rPr lang="en-US" dirty="0" smtClean="0"/>
-              <a:t>Click “Continue”</a:t>
-            </a:r>
-            <a:endParaRPr lang="en-US" dirty="0"/>
-          </a:p>
-        </p:txBody>
-      </p:sp>
-      <p:pic>
-        <p:nvPicPr>
-          <p:cNvPr id="5" name="Content Placeholder 4"/>
-          <p:cNvPicPr>
-            <a:picLocks noGrp="1" noChangeAspect="1"/>
-          </p:cNvPicPr>
-          <p:nvPr>
-            <p:ph sz="half" idx="2"/>
-          </p:nvPr>
-        </p:nvPicPr>
-        <p:blipFill>
-          <a:blip r:embed="rId2"/>
-          <a:stretch>
-            <a:fillRect/>
-          </a:stretch>
-        </p:blipFill>
-        <p:spPr>
-          <a:xfrm>
-            <a:off x="6451047" y="1825625"/>
-            <a:ext cx="4623905" cy="4351338"/>
-          </a:xfrm>
-          <a:prstGeom prst="rect">
-            <a:avLst/>
-          </a:prstGeom>
-        </p:spPr>
-      </p:pic>
-    </p:spTree>
-    <p:extLst>
-      <p:ext uri="{BB962C8B-B14F-4D97-AF65-F5344CB8AC3E}">
-        <p14:creationId xmlns:p14="http://schemas.microsoft.com/office/powerpoint/2010/main" val="481779370"/>
-      </p:ext>
-    </p:extLst>
-  </p:cSld>
-  <p:clrMapOvr>
-    <a:masterClrMapping/>
-  </p:clrMapOvr>
-  <p:timing>
-    <p:tnLst>
-      <p:par>
-        <p:cTn id="1" dur="indefinite" restart="never" nodeType="tmRoot"/>
-      </p:par>
-    </p:tnLst>
-  </p:timing>
-</p:sld>
-</file>
-
-<file path=ppt/slides/slide21.xml><?xml version="1.0" encoding="utf-8"?>
-<p:sld xmlns:a="http://schemas.openxmlformats.org/drawingml/2006/main" xmlns:r="http://schemas.openxmlformats.org/officeDocument/2006/relationships" xmlns:p="http://schemas.openxmlformats.org/presentationml/2006/main">
-  <p:cSld>
-    <p:spTree>
-      <p:nvGrpSpPr>
-        <p:cNvPr id="1" name=""/>
-        <p:cNvGrpSpPr/>
-        <p:nvPr/>
-      </p:nvGrpSpPr>
-      <p:grpSpPr>
-        <a:xfrm>
-          <a:off x="0" y="0"/>
-          <a:ext cx="0" cy="0"/>
-          <a:chOff x="0" y="0"/>
-          <a:chExt cx="0" cy="0"/>
-        </a:xfrm>
-      </p:grpSpPr>
-      <p:sp>
-        <p:nvSpPr>
-          <p:cNvPr id="2" name="Title 1"/>
-          <p:cNvSpPr>
-            <a:spLocks noGrp="1"/>
-          </p:cNvSpPr>
-          <p:nvPr>
-            <p:ph type="title"/>
-          </p:nvPr>
-        </p:nvSpPr>
-        <p:spPr/>
-        <p:txBody>
-          <a:bodyPr/>
-          <a:lstStyle/>
-          <a:p>
-            <a:r>
-              <a:rPr lang="en-US" dirty="0" smtClean="0"/>
-              <a:t>Options</a:t>
-            </a:r>
-            <a:endParaRPr lang="en-US" dirty="0"/>
-          </a:p>
-        </p:txBody>
-      </p:sp>
-      <p:sp>
-        <p:nvSpPr>
-          <p:cNvPr id="3" name="Content Placeholder 2"/>
-          <p:cNvSpPr>
-            <a:spLocks noGrp="1"/>
-          </p:cNvSpPr>
-          <p:nvPr>
-            <p:ph sz="half" idx="1"/>
-          </p:nvPr>
-        </p:nvSpPr>
-        <p:spPr/>
-        <p:txBody>
-          <a:bodyPr>
-            <a:normAutofit lnSpcReduction="10000"/>
-          </a:bodyPr>
-          <a:lstStyle/>
-          <a:p>
-            <a:r>
-              <a:rPr lang="en-US" dirty="0" smtClean="0"/>
-              <a:t>Click “Options…”</a:t>
-            </a:r>
-          </a:p>
-          <a:p>
-            <a:r>
-              <a:rPr lang="en-US" dirty="0" smtClean="0"/>
-              <a:t>Get marginal means for all main effects and the three way interaction (the two-way interactions are less interesting)</a:t>
-            </a:r>
-          </a:p>
-          <a:p>
-            <a:r>
-              <a:rPr lang="en-US" dirty="0" smtClean="0"/>
-              <a:t>Get descriptive statistics and estimates of effect size</a:t>
-            </a:r>
-          </a:p>
-          <a:p>
-            <a:r>
-              <a:rPr lang="en-US" dirty="0" smtClean="0"/>
-              <a:t>Get homogeneity tests</a:t>
-            </a:r>
-          </a:p>
-          <a:p>
-            <a:r>
-              <a:rPr lang="en-US" dirty="0" smtClean="0"/>
-              <a:t>Click “Continue”</a:t>
-            </a:r>
-          </a:p>
-          <a:p>
-            <a:r>
-              <a:rPr lang="en-US" dirty="0" smtClean="0"/>
-              <a:t>Click “OK” to run the analysis.</a:t>
-            </a:r>
-            <a:endParaRPr lang="en-US" dirty="0"/>
-          </a:p>
-        </p:txBody>
-      </p:sp>
-      <p:pic>
-        <p:nvPicPr>
-          <p:cNvPr id="6" name="Content Placeholder 5"/>
-          <p:cNvPicPr>
-            <a:picLocks noGrp="1" noChangeAspect="1"/>
-          </p:cNvPicPr>
-          <p:nvPr>
-            <p:ph sz="half" idx="2"/>
-          </p:nvPr>
-        </p:nvPicPr>
-        <p:blipFill>
-          <a:blip r:embed="rId2"/>
-          <a:stretch>
-            <a:fillRect/>
-          </a:stretch>
-        </p:blipFill>
-        <p:spPr>
-          <a:xfrm>
-            <a:off x="6750399" y="1825625"/>
-            <a:ext cx="4025202" cy="4351338"/>
-          </a:xfrm>
-          <a:prstGeom prst="rect">
-            <a:avLst/>
-          </a:prstGeom>
-        </p:spPr>
-      </p:pic>
-    </p:spTree>
-    <p:extLst>
-      <p:ext uri="{BB962C8B-B14F-4D97-AF65-F5344CB8AC3E}">
-        <p14:creationId xmlns:p14="http://schemas.microsoft.com/office/powerpoint/2010/main" val="612478154"/>
-      </p:ext>
-    </p:extLst>
-  </p:cSld>
-  <p:clrMapOvr>
-    <a:masterClrMapping/>
-  </p:clrMapOvr>
-  <p:timing>
-    <p:tnLst>
-      <p:par>
-        <p:cTn id="1" dur="indefinite" restart="never" nodeType="tmRoot"/>
-      </p:par>
-    </p:tnLst>
-  </p:timing>
-</p:sld>
-</file>
-
-<file path=ppt/slides/slide22.xml><?xml version="1.0" encoding="utf-8"?>
-<p:sld xmlns:a="http://schemas.openxmlformats.org/drawingml/2006/main" xmlns:r="http://schemas.openxmlformats.org/officeDocument/2006/relationships" xmlns:p="http://schemas.openxmlformats.org/presentationml/2006/main">
-  <p:cSld>
-    <p:spTree>
-      <p:nvGrpSpPr>
-        <p:cNvPr id="1" name=""/>
-        <p:cNvGrpSpPr/>
-        <p:nvPr/>
-      </p:nvGrpSpPr>
-      <p:grpSpPr>
-        <a:xfrm>
-          <a:off x="0" y="0"/>
-          <a:ext cx="0" cy="0"/>
-          <a:chOff x="0" y="0"/>
-          <a:chExt cx="0" cy="0"/>
-        </a:xfrm>
-      </p:grpSpPr>
-      <p:sp>
-        <p:nvSpPr>
-          <p:cNvPr id="2" name="Title 1"/>
-          <p:cNvSpPr>
-            <a:spLocks noGrp="1"/>
-          </p:cNvSpPr>
-          <p:nvPr>
-            <p:ph type="title"/>
-          </p:nvPr>
-        </p:nvSpPr>
-        <p:spPr/>
-        <p:txBody>
-          <a:bodyPr/>
-          <a:lstStyle/>
-          <a:p>
-            <a:r>
-              <a:rPr lang="en-US" dirty="0" smtClean="0"/>
               <a:t>Output</a:t>
             </a:r>
             <a:endParaRPr lang="en-US" dirty="0"/>
@@ -4848,7 +4601,7 @@
 </p:sld>
 </file>
 
-<file path=ppt/slides/slide23.xml><?xml version="1.0" encoding="utf-8"?>
+<file path=ppt/slides/slide21.xml><?xml version="1.0" encoding="utf-8"?>
 <p:sld xmlns:a="http://schemas.openxmlformats.org/drawingml/2006/main" xmlns:r="http://schemas.openxmlformats.org/officeDocument/2006/relationships" xmlns:p="http://schemas.openxmlformats.org/presentationml/2006/main">
   <p:cSld>
     <p:spTree>
@@ -4983,7 +4736,7 @@
 </p:sld>
 </file>
 
-<file path=ppt/slides/slide24.xml><?xml version="1.0" encoding="utf-8"?>
+<file path=ppt/slides/slide22.xml><?xml version="1.0" encoding="utf-8"?>
 <p:sld xmlns:a="http://schemas.openxmlformats.org/drawingml/2006/main" xmlns:r="http://schemas.openxmlformats.org/officeDocument/2006/relationships" xmlns:p="http://schemas.openxmlformats.org/presentationml/2006/main">
   <p:cSld>
     <p:spTree>
@@ -5091,7 +4844,7 @@
 </p:sld>
 </file>
 
-<file path=ppt/slides/slide25.xml><?xml version="1.0" encoding="utf-8"?>
+<file path=ppt/slides/slide23.xml><?xml version="1.0" encoding="utf-8"?>
 <p:sld xmlns:a="http://schemas.openxmlformats.org/drawingml/2006/main" xmlns:r="http://schemas.openxmlformats.org/officeDocument/2006/relationships" xmlns:p="http://schemas.openxmlformats.org/presentationml/2006/main">
   <p:cSld>
     <p:spTree>
@@ -5217,7 +4970,7 @@
 </p:sld>
 </file>
 
-<file path=ppt/slides/slide26.xml><?xml version="1.0" encoding="utf-8"?>
+<file path=ppt/slides/slide24.xml><?xml version="1.0" encoding="utf-8"?>
 <p:sld xmlns:a="http://schemas.openxmlformats.org/drawingml/2006/main" xmlns:r="http://schemas.openxmlformats.org/officeDocument/2006/relationships" xmlns:p="http://schemas.openxmlformats.org/presentationml/2006/main">
   <p:cSld>
     <p:spTree>
@@ -5345,7 +5098,7 @@
 </p:sld>
 </file>
 
-<file path=ppt/slides/slide27.xml><?xml version="1.0" encoding="utf-8"?>
+<file path=ppt/slides/slide25.xml><?xml version="1.0" encoding="utf-8"?>
 <p:sld xmlns:a="http://schemas.openxmlformats.org/drawingml/2006/main" xmlns:r="http://schemas.openxmlformats.org/officeDocument/2006/relationships" xmlns:p="http://schemas.openxmlformats.org/presentationml/2006/main">
   <p:cSld>
     <p:spTree>
@@ -5501,7 +5254,7 @@
 </p:sld>
 </file>
 
-<file path=ppt/slides/slide28.xml><?xml version="1.0" encoding="utf-8"?>
+<file path=ppt/slides/slide26.xml><?xml version="1.0" encoding="utf-8"?>
 <p:sld xmlns:a="http://schemas.openxmlformats.org/drawingml/2006/main" xmlns:r="http://schemas.openxmlformats.org/officeDocument/2006/relationships" xmlns:p="http://schemas.openxmlformats.org/presentationml/2006/main">
   <p:cSld>
     <p:spTree>
@@ -5611,7 +5364,7 @@
           <a:graphicData uri="http://schemas.openxmlformats.org/presentationml/2006/ole">
             <mc:AlternateContent xmlns:mc="http://schemas.openxmlformats.org/markup-compatibility/2006">
               <mc:Choice xmlns:v="urn:schemas-microsoft-com:vml" Requires="v">
-                <p:oleObj spid="_x0000_s3086" r:id="rId3" imgW="27098280" imgH="15263280" progId="">
+                <p:oleObj spid="_x0000_s3089" r:id="rId3" imgW="27098280" imgH="15263280" progId="">
                   <p:embed/>
                 </p:oleObj>
               </mc:Choice>
@@ -5666,7 +5419,7 @@
 </p:sld>
 </file>
 
-<file path=ppt/slides/slide29.xml><?xml version="1.0" encoding="utf-8"?>
+<file path=ppt/slides/slide27.xml><?xml version="1.0" encoding="utf-8"?>
 <p:sld xmlns:a="http://schemas.openxmlformats.org/drawingml/2006/main" xmlns:r="http://schemas.openxmlformats.org/officeDocument/2006/relationships" xmlns:p="http://schemas.openxmlformats.org/presentationml/2006/main">
   <p:cSld>
     <p:spTree>
@@ -5779,6 +5532,264 @@
     <p:extLst>
       <p:ext uri="{BB962C8B-B14F-4D97-AF65-F5344CB8AC3E}">
         <p14:creationId xmlns:p14="http://schemas.microsoft.com/office/powerpoint/2010/main" val="1362976887"/>
+      </p:ext>
+    </p:extLst>
+  </p:cSld>
+  <p:clrMapOvr>
+    <a:masterClrMapping/>
+  </p:clrMapOvr>
+  <p:timing>
+    <p:tnLst>
+      <p:par>
+        <p:cTn id="1" dur="indefinite" restart="never" nodeType="tmRoot"/>
+      </p:par>
+    </p:tnLst>
+  </p:timing>
+</p:sld>
+</file>
+
+<file path=ppt/slides/slide28.xml><?xml version="1.0" encoding="utf-8"?>
+<p:sld xmlns:a="http://schemas.openxmlformats.org/drawingml/2006/main" xmlns:r="http://schemas.openxmlformats.org/officeDocument/2006/relationships" xmlns:p="http://schemas.openxmlformats.org/presentationml/2006/main">
+  <p:cSld>
+    <p:spTree>
+      <p:nvGrpSpPr>
+        <p:cNvPr id="1" name=""/>
+        <p:cNvGrpSpPr/>
+        <p:nvPr/>
+      </p:nvGrpSpPr>
+      <p:grpSpPr>
+        <a:xfrm>
+          <a:off x="0" y="0"/>
+          <a:ext cx="0" cy="0"/>
+          <a:chOff x="0" y="0"/>
+          <a:chExt cx="0" cy="0"/>
+        </a:xfrm>
+      </p:grpSpPr>
+      <p:sp>
+        <p:nvSpPr>
+          <p:cNvPr id="2" name="Title 1"/>
+          <p:cNvSpPr>
+            <a:spLocks noGrp="1"/>
+          </p:cNvSpPr>
+          <p:nvPr>
+            <p:ph type="title"/>
+          </p:nvPr>
+        </p:nvSpPr>
+        <p:spPr/>
+        <p:txBody>
+          <a:bodyPr/>
+          <a:lstStyle/>
+          <a:p>
+            <a:r>
+              <a:rPr lang="en-US" dirty="0" smtClean="0"/>
+              <a:t>Add error bars</a:t>
+            </a:r>
+            <a:endParaRPr lang="en-US" dirty="0"/>
+          </a:p>
+        </p:txBody>
+      </p:sp>
+      <p:sp>
+        <p:nvSpPr>
+          <p:cNvPr id="3" name="Content Placeholder 2"/>
+          <p:cNvSpPr>
+            <a:spLocks noGrp="1"/>
+          </p:cNvSpPr>
+          <p:nvPr>
+            <p:ph sz="half" idx="1"/>
+          </p:nvPr>
+        </p:nvSpPr>
+        <p:spPr/>
+        <p:txBody>
+          <a:bodyPr/>
+          <a:lstStyle/>
+          <a:p>
+            <a:r>
+              <a:rPr lang="en-US" dirty="0" smtClean="0"/>
+              <a:t>Click “Options…”</a:t>
+            </a:r>
+          </a:p>
+          <a:p>
+            <a:r>
+              <a:rPr lang="en-US" dirty="0" smtClean="0"/>
+              <a:t>Check “Display error bars”</a:t>
+            </a:r>
+          </a:p>
+          <a:p>
+            <a:r>
+              <a:rPr lang="en-US" dirty="0" smtClean="0"/>
+              <a:t>The default setting (95% CI) is what we want.</a:t>
+            </a:r>
+          </a:p>
+          <a:p>
+            <a:r>
+              <a:rPr lang="en-US" dirty="0" smtClean="0"/>
+              <a:t>Click “Continue”</a:t>
+            </a:r>
+          </a:p>
+          <a:p>
+            <a:pPr marL="0" indent="0">
+              <a:buNone/>
+            </a:pPr>
+            <a:endParaRPr lang="en-US" dirty="0"/>
+          </a:p>
+        </p:txBody>
+      </p:sp>
+      <p:pic>
+        <p:nvPicPr>
+          <p:cNvPr id="6" name="Content Placeholder 5"/>
+          <p:cNvPicPr>
+            <a:picLocks noGrp="1" noChangeAspect="1"/>
+          </p:cNvPicPr>
+          <p:nvPr>
+            <p:ph sz="half" idx="2"/>
+          </p:nvPr>
+        </p:nvPicPr>
+        <p:blipFill>
+          <a:blip r:embed="rId2"/>
+          <a:stretch>
+            <a:fillRect/>
+          </a:stretch>
+        </p:blipFill>
+        <p:spPr>
+          <a:xfrm>
+            <a:off x="7309324" y="1825625"/>
+            <a:ext cx="2907352" cy="4351338"/>
+          </a:xfrm>
+          <a:prstGeom prst="rect">
+            <a:avLst/>
+          </a:prstGeom>
+        </p:spPr>
+      </p:pic>
+    </p:spTree>
+    <p:extLst>
+      <p:ext uri="{BB962C8B-B14F-4D97-AF65-F5344CB8AC3E}">
+        <p14:creationId xmlns:p14="http://schemas.microsoft.com/office/powerpoint/2010/main" val="4259224393"/>
+      </p:ext>
+    </p:extLst>
+  </p:cSld>
+  <p:clrMapOvr>
+    <a:masterClrMapping/>
+  </p:clrMapOvr>
+  <p:timing>
+    <p:tnLst>
+      <p:par>
+        <p:cTn id="1" dur="indefinite" restart="never" nodeType="tmRoot"/>
+      </p:par>
+    </p:tnLst>
+  </p:timing>
+</p:sld>
+</file>
+
+<file path=ppt/slides/slide29.xml><?xml version="1.0" encoding="utf-8"?>
+<p:sld xmlns:a="http://schemas.openxmlformats.org/drawingml/2006/main" xmlns:r="http://schemas.openxmlformats.org/officeDocument/2006/relationships" xmlns:p="http://schemas.openxmlformats.org/presentationml/2006/main">
+  <p:cSld>
+    <p:spTree>
+      <p:nvGrpSpPr>
+        <p:cNvPr id="1" name=""/>
+        <p:cNvGrpSpPr/>
+        <p:nvPr/>
+      </p:nvGrpSpPr>
+      <p:grpSpPr>
+        <a:xfrm>
+          <a:off x="0" y="0"/>
+          <a:ext cx="0" cy="0"/>
+          <a:chOff x="0" y="0"/>
+          <a:chExt cx="0" cy="0"/>
+        </a:xfrm>
+      </p:grpSpPr>
+      <p:sp>
+        <p:nvSpPr>
+          <p:cNvPr id="2" name="Title 1"/>
+          <p:cNvSpPr>
+            <a:spLocks noGrp="1"/>
+          </p:cNvSpPr>
+          <p:nvPr>
+            <p:ph type="title"/>
+          </p:nvPr>
+        </p:nvSpPr>
+        <p:spPr/>
+        <p:txBody>
+          <a:bodyPr/>
+          <a:lstStyle/>
+          <a:p>
+            <a:r>
+              <a:rPr lang="en-US" dirty="0" smtClean="0"/>
+              <a:t>Final touches</a:t>
+            </a:r>
+            <a:endParaRPr lang="en-US" dirty="0"/>
+          </a:p>
+        </p:txBody>
+      </p:sp>
+      <p:sp>
+        <p:nvSpPr>
+          <p:cNvPr id="3" name="Content Placeholder 2"/>
+          <p:cNvSpPr>
+            <a:spLocks noGrp="1"/>
+          </p:cNvSpPr>
+          <p:nvPr>
+            <p:ph sz="half" idx="1"/>
+          </p:nvPr>
+        </p:nvSpPr>
+        <p:spPr/>
+        <p:txBody>
+          <a:bodyPr/>
+          <a:lstStyle/>
+          <a:p>
+            <a:r>
+              <a:rPr lang="en-US" dirty="0" smtClean="0"/>
+              <a:t>Double-click the resulting graph to open it in the chart editor</a:t>
+            </a:r>
+          </a:p>
+          <a:p>
+            <a:r>
+              <a:rPr lang="en-US" dirty="0" smtClean="0"/>
+              <a:t>Double-click axis and legend labels to edit them and make them look nice</a:t>
+            </a:r>
+          </a:p>
+          <a:p>
+            <a:r>
+              <a:rPr lang="en-US" dirty="0" smtClean="0"/>
+              <a:t>There we go!</a:t>
+            </a:r>
+          </a:p>
+          <a:p>
+            <a:pPr marL="0" indent="0">
+              <a:buNone/>
+            </a:pPr>
+            <a:endParaRPr lang="en-US" dirty="0"/>
+          </a:p>
+        </p:txBody>
+      </p:sp>
+      <p:pic>
+        <p:nvPicPr>
+          <p:cNvPr id="5" name="Content Placeholder 4"/>
+          <p:cNvPicPr>
+            <a:picLocks noGrp="1" noChangeAspect="1"/>
+          </p:cNvPicPr>
+          <p:nvPr>
+            <p:ph sz="half" idx="2"/>
+          </p:nvPr>
+        </p:nvPicPr>
+        <p:blipFill>
+          <a:blip r:embed="rId2"/>
+          <a:stretch>
+            <a:fillRect/>
+          </a:stretch>
+        </p:blipFill>
+        <p:spPr>
+          <a:xfrm>
+            <a:off x="6172200" y="1925359"/>
+            <a:ext cx="5181600" cy="4151870"/>
+          </a:xfrm>
+          <a:prstGeom prst="rect">
+            <a:avLst/>
+          </a:prstGeom>
+        </p:spPr>
+      </p:pic>
+    </p:spTree>
+    <p:extLst>
+      <p:ext uri="{BB962C8B-B14F-4D97-AF65-F5344CB8AC3E}">
+        <p14:creationId xmlns:p14="http://schemas.microsoft.com/office/powerpoint/2010/main" val="3881427018"/>
       </p:ext>
     </p:extLst>
   </p:cSld>
@@ -5936,264 +5947,6 @@
           <a:p>
             <a:r>
               <a:rPr lang="en-US" dirty="0" smtClean="0"/>
-              <a:t>Add error bars</a:t>
-            </a:r>
-            <a:endParaRPr lang="en-US" dirty="0"/>
-          </a:p>
-        </p:txBody>
-      </p:sp>
-      <p:sp>
-        <p:nvSpPr>
-          <p:cNvPr id="3" name="Content Placeholder 2"/>
-          <p:cNvSpPr>
-            <a:spLocks noGrp="1"/>
-          </p:cNvSpPr>
-          <p:nvPr>
-            <p:ph sz="half" idx="1"/>
-          </p:nvPr>
-        </p:nvSpPr>
-        <p:spPr/>
-        <p:txBody>
-          <a:bodyPr/>
-          <a:lstStyle/>
-          <a:p>
-            <a:r>
-              <a:rPr lang="en-US" dirty="0" smtClean="0"/>
-              <a:t>Click “Options…”</a:t>
-            </a:r>
-          </a:p>
-          <a:p>
-            <a:r>
-              <a:rPr lang="en-US" dirty="0" smtClean="0"/>
-              <a:t>Check “Display error bars”</a:t>
-            </a:r>
-          </a:p>
-          <a:p>
-            <a:r>
-              <a:rPr lang="en-US" dirty="0" smtClean="0"/>
-              <a:t>The default setting (95% CI) is what we want.</a:t>
-            </a:r>
-          </a:p>
-          <a:p>
-            <a:r>
-              <a:rPr lang="en-US" dirty="0" smtClean="0"/>
-              <a:t>Click “Continue”</a:t>
-            </a:r>
-          </a:p>
-          <a:p>
-            <a:pPr marL="0" indent="0">
-              <a:buNone/>
-            </a:pPr>
-            <a:endParaRPr lang="en-US" dirty="0"/>
-          </a:p>
-        </p:txBody>
-      </p:sp>
-      <p:pic>
-        <p:nvPicPr>
-          <p:cNvPr id="6" name="Content Placeholder 5"/>
-          <p:cNvPicPr>
-            <a:picLocks noGrp="1" noChangeAspect="1"/>
-          </p:cNvPicPr>
-          <p:nvPr>
-            <p:ph sz="half" idx="2"/>
-          </p:nvPr>
-        </p:nvPicPr>
-        <p:blipFill>
-          <a:blip r:embed="rId2"/>
-          <a:stretch>
-            <a:fillRect/>
-          </a:stretch>
-        </p:blipFill>
-        <p:spPr>
-          <a:xfrm>
-            <a:off x="7309324" y="1825625"/>
-            <a:ext cx="2907352" cy="4351338"/>
-          </a:xfrm>
-          <a:prstGeom prst="rect">
-            <a:avLst/>
-          </a:prstGeom>
-        </p:spPr>
-      </p:pic>
-    </p:spTree>
-    <p:extLst>
-      <p:ext uri="{BB962C8B-B14F-4D97-AF65-F5344CB8AC3E}">
-        <p14:creationId xmlns:p14="http://schemas.microsoft.com/office/powerpoint/2010/main" val="4259224393"/>
-      </p:ext>
-    </p:extLst>
-  </p:cSld>
-  <p:clrMapOvr>
-    <a:masterClrMapping/>
-  </p:clrMapOvr>
-  <p:timing>
-    <p:tnLst>
-      <p:par>
-        <p:cTn id="1" dur="indefinite" restart="never" nodeType="tmRoot"/>
-      </p:par>
-    </p:tnLst>
-  </p:timing>
-</p:sld>
-</file>
-
-<file path=ppt/slides/slide31.xml><?xml version="1.0" encoding="utf-8"?>
-<p:sld xmlns:a="http://schemas.openxmlformats.org/drawingml/2006/main" xmlns:r="http://schemas.openxmlformats.org/officeDocument/2006/relationships" xmlns:p="http://schemas.openxmlformats.org/presentationml/2006/main">
-  <p:cSld>
-    <p:spTree>
-      <p:nvGrpSpPr>
-        <p:cNvPr id="1" name=""/>
-        <p:cNvGrpSpPr/>
-        <p:nvPr/>
-      </p:nvGrpSpPr>
-      <p:grpSpPr>
-        <a:xfrm>
-          <a:off x="0" y="0"/>
-          <a:ext cx="0" cy="0"/>
-          <a:chOff x="0" y="0"/>
-          <a:chExt cx="0" cy="0"/>
-        </a:xfrm>
-      </p:grpSpPr>
-      <p:sp>
-        <p:nvSpPr>
-          <p:cNvPr id="2" name="Title 1"/>
-          <p:cNvSpPr>
-            <a:spLocks noGrp="1"/>
-          </p:cNvSpPr>
-          <p:nvPr>
-            <p:ph type="title"/>
-          </p:nvPr>
-        </p:nvSpPr>
-        <p:spPr/>
-        <p:txBody>
-          <a:bodyPr/>
-          <a:lstStyle/>
-          <a:p>
-            <a:r>
-              <a:rPr lang="en-US" dirty="0" smtClean="0"/>
-              <a:t>Final touches</a:t>
-            </a:r>
-            <a:endParaRPr lang="en-US" dirty="0"/>
-          </a:p>
-        </p:txBody>
-      </p:sp>
-      <p:sp>
-        <p:nvSpPr>
-          <p:cNvPr id="3" name="Content Placeholder 2"/>
-          <p:cNvSpPr>
-            <a:spLocks noGrp="1"/>
-          </p:cNvSpPr>
-          <p:nvPr>
-            <p:ph sz="half" idx="1"/>
-          </p:nvPr>
-        </p:nvSpPr>
-        <p:spPr/>
-        <p:txBody>
-          <a:bodyPr/>
-          <a:lstStyle/>
-          <a:p>
-            <a:r>
-              <a:rPr lang="en-US" dirty="0" smtClean="0"/>
-              <a:t>Double-click the resulting graph to open it in the chart editor</a:t>
-            </a:r>
-          </a:p>
-          <a:p>
-            <a:r>
-              <a:rPr lang="en-US" dirty="0" smtClean="0"/>
-              <a:t>Double-click axis and legend labels to edit them and make them look nice</a:t>
-            </a:r>
-          </a:p>
-          <a:p>
-            <a:r>
-              <a:rPr lang="en-US" dirty="0" smtClean="0"/>
-              <a:t>There we go!</a:t>
-            </a:r>
-          </a:p>
-          <a:p>
-            <a:pPr marL="0" indent="0">
-              <a:buNone/>
-            </a:pPr>
-            <a:endParaRPr lang="en-US" dirty="0"/>
-          </a:p>
-        </p:txBody>
-      </p:sp>
-      <p:pic>
-        <p:nvPicPr>
-          <p:cNvPr id="5" name="Content Placeholder 4"/>
-          <p:cNvPicPr>
-            <a:picLocks noGrp="1" noChangeAspect="1"/>
-          </p:cNvPicPr>
-          <p:nvPr>
-            <p:ph sz="half" idx="2"/>
-          </p:nvPr>
-        </p:nvPicPr>
-        <p:blipFill>
-          <a:blip r:embed="rId2"/>
-          <a:stretch>
-            <a:fillRect/>
-          </a:stretch>
-        </p:blipFill>
-        <p:spPr>
-          <a:xfrm>
-            <a:off x="6172200" y="1925359"/>
-            <a:ext cx="5181600" cy="4151870"/>
-          </a:xfrm>
-          <a:prstGeom prst="rect">
-            <a:avLst/>
-          </a:prstGeom>
-        </p:spPr>
-      </p:pic>
-    </p:spTree>
-    <p:extLst>
-      <p:ext uri="{BB962C8B-B14F-4D97-AF65-F5344CB8AC3E}">
-        <p14:creationId xmlns:p14="http://schemas.microsoft.com/office/powerpoint/2010/main" val="3881427018"/>
-      </p:ext>
-    </p:extLst>
-  </p:cSld>
-  <p:clrMapOvr>
-    <a:masterClrMapping/>
-  </p:clrMapOvr>
-  <p:timing>
-    <p:tnLst>
-      <p:par>
-        <p:cTn id="1" dur="indefinite" restart="never" nodeType="tmRoot"/>
-      </p:par>
-    </p:tnLst>
-  </p:timing>
-</p:sld>
-</file>
-
-<file path=ppt/slides/slide32.xml><?xml version="1.0" encoding="utf-8"?>
-<p:sld xmlns:a="http://schemas.openxmlformats.org/drawingml/2006/main" xmlns:r="http://schemas.openxmlformats.org/officeDocument/2006/relationships" xmlns:p="http://schemas.openxmlformats.org/presentationml/2006/main">
-  <p:cSld>
-    <p:spTree>
-      <p:nvGrpSpPr>
-        <p:cNvPr id="1" name=""/>
-        <p:cNvGrpSpPr/>
-        <p:nvPr/>
-      </p:nvGrpSpPr>
-      <p:grpSpPr>
-        <a:xfrm>
-          <a:off x="0" y="0"/>
-          <a:ext cx="0" cy="0"/>
-          <a:chOff x="0" y="0"/>
-          <a:chExt cx="0" cy="0"/>
-        </a:xfrm>
-      </p:grpSpPr>
-      <p:sp>
-        <p:nvSpPr>
-          <p:cNvPr id="2" name="Title 1"/>
-          <p:cNvSpPr>
-            <a:spLocks noGrp="1"/>
-          </p:cNvSpPr>
-          <p:nvPr>
-            <p:ph type="title"/>
-          </p:nvPr>
-        </p:nvSpPr>
-        <p:spPr/>
-        <p:txBody>
-          <a:bodyPr/>
-          <a:lstStyle/>
-          <a:p>
-            <a:r>
-              <a:rPr lang="en-US" dirty="0" smtClean="0"/>
               <a:t>The hypothesis tests</a:t>
             </a:r>
             <a:endParaRPr lang="en-US" dirty="0"/>
@@ -6349,7 +6102,7 @@
 </p:sld>
 </file>
 
-<file path=ppt/slides/slide33.xml><?xml version="1.0" encoding="utf-8"?>
+<file path=ppt/slides/slide31.xml><?xml version="1.0" encoding="utf-8"?>
 <p:sld xmlns:a="http://schemas.openxmlformats.org/drawingml/2006/main" xmlns:r="http://schemas.openxmlformats.org/officeDocument/2006/relationships" xmlns:p="http://schemas.openxmlformats.org/presentationml/2006/main">
   <p:cSld>
     <p:spTree>
@@ -6487,7 +6240,7 @@
 </p:sld>
 </file>
 
-<file path=ppt/slides/slide34.xml><?xml version="1.0" encoding="utf-8"?>
+<file path=ppt/slides/slide32.xml><?xml version="1.0" encoding="utf-8"?>
 <p:sld xmlns:a="http://schemas.openxmlformats.org/drawingml/2006/main" xmlns:r="http://schemas.openxmlformats.org/officeDocument/2006/relationships" xmlns:p="http://schemas.openxmlformats.org/presentationml/2006/main">
   <p:cSld>
     <p:spTree>
@@ -6638,12 +6391,16 @@
                     <m:sSubSup>
                       <m:sSubSupPr>
                         <m:ctrlPr>
-                          <a:rPr lang="en-US" i="1"/>
+                          <a:rPr lang="en-US" i="1">
+                            <a:latin typeface="Cambria Math"/>
+                          </a:rPr>
                         </m:ctrlPr>
                       </m:sSubSupPr>
                       <m:e>
                         <m:r>
-                          <a:rPr lang="en-US" i="1"/>
+                          <a:rPr lang="en-US" i="1">
+                            <a:latin typeface="Cambria Math"/>
+                          </a:rPr>
                           <m:t>𝜂</m:t>
                         </m:r>
                       </m:e>
@@ -6657,7 +6414,9 @@
                       </m:sub>
                       <m:sup>
                         <m:r>
-                          <a:rPr lang="en-US" i="1"/>
+                          <a:rPr lang="en-US" i="1">
+                            <a:latin typeface="Cambria Math"/>
+                          </a:rPr>
                           <m:t>2</m:t>
                         </m:r>
                       </m:sup>
@@ -6666,7 +6425,11 @@
                 </a14:m>
                 <a:r>
                   <a:rPr lang="en-US" dirty="0"/>
-                  <a:t> = 0.01, </a:t>
+                  <a:t> = </a:t>
+                </a:r>
+                <a:r>
+                  <a:rPr lang="en-US" dirty="0" smtClean="0"/>
+                  <a:t>0.19, </a:t>
                 </a:r>
                 <a:r>
                   <a:rPr lang="en-US" i="1" dirty="0"/>
@@ -6702,10 +6465,10 @@
               </p:nvPr>
             </p:nvSpPr>
             <p:spPr>
-              <a:blipFill rotWithShape="0">
+              <a:blipFill rotWithShape="1">
                 <a:blip r:embed="rId2"/>
                 <a:stretch>
-                  <a:fillRect l="-1882" t="-3501" r="-471"/>
+                  <a:fillRect l="-1882" t="-3501" r="-588"/>
                 </a:stretch>
               </a:blipFill>
             </p:spPr>
@@ -6714,290 +6477,7 @@
               <a:lstStyle/>
               <a:p>
                 <a:r>
-                  <a:rPr lang="en-US">
-                    <a:noFill/>
-                  </a:rPr>
-                  <a:t> </a:t>
-                </a:r>
-              </a:p>
-            </p:txBody>
-          </p:sp>
-        </mc:Fallback>
-      </mc:AlternateContent>
-      <p:pic>
-        <p:nvPicPr>
-          <p:cNvPr id="6" name="Content Placeholder 5"/>
-          <p:cNvPicPr>
-            <a:picLocks noGrp="1" noChangeAspect="1"/>
-          </p:cNvPicPr>
-          <p:nvPr>
-            <p:ph sz="half" idx="2"/>
-          </p:nvPr>
-        </p:nvPicPr>
-        <p:blipFill>
-          <a:blip r:embed="rId3"/>
-          <a:stretch>
-            <a:fillRect/>
-          </a:stretch>
-        </p:blipFill>
-        <p:spPr>
-          <a:xfrm>
-            <a:off x="6172200" y="3077889"/>
-            <a:ext cx="5181600" cy="1846809"/>
-          </a:xfrm>
-          <a:prstGeom prst="rect">
-            <a:avLst/>
-          </a:prstGeom>
-        </p:spPr>
-      </p:pic>
-    </p:spTree>
-    <p:extLst>
-      <p:ext uri="{BB962C8B-B14F-4D97-AF65-F5344CB8AC3E}">
-        <p14:creationId xmlns:p14="http://schemas.microsoft.com/office/powerpoint/2010/main" val="1140283491"/>
-      </p:ext>
-    </p:extLst>
-  </p:cSld>
-  <p:clrMapOvr>
-    <a:masterClrMapping/>
-  </p:clrMapOvr>
-  <p:timing>
-    <p:tnLst>
-      <p:par>
-        <p:cTn id="1" dur="indefinite" restart="never" nodeType="tmRoot"/>
-      </p:par>
-    </p:tnLst>
-  </p:timing>
-</p:sld>
-</file>
-
-<file path=ppt/slides/slide35.xml><?xml version="1.0" encoding="utf-8"?>
-<p:sld xmlns:a="http://schemas.openxmlformats.org/drawingml/2006/main" xmlns:r="http://schemas.openxmlformats.org/officeDocument/2006/relationships" xmlns:p="http://schemas.openxmlformats.org/presentationml/2006/main">
-  <p:cSld>
-    <p:spTree>
-      <p:nvGrpSpPr>
-        <p:cNvPr id="1" name=""/>
-        <p:cNvGrpSpPr/>
-        <p:nvPr/>
-      </p:nvGrpSpPr>
-      <p:grpSpPr>
-        <a:xfrm>
-          <a:off x="0" y="0"/>
-          <a:ext cx="0" cy="0"/>
-          <a:chOff x="0" y="0"/>
-          <a:chExt cx="0" cy="0"/>
-        </a:xfrm>
-      </p:grpSpPr>
-      <p:sp>
-        <p:nvSpPr>
-          <p:cNvPr id="2" name="Title 1"/>
-          <p:cNvSpPr>
-            <a:spLocks noGrp="1"/>
-          </p:cNvSpPr>
-          <p:nvPr>
-            <p:ph type="title"/>
-          </p:nvPr>
-        </p:nvSpPr>
-        <p:spPr/>
-        <p:txBody>
-          <a:bodyPr/>
-          <a:lstStyle/>
-          <a:p>
-            <a:r>
-              <a:rPr lang="en-US" dirty="0" smtClean="0"/>
-              <a:t>The hypothesis tests</a:t>
-            </a:r>
-            <a:endParaRPr lang="en-US" dirty="0"/>
-          </a:p>
-        </p:txBody>
-      </p:sp>
-      <mc:AlternateContent xmlns:mc="http://schemas.openxmlformats.org/markup-compatibility/2006">
-        <mc:Choice xmlns:a14="http://schemas.microsoft.com/office/drawing/2010/main" Requires="a14">
-          <p:sp>
-            <p:nvSpPr>
-              <p:cNvPr id="3" name="Content Placeholder 2"/>
-              <p:cNvSpPr>
-                <a:spLocks noGrp="1"/>
-              </p:cNvSpPr>
-              <p:nvPr>
-                <p:ph sz="half" idx="1"/>
-              </p:nvPr>
-            </p:nvSpPr>
-            <p:spPr/>
-            <p:txBody>
-              <a:bodyPr>
-                <a:normAutofit fontScale="92500" lnSpcReduction="20000"/>
-              </a:bodyPr>
-              <a:lstStyle/>
-              <a:p>
-                <a:r>
-                  <a:rPr lang="en-US" dirty="0" smtClean="0"/>
-                  <a:t>Note down:</a:t>
-                </a:r>
-              </a:p>
-              <a:p>
-                <a:pPr lvl="1"/>
-                <a:r>
-                  <a:rPr lang="en-US" dirty="0" err="1" smtClean="0"/>
-                  <a:t>df</a:t>
-                </a:r>
-                <a:r>
-                  <a:rPr lang="en-US" dirty="0" smtClean="0"/>
-                  <a:t> numerator (</a:t>
-                </a:r>
-                <a:r>
-                  <a:rPr lang="en-US" dirty="0" err="1" smtClean="0"/>
-                  <a:t>df</a:t>
-                </a:r>
-                <a:r>
-                  <a:rPr lang="en-US" dirty="0" smtClean="0"/>
-                  <a:t> effect)</a:t>
-                </a:r>
-              </a:p>
-              <a:p>
-                <a:pPr lvl="1"/>
-                <a:r>
-                  <a:rPr lang="en-US" dirty="0" err="1" smtClean="0"/>
-                  <a:t>df</a:t>
-                </a:r>
-                <a:r>
-                  <a:rPr lang="en-US" dirty="0" smtClean="0"/>
-                  <a:t> denominator (</a:t>
-                </a:r>
-                <a:r>
-                  <a:rPr lang="en-US" dirty="0" err="1" smtClean="0"/>
-                  <a:t>df</a:t>
-                </a:r>
-                <a:r>
-                  <a:rPr lang="en-US" dirty="0" smtClean="0"/>
-                  <a:t> error)</a:t>
-                </a:r>
-              </a:p>
-              <a:p>
-                <a:pPr lvl="1"/>
-                <a:r>
-                  <a:rPr lang="en-US" dirty="0" smtClean="0"/>
-                  <a:t>F-value</a:t>
-                </a:r>
-              </a:p>
-              <a:p>
-                <a:pPr lvl="1"/>
-                <a:r>
-                  <a:rPr lang="en-US" dirty="0" smtClean="0"/>
-                  <a:t>p-value</a:t>
-                </a:r>
-              </a:p>
-              <a:p>
-                <a:pPr lvl="1"/>
-                <a:r>
-                  <a:rPr lang="en-US" dirty="0" smtClean="0"/>
-                  <a:t>Partial Eta squared</a:t>
-                </a:r>
-              </a:p>
-              <a:p>
-                <a:r>
-                  <a:rPr lang="en-US" dirty="0" smtClean="0"/>
-                  <a:t>Then report them like this in the text:</a:t>
-                </a:r>
-              </a:p>
-              <a:p>
-                <a:r>
-                  <a:rPr lang="en-US" dirty="0" smtClean="0"/>
-                  <a:t>There was a significant effect of beef, </a:t>
-                </a:r>
-                <a:r>
-                  <a:rPr lang="en-US" i="1" dirty="0"/>
-                  <a:t>F</a:t>
-                </a:r>
-                <a:r>
-                  <a:rPr lang="en-US" dirty="0"/>
-                  <a:t>(1, 36) = </a:t>
-                </a:r>
-                <a:r>
-                  <a:rPr lang="en-US" dirty="0" smtClean="0"/>
-                  <a:t>8.63, </a:t>
-                </a:r>
-                <a14:m>
-                  <m:oMath xmlns:m="http://schemas.openxmlformats.org/officeDocument/2006/math">
-                    <m:sSubSup>
-                      <m:sSubSupPr>
-                        <m:ctrlPr>
-                          <a:rPr lang="en-US" i="1"/>
-                        </m:ctrlPr>
-                      </m:sSubSupPr>
-                      <m:e>
-                        <m:r>
-                          <a:rPr lang="en-US" i="1"/>
-                          <m:t>𝜂</m:t>
-                        </m:r>
-                      </m:e>
-                      <m:sub>
-                        <m:r>
-                          <a:rPr lang="en-US" b="0" i="1" smtClean="0">
-                            <a:latin typeface="Cambria Math" panose="02040503050406030204" pitchFamily="18" charset="0"/>
-                          </a:rPr>
-                          <m:t>𝑃</m:t>
-                        </m:r>
-                      </m:sub>
-                      <m:sup>
-                        <m:r>
-                          <a:rPr lang="en-US" i="1"/>
-                          <m:t>2</m:t>
-                        </m:r>
-                      </m:sup>
-                    </m:sSubSup>
-                  </m:oMath>
-                </a14:m>
-                <a:r>
-                  <a:rPr lang="en-US" dirty="0"/>
-                  <a:t> = 0.01, </a:t>
-                </a:r>
-                <a:r>
-                  <a:rPr lang="en-US" i="1" dirty="0"/>
-                  <a:t>p</a:t>
-                </a:r>
-                <a:r>
-                  <a:rPr lang="en-US" dirty="0"/>
-                  <a:t> &lt; .</a:t>
-                </a:r>
-                <a:r>
-                  <a:rPr lang="en-US" dirty="0" smtClean="0"/>
-                  <a:t>01.</a:t>
-                </a:r>
-              </a:p>
-              <a:p>
-                <a:r>
-                  <a:rPr lang="en-US" dirty="0" smtClean="0"/>
-                  <a:t>Do this for every significant factor. </a:t>
-                </a:r>
-              </a:p>
-            </p:txBody>
-          </p:sp>
-        </mc:Choice>
-        <mc:Fallback>
-          <p:sp>
-            <p:nvSpPr>
-              <p:cNvPr id="3" name="Content Placeholder 2"/>
-              <p:cNvSpPr>
-                <a:spLocks noGrp="1" noRot="1" noChangeAspect="1" noMove="1" noResize="1" noEditPoints="1" noAdjustHandles="1" noChangeArrowheads="1" noChangeShapeType="1" noTextEdit="1"/>
-              </p:cNvSpPr>
-              <p:nvPr>
-                <p:ph sz="half" idx="1"/>
-              </p:nvPr>
-            </p:nvSpPr>
-            <p:spPr>
-              <a:blipFill rotWithShape="0">
-                <a:blip r:embed="rId2"/>
-                <a:stretch>
-                  <a:fillRect l="-1882" t="-3501" r="-471"/>
-                </a:stretch>
-              </a:blipFill>
-            </p:spPr>
-            <p:txBody>
-              <a:bodyPr/>
-              <a:lstStyle/>
-              <a:p>
-                <a:r>
-                  <a:rPr lang="en-US">
+                  <a:rPr lang="en-GB">
                     <a:noFill/>
                   </a:rPr>
                   <a:t> </a:t>
@@ -7053,7 +6533,7 @@
 </p:sld>
 </file>
 
-<file path=ppt/slides/slide36.xml><?xml version="1.0" encoding="utf-8"?>
+<file path=ppt/slides/slide33.xml><?xml version="1.0" encoding="utf-8"?>
 <p:sld xmlns:a="http://schemas.openxmlformats.org/drawingml/2006/main" xmlns:r="http://schemas.openxmlformats.org/officeDocument/2006/relationships" xmlns:p="http://schemas.openxmlformats.org/presentationml/2006/main">
   <p:cSld>
     <p:spTree>
@@ -7093,8 +6573,8 @@
           </a:p>
         </p:txBody>
       </p:sp>
-      <mc:AlternateContent xmlns:mc="http://schemas.openxmlformats.org/markup-compatibility/2006">
-        <mc:Choice xmlns:a14="http://schemas.microsoft.com/office/drawing/2010/main" Requires="a14">
+      <mc:AlternateContent xmlns:mc="http://schemas.openxmlformats.org/markup-compatibility/2006" xmlns:a14="http://schemas.microsoft.com/office/drawing/2010/main">
+        <mc:Choice Requires="a14">
           <p:sp>
             <p:nvSpPr>
               <p:cNvPr id="3" name="Content Placeholder 2"/>
@@ -7139,12 +6619,16 @@
                     <m:sSubSup>
                       <m:sSubSupPr>
                         <m:ctrlPr>
-                          <a:rPr lang="en-US" i="1"/>
+                          <a:rPr lang="en-US" i="1">
+                            <a:latin typeface="Cambria Math"/>
+                          </a:rPr>
                         </m:ctrlPr>
                       </m:sSubSupPr>
                       <m:e>
                         <m:r>
-                          <a:rPr lang="en-US" i="1"/>
+                          <a:rPr lang="en-US" i="1">
+                            <a:latin typeface="Cambria Math"/>
+                          </a:rPr>
                           <m:t>𝜂</m:t>
                         </m:r>
                       </m:e>
@@ -7158,7 +6642,9 @@
                       </m:sub>
                       <m:sup>
                         <m:r>
-                          <a:rPr lang="en-US" i="1"/>
+                          <a:rPr lang="en-US" i="1">
+                            <a:latin typeface="Cambria Math"/>
+                          </a:rPr>
                           <m:t>2</m:t>
                         </m:r>
                       </m:sup>
@@ -7185,7 +6671,7 @@
             </p:txBody>
           </p:sp>
         </mc:Choice>
-        <mc:Fallback>
+        <mc:Fallback xmlns="">
           <p:sp>
             <p:nvSpPr>
               <p:cNvPr id="3" name="Content Placeholder 2"/>
@@ -7265,7 +6751,7 @@
 </p:sld>
 </file>
 
-<file path=ppt/slides/slide37.xml><?xml version="1.0" encoding="utf-8"?>
+<file path=ppt/slides/slide34.xml><?xml version="1.0" encoding="utf-8"?>
 <p:sld xmlns:a="http://schemas.openxmlformats.org/drawingml/2006/main" xmlns:r="http://schemas.openxmlformats.org/officeDocument/2006/relationships" xmlns:p="http://schemas.openxmlformats.org/presentationml/2006/main">
   <p:cSld>
     <p:spTree>
@@ -7317,10 +6803,15 @@
                 <p:ph sz="half" idx="1"/>
               </p:nvPr>
             </p:nvSpPr>
-            <p:spPr/>
+            <p:spPr>
+              <a:xfrm>
+                <a:off x="838200" y="1825625"/>
+                <a:ext cx="5181600" cy="4839126"/>
+              </a:xfrm>
+            </p:spPr>
             <p:txBody>
               <a:bodyPr>
-                <a:normAutofit fontScale="70000" lnSpcReduction="20000"/>
+                <a:normAutofit fontScale="77500" lnSpcReduction="20000"/>
               </a:bodyPr>
               <a:lstStyle/>
               <a:p>
@@ -7346,19 +6837,27 @@
                 </a:r>
                 <a:r>
                   <a:rPr lang="en-US" dirty="0"/>
-                  <a:t>(1, 36) = 571.82 </a:t>
+                  <a:t>(1, 36) = </a:t>
+                </a:r>
+                <a:r>
+                  <a:rPr lang="en-US" dirty="0" smtClean="0"/>
+                  <a:t>571.82, </a:t>
                 </a:r>
                 <a14:m>
                   <m:oMath xmlns:m="http://schemas.openxmlformats.org/officeDocument/2006/math">
                     <m:sSubSup>
                       <m:sSubSupPr>
                         <m:ctrlPr>
-                          <a:rPr lang="en-US" i="1"/>
+                          <a:rPr lang="en-US" i="1">
+                            <a:latin typeface="Cambria Math"/>
+                          </a:rPr>
                         </m:ctrlPr>
                       </m:sSubSupPr>
                       <m:e>
                         <m:r>
-                          <a:rPr lang="en-US" i="1"/>
+                          <a:rPr lang="en-US" i="1">
+                            <a:latin typeface="Cambria Math"/>
+                          </a:rPr>
                           <m:t>𝜂</m:t>
                         </m:r>
                       </m:e>
@@ -7372,7 +6871,9 @@
                       </m:sub>
                       <m:sup>
                         <m:r>
-                          <a:rPr lang="en-US" i="1"/>
+                          <a:rPr lang="en-US" i="1">
+                            <a:latin typeface="Cambria Math"/>
+                          </a:rPr>
                           <m:t>2</m:t>
                         </m:r>
                       </m:sup>
@@ -7408,10 +6909,14 @@
               </p:nvPr>
             </p:nvSpPr>
             <p:spPr>
-              <a:blipFill rotWithShape="0">
+              <a:xfrm>
+                <a:off x="838200" y="1825625"/>
+                <a:ext cx="5181600" cy="4839126"/>
+              </a:xfrm>
+              <a:blipFill rotWithShape="1">
                 <a:blip r:embed="rId2"/>
                 <a:stretch>
-                  <a:fillRect l="-1059" t="-2521" r="-2000"/>
+                  <a:fillRect l="-1412" t="-2519" r="-2118" b="-2141"/>
                 </a:stretch>
               </a:blipFill>
             </p:spPr>
@@ -7420,7 +6925,7 @@
               <a:lstStyle/>
               <a:p>
                 <a:r>
-                  <a:rPr lang="en-US">
+                  <a:rPr lang="en-GB">
                     <a:noFill/>
                   </a:rPr>
                   <a:t> </a:t>
@@ -7467,10 +6972,18 @@
         <p:spPr/>
         <p:txBody>
           <a:bodyPr>
-            <a:normAutofit fontScale="70000" lnSpcReduction="20000"/>
+            <a:normAutofit fontScale="77500" lnSpcReduction="20000"/>
           </a:bodyPr>
           <a:lstStyle/>
           <a:p>
+            <a:r>
+              <a:rPr lang="en-US" dirty="0" smtClean="0"/>
+              <a:t>Note that no pairwise comparisons are needed when both factors in the interaction only have </a:t>
+            </a:r>
+            <a:r>
+              <a:rPr lang="en-US" smtClean="0"/>
+              <a:t>two levels</a:t>
+            </a:r>
             <a:endParaRPr lang="en-US" dirty="0"/>
           </a:p>
         </p:txBody>
@@ -7495,7 +7008,7 @@
 </p:sld>
 </file>
 
-<file path=ppt/slides/slide38.xml><?xml version="1.0" encoding="utf-8"?>
+<file path=ppt/slides/slide35.xml><?xml version="1.0" encoding="utf-8"?>
 <p:sld xmlns:a="http://schemas.openxmlformats.org/drawingml/2006/main" xmlns:r="http://schemas.openxmlformats.org/officeDocument/2006/relationships" xmlns:p="http://schemas.openxmlformats.org/presentationml/2006/main">
   <p:cSld>
     <p:spTree>
@@ -7639,7 +7152,7 @@
 </p:sld>
 </file>
 
-<file path=ppt/slides/slide39.xml><?xml version="1.0" encoding="utf-8"?>
+<file path=ppt/slides/slide36.xml><?xml version="1.0" encoding="utf-8"?>
 <p:sld xmlns:a="http://schemas.openxmlformats.org/drawingml/2006/main" xmlns:r="http://schemas.openxmlformats.org/officeDocument/2006/relationships" xmlns:p="http://schemas.openxmlformats.org/presentationml/2006/main">
   <p:cSld>
     <p:spTree>
@@ -7774,7 +7287,7 @@
           <a:graphicData uri="http://schemas.openxmlformats.org/presentationml/2006/ole">
             <mc:AlternateContent xmlns:mc="http://schemas.openxmlformats.org/markup-compatibility/2006">
               <mc:Choice xmlns:v="urn:schemas-microsoft-com:vml" Requires="v">
-                <p:oleObj spid="_x0000_s4103" r:id="rId3" imgW="27225360" imgH="15898320" progId="">
+                <p:oleObj spid="_x0000_s4106" r:id="rId3" imgW="27225360" imgH="15898320" progId="">
                   <p:embed/>
                 </p:oleObj>
               </mc:Choice>
@@ -7855,131 +7368,7 @@
 </p:sld>
 </file>
 
-<file path=ppt/slides/slide4.xml><?xml version="1.0" encoding="utf-8"?>
-<p:sld xmlns:a="http://schemas.openxmlformats.org/drawingml/2006/main" xmlns:r="http://schemas.openxmlformats.org/officeDocument/2006/relationships" xmlns:p="http://schemas.openxmlformats.org/presentationml/2006/main">
-  <p:cSld>
-    <p:spTree>
-      <p:nvGrpSpPr>
-        <p:cNvPr id="1" name=""/>
-        <p:cNvGrpSpPr/>
-        <p:nvPr/>
-      </p:nvGrpSpPr>
-      <p:grpSpPr>
-        <a:xfrm>
-          <a:off x="0" y="0"/>
-          <a:ext cx="0" cy="0"/>
-          <a:chOff x="0" y="0"/>
-          <a:chExt cx="0" cy="0"/>
-        </a:xfrm>
-      </p:grpSpPr>
-      <p:sp>
-        <p:nvSpPr>
-          <p:cNvPr id="2" name="Title 1"/>
-          <p:cNvSpPr>
-            <a:spLocks noGrp="1"/>
-          </p:cNvSpPr>
-          <p:nvPr>
-            <p:ph type="title"/>
-          </p:nvPr>
-        </p:nvSpPr>
-        <p:spPr/>
-        <p:txBody>
-          <a:bodyPr/>
-          <a:lstStyle/>
-          <a:p>
-            <a:r>
-              <a:rPr lang="en-US" dirty="0" smtClean="0"/>
-              <a:t>Text import wizard</a:t>
-            </a:r>
-            <a:endParaRPr lang="en-US" dirty="0"/>
-          </a:p>
-        </p:txBody>
-      </p:sp>
-      <p:sp>
-        <p:nvSpPr>
-          <p:cNvPr id="3" name="Content Placeholder 2"/>
-          <p:cNvSpPr>
-            <a:spLocks noGrp="1"/>
-          </p:cNvSpPr>
-          <p:nvPr>
-            <p:ph idx="1"/>
-          </p:nvPr>
-        </p:nvSpPr>
-        <p:spPr>
-          <a:xfrm>
-            <a:off x="838200" y="1825625"/>
-            <a:ext cx="4871830" cy="4351338"/>
-          </a:xfrm>
-        </p:spPr>
-        <p:txBody>
-          <a:bodyPr/>
-          <a:lstStyle/>
-          <a:p>
-            <a:r>
-              <a:rPr lang="en-US" dirty="0" smtClean="0"/>
-              <a:t>Select “Delimited” (since the data are comma delimited)</a:t>
-            </a:r>
-          </a:p>
-          <a:p>
-            <a:r>
-              <a:rPr lang="en-US" dirty="0" smtClean="0"/>
-              <a:t>Select “Yes”, since the first line contains column names</a:t>
-            </a:r>
-          </a:p>
-          <a:p>
-            <a:r>
-              <a:rPr lang="en-US" dirty="0" smtClean="0"/>
-              <a:t>Press Next</a:t>
-            </a:r>
-            <a:endParaRPr lang="en-US" dirty="0"/>
-          </a:p>
-        </p:txBody>
-      </p:sp>
-      <p:pic>
-        <p:nvPicPr>
-          <p:cNvPr id="5" name="Picture 4"/>
-          <p:cNvPicPr>
-            <a:picLocks noChangeAspect="1"/>
-          </p:cNvPicPr>
-          <p:nvPr/>
-        </p:nvPicPr>
-        <p:blipFill>
-          <a:blip r:embed="rId2"/>
-          <a:stretch>
-            <a:fillRect/>
-          </a:stretch>
-        </p:blipFill>
-        <p:spPr>
-          <a:xfrm>
-            <a:off x="5796170" y="1133890"/>
-            <a:ext cx="4723838" cy="4572000"/>
-          </a:xfrm>
-          <a:prstGeom prst="rect">
-            <a:avLst/>
-          </a:prstGeom>
-        </p:spPr>
-      </p:pic>
-    </p:spTree>
-    <p:extLst>
-      <p:ext uri="{BB962C8B-B14F-4D97-AF65-F5344CB8AC3E}">
-        <p14:creationId xmlns:p14="http://schemas.microsoft.com/office/powerpoint/2010/main" val="1726033333"/>
-      </p:ext>
-    </p:extLst>
-  </p:cSld>
-  <p:clrMapOvr>
-    <a:masterClrMapping/>
-  </p:clrMapOvr>
-  <p:timing>
-    <p:tnLst>
-      <p:par>
-        <p:cTn id="1" dur="indefinite" restart="never" nodeType="tmRoot"/>
-      </p:par>
-    </p:tnLst>
-  </p:timing>
-</p:sld>
-</file>
-
-<file path=ppt/slides/slide40.xml><?xml version="1.0" encoding="utf-8"?>
+<file path=ppt/slides/slide37.xml><?xml version="1.0" encoding="utf-8"?>
 <p:sld xmlns:a="http://schemas.openxmlformats.org/drawingml/2006/main" xmlns:r="http://schemas.openxmlformats.org/officeDocument/2006/relationships" xmlns:p="http://schemas.openxmlformats.org/presentationml/2006/main">
   <p:cSld>
     <p:spTree>
@@ -8111,7 +7500,7 @@
 </p:sld>
 </file>
 
-<file path=ppt/slides/slide41.xml><?xml version="1.0" encoding="utf-8"?>
+<file path=ppt/slides/slide38.xml><?xml version="1.0" encoding="utf-8"?>
 <p:sld xmlns:a="http://schemas.openxmlformats.org/drawingml/2006/main" xmlns:r="http://schemas.openxmlformats.org/officeDocument/2006/relationships" xmlns:p="http://schemas.openxmlformats.org/presentationml/2006/main">
   <p:cSld>
     <p:spTree>
@@ -8245,7 +7634,7 @@
 </p:sld>
 </file>
 
-<file path=ppt/slides/slide42.xml><?xml version="1.0" encoding="utf-8"?>
+<file path=ppt/slides/slide39.xml><?xml version="1.0" encoding="utf-8"?>
 <p:sld xmlns:a="http://schemas.openxmlformats.org/drawingml/2006/main" xmlns:r="http://schemas.openxmlformats.org/officeDocument/2006/relationships" xmlns:p="http://schemas.openxmlformats.org/presentationml/2006/main">
   <p:cSld>
     <p:spTree>
@@ -8316,6 +7705,130 @@
     <p:extLst>
       <p:ext uri="{BB962C8B-B14F-4D97-AF65-F5344CB8AC3E}">
         <p14:creationId xmlns:p14="http://schemas.microsoft.com/office/powerpoint/2010/main" val="497935006"/>
+      </p:ext>
+    </p:extLst>
+  </p:cSld>
+  <p:clrMapOvr>
+    <a:masterClrMapping/>
+  </p:clrMapOvr>
+  <p:timing>
+    <p:tnLst>
+      <p:par>
+        <p:cTn id="1" dur="indefinite" restart="never" nodeType="tmRoot"/>
+      </p:par>
+    </p:tnLst>
+  </p:timing>
+</p:sld>
+</file>
+
+<file path=ppt/slides/slide4.xml><?xml version="1.0" encoding="utf-8"?>
+<p:sld xmlns:a="http://schemas.openxmlformats.org/drawingml/2006/main" xmlns:r="http://schemas.openxmlformats.org/officeDocument/2006/relationships" xmlns:p="http://schemas.openxmlformats.org/presentationml/2006/main">
+  <p:cSld>
+    <p:spTree>
+      <p:nvGrpSpPr>
+        <p:cNvPr id="1" name=""/>
+        <p:cNvGrpSpPr/>
+        <p:nvPr/>
+      </p:nvGrpSpPr>
+      <p:grpSpPr>
+        <a:xfrm>
+          <a:off x="0" y="0"/>
+          <a:ext cx="0" cy="0"/>
+          <a:chOff x="0" y="0"/>
+          <a:chExt cx="0" cy="0"/>
+        </a:xfrm>
+      </p:grpSpPr>
+      <p:sp>
+        <p:nvSpPr>
+          <p:cNvPr id="2" name="Title 1"/>
+          <p:cNvSpPr>
+            <a:spLocks noGrp="1"/>
+          </p:cNvSpPr>
+          <p:nvPr>
+            <p:ph type="title"/>
+          </p:nvPr>
+        </p:nvSpPr>
+        <p:spPr/>
+        <p:txBody>
+          <a:bodyPr/>
+          <a:lstStyle/>
+          <a:p>
+            <a:r>
+              <a:rPr lang="en-US" dirty="0" smtClean="0"/>
+              <a:t>Text import wizard</a:t>
+            </a:r>
+            <a:endParaRPr lang="en-US" dirty="0"/>
+          </a:p>
+        </p:txBody>
+      </p:sp>
+      <p:sp>
+        <p:nvSpPr>
+          <p:cNvPr id="3" name="Content Placeholder 2"/>
+          <p:cNvSpPr>
+            <a:spLocks noGrp="1"/>
+          </p:cNvSpPr>
+          <p:nvPr>
+            <p:ph idx="1"/>
+          </p:nvPr>
+        </p:nvSpPr>
+        <p:spPr>
+          <a:xfrm>
+            <a:off x="838200" y="1825625"/>
+            <a:ext cx="4871830" cy="4351338"/>
+          </a:xfrm>
+        </p:spPr>
+        <p:txBody>
+          <a:bodyPr/>
+          <a:lstStyle/>
+          <a:p>
+            <a:r>
+              <a:rPr lang="en-US" dirty="0" smtClean="0"/>
+              <a:t>Select “Delimited” (since the data are comma delimited)</a:t>
+            </a:r>
+          </a:p>
+          <a:p>
+            <a:r>
+              <a:rPr lang="en-US" dirty="0" smtClean="0"/>
+              <a:t>Select “Yes”, since the first line contains column names</a:t>
+            </a:r>
+          </a:p>
+          <a:p>
+            <a:r>
+              <a:rPr lang="en-US" dirty="0" smtClean="0"/>
+              <a:t>Press Next</a:t>
+            </a:r>
+            <a:endParaRPr lang="en-US" dirty="0"/>
+          </a:p>
+        </p:txBody>
+      </p:sp>
+      <p:pic>
+        <p:nvPicPr>
+          <p:cNvPr id="5" name="Picture 4"/>
+          <p:cNvPicPr>
+            <a:picLocks noChangeAspect="1"/>
+          </p:cNvPicPr>
+          <p:nvPr/>
+        </p:nvPicPr>
+        <p:blipFill>
+          <a:blip r:embed="rId2"/>
+          <a:stretch>
+            <a:fillRect/>
+          </a:stretch>
+        </p:blipFill>
+        <p:spPr>
+          <a:xfrm>
+            <a:off x="5796170" y="1133890"/>
+            <a:ext cx="4723838" cy="4572000"/>
+          </a:xfrm>
+          <a:prstGeom prst="rect">
+            <a:avLst/>
+          </a:prstGeom>
+        </p:spPr>
+      </p:pic>
+    </p:spTree>
+    <p:extLst>
+      <p:ext uri="{BB962C8B-B14F-4D97-AF65-F5344CB8AC3E}">
+        <p14:creationId xmlns:p14="http://schemas.microsoft.com/office/powerpoint/2010/main" val="1726033333"/>
       </p:ext>
     </p:extLst>
   </p:cSld>
@@ -8943,7 +8456,7 @@
           <a:graphicData uri="http://schemas.openxmlformats.org/presentationml/2006/ole">
             <mc:AlternateContent xmlns:mc="http://schemas.openxmlformats.org/markup-compatibility/2006">
               <mc:Choice xmlns:v="urn:schemas-microsoft-com:vml" Requires="v">
-                <p:oleObj spid="_x0000_s1056" r:id="rId3" imgW="27110880" imgH="15301440" progId="">
+                <p:oleObj spid="_x0000_s1059" r:id="rId3" imgW="27110880" imgH="15301440" progId="">
                   <p:embed/>
                 </p:oleObj>
               </mc:Choice>
@@ -9041,7 +8554,7 @@
     </a:clrScheme>
     <a:fontScheme name="Office">
       <a:majorFont>
-        <a:latin typeface="Calibri Light" panose="020F0302020204030204"/>
+        <a:latin typeface="Calibri Light"/>
         <a:ea typeface=""/>
         <a:cs typeface=""/>
         <a:font script="Jpan" typeface="ＭＳ Ｐゴシック"/>
@@ -9076,7 +8589,7 @@
         <a:font script="Geor" typeface="Sylfaen"/>
       </a:majorFont>
       <a:minorFont>
-        <a:latin typeface="Calibri" panose="020F0502020204030204"/>
+        <a:latin typeface="Calibri"/>
         <a:ea typeface=""/>
         <a:cs typeface=""/>
         <a:font script="Jpan" typeface="ＭＳ Ｐゴシック"/>
@@ -9253,7 +8766,7 @@
   <a:extraClrSchemeLst/>
   <a:extLst>
     <a:ext uri="{05A4C25C-085E-4340-85A3-A5531E510DB2}">
-      <thm15:themeFamily xmlns:thm15="http://schemas.microsoft.com/office/thememl/2012/main" name="Office Theme" id="{62F939B6-93AF-4DB8-9C6B-D6C7DFDC589F}" vid="{4A3C46E8-61CC-4603-A589-7422A47A8E4A}"/>
+      <thm15:themeFamily xmlns:thm15="http://schemas.microsoft.com/office/thememl/2012/main" xmlns="" name="Office Theme" id="{62F939B6-93AF-4DB8-9C6B-D6C7DFDC589F}" vid="{4A3C46E8-61CC-4603-A589-7422A47A8E4A}"/>
     </a:ext>
   </a:extLst>
 </a:theme>

</xml_diff>